<commit_message>
ultimos comentarios y manuales
</commit_message>
<xml_diff>
--- a/Manual/Manual Usuario.pptx
+++ b/Manual/Manual Usuario.pptx
@@ -5,23 +5,25 @@
     <p:sldMasterId id="2147483648" r:id="rId1"/>
   </p:sldMasterIdLst>
   <p:notesMasterIdLst>
-    <p:notesMasterId r:id="rId16"/>
+    <p:notesMasterId r:id="rId18"/>
   </p:notesMasterIdLst>
   <p:sldIdLst>
     <p:sldId id="273" r:id="rId2"/>
-    <p:sldId id="256" r:id="rId3"/>
-    <p:sldId id="264" r:id="rId4"/>
-    <p:sldId id="260" r:id="rId5"/>
-    <p:sldId id="261" r:id="rId6"/>
-    <p:sldId id="274" r:id="rId7"/>
-    <p:sldId id="265" r:id="rId8"/>
-    <p:sldId id="268" r:id="rId9"/>
-    <p:sldId id="270" r:id="rId10"/>
-    <p:sldId id="267" r:id="rId11"/>
-    <p:sldId id="266" r:id="rId12"/>
-    <p:sldId id="275" r:id="rId13"/>
-    <p:sldId id="276" r:id="rId14"/>
-    <p:sldId id="271" r:id="rId15"/>
+    <p:sldId id="277" r:id="rId3"/>
+    <p:sldId id="256" r:id="rId4"/>
+    <p:sldId id="279" r:id="rId5"/>
+    <p:sldId id="264" r:id="rId6"/>
+    <p:sldId id="260" r:id="rId7"/>
+    <p:sldId id="261" r:id="rId8"/>
+    <p:sldId id="274" r:id="rId9"/>
+    <p:sldId id="265" r:id="rId10"/>
+    <p:sldId id="268" r:id="rId11"/>
+    <p:sldId id="270" r:id="rId12"/>
+    <p:sldId id="267" r:id="rId13"/>
+    <p:sldId id="266" r:id="rId14"/>
+    <p:sldId id="275" r:id="rId15"/>
+    <p:sldId id="276" r:id="rId16"/>
+    <p:sldId id="271" r:id="rId17"/>
   </p:sldIdLst>
   <p:sldSz cx="12192000" cy="6858000"/>
   <p:notesSz cx="6858000" cy="9144000"/>
@@ -122,7 +124,7 @@
   </p:defaultTextStyle>
   <p:extLst>
     <p:ext uri="{EFAFB233-063F-42B5-8137-9DF3F51BA10A}">
-      <p15:sldGuideLst xmlns="" xmlns:p15="http://schemas.microsoft.com/office/powerpoint/2012/main">
+      <p15:sldGuideLst xmlns:p15="http://schemas.microsoft.com/office/powerpoint/2012/main" xmlns="">
         <p15:guide id="1" orient="horz" pos="2160">
           <p15:clr>
             <a:srgbClr val="A4A3A4"/>
@@ -510,7 +512,7 @@
           <p:cNvPr id="2" name="Título 1">
             <a:extLst>
               <a:ext uri="{FF2B5EF4-FFF2-40B4-BE49-F238E27FC236}">
-                <a16:creationId xmlns="" xmlns:a16="http://schemas.microsoft.com/office/drawing/2014/main" id="{69260EF4-48E5-453A-8754-4934CBBC7738}"/>
+                <a16:creationId xmlns:a16="http://schemas.microsoft.com/office/drawing/2014/main" xmlns="" id="{69260EF4-48E5-453A-8754-4934CBBC7738}"/>
               </a:ext>
             </a:extLst>
           </p:cNvPr>
@@ -548,7 +550,7 @@
           <p:cNvPr id="3" name="Subtítulo 2">
             <a:extLst>
               <a:ext uri="{FF2B5EF4-FFF2-40B4-BE49-F238E27FC236}">
-                <a16:creationId xmlns="" xmlns:a16="http://schemas.microsoft.com/office/drawing/2014/main" id="{923E8CE3-DB1B-4809-B3CC-8B3667C52C27}"/>
+                <a16:creationId xmlns:a16="http://schemas.microsoft.com/office/drawing/2014/main" xmlns="" id="{923E8CE3-DB1B-4809-B3CC-8B3667C52C27}"/>
               </a:ext>
             </a:extLst>
           </p:cNvPr>
@@ -619,7 +621,7 @@
           <p:cNvPr id="4" name="Marcador de fecha 3">
             <a:extLst>
               <a:ext uri="{FF2B5EF4-FFF2-40B4-BE49-F238E27FC236}">
-                <a16:creationId xmlns="" xmlns:a16="http://schemas.microsoft.com/office/drawing/2014/main" id="{38751974-7B6E-4075-B2AC-002E6AC45DA8}"/>
+                <a16:creationId xmlns:a16="http://schemas.microsoft.com/office/drawing/2014/main" xmlns="" id="{38751974-7B6E-4075-B2AC-002E6AC45DA8}"/>
               </a:ext>
             </a:extLst>
           </p:cNvPr>
@@ -649,7 +651,7 @@
           <p:cNvPr id="5" name="Marcador de pie de página 4">
             <a:extLst>
               <a:ext uri="{FF2B5EF4-FFF2-40B4-BE49-F238E27FC236}">
-                <a16:creationId xmlns="" xmlns:a16="http://schemas.microsoft.com/office/drawing/2014/main" id="{01C0604D-03C9-4392-A6D0-A113AF91069E}"/>
+                <a16:creationId xmlns:a16="http://schemas.microsoft.com/office/drawing/2014/main" xmlns="" id="{01C0604D-03C9-4392-A6D0-A113AF91069E}"/>
               </a:ext>
             </a:extLst>
           </p:cNvPr>
@@ -674,7 +676,7 @@
           <p:cNvPr id="6" name="Marcador de número de diapositiva 5">
             <a:extLst>
               <a:ext uri="{FF2B5EF4-FFF2-40B4-BE49-F238E27FC236}">
-                <a16:creationId xmlns="" xmlns:a16="http://schemas.microsoft.com/office/drawing/2014/main" id="{54F3F8B9-6AC6-49DF-9FF9-27F0B01E7072}"/>
+                <a16:creationId xmlns:a16="http://schemas.microsoft.com/office/drawing/2014/main" xmlns="" id="{54F3F8B9-6AC6-49DF-9FF9-27F0B01E7072}"/>
               </a:ext>
             </a:extLst>
           </p:cNvPr>
@@ -702,7 +704,7 @@
     </p:spTree>
     <p:extLst>
       <p:ext uri="{BB962C8B-B14F-4D97-AF65-F5344CB8AC3E}">
-        <p14:creationId xmlns="" xmlns:p14="http://schemas.microsoft.com/office/powerpoint/2010/main" val="1833367815"/>
+        <p14:creationId xmlns:p14="http://schemas.microsoft.com/office/powerpoint/2010/main" xmlns="" val="1833367815"/>
       </p:ext>
     </p:extLst>
   </p:cSld>
@@ -734,7 +736,7 @@
           <p:cNvPr id="2" name="Título 1">
             <a:extLst>
               <a:ext uri="{FF2B5EF4-FFF2-40B4-BE49-F238E27FC236}">
-                <a16:creationId xmlns="" xmlns:a16="http://schemas.microsoft.com/office/drawing/2014/main" id="{48B42F07-E3DA-4EB9-973C-978FA8BA8874}"/>
+                <a16:creationId xmlns:a16="http://schemas.microsoft.com/office/drawing/2014/main" xmlns="" id="{48B42F07-E3DA-4EB9-973C-978FA8BA8874}"/>
               </a:ext>
             </a:extLst>
           </p:cNvPr>
@@ -763,7 +765,7 @@
           <p:cNvPr id="3" name="Marcador de texto vertical 2">
             <a:extLst>
               <a:ext uri="{FF2B5EF4-FFF2-40B4-BE49-F238E27FC236}">
-                <a16:creationId xmlns="" xmlns:a16="http://schemas.microsoft.com/office/drawing/2014/main" id="{654BC45F-AEEE-4A67-A231-84077202188F}"/>
+                <a16:creationId xmlns:a16="http://schemas.microsoft.com/office/drawing/2014/main" xmlns="" id="{654BC45F-AEEE-4A67-A231-84077202188F}"/>
               </a:ext>
             </a:extLst>
           </p:cNvPr>
@@ -821,7 +823,7 @@
           <p:cNvPr id="4" name="Marcador de fecha 3">
             <a:extLst>
               <a:ext uri="{FF2B5EF4-FFF2-40B4-BE49-F238E27FC236}">
-                <a16:creationId xmlns="" xmlns:a16="http://schemas.microsoft.com/office/drawing/2014/main" id="{F6E7BB0F-2A95-4165-9A11-02C37D614529}"/>
+                <a16:creationId xmlns:a16="http://schemas.microsoft.com/office/drawing/2014/main" xmlns="" id="{F6E7BB0F-2A95-4165-9A11-02C37D614529}"/>
               </a:ext>
             </a:extLst>
           </p:cNvPr>
@@ -851,7 +853,7 @@
           <p:cNvPr id="5" name="Marcador de pie de página 4">
             <a:extLst>
               <a:ext uri="{FF2B5EF4-FFF2-40B4-BE49-F238E27FC236}">
-                <a16:creationId xmlns="" xmlns:a16="http://schemas.microsoft.com/office/drawing/2014/main" id="{7B8DED56-3ABF-4422-8665-48381F0C0568}"/>
+                <a16:creationId xmlns:a16="http://schemas.microsoft.com/office/drawing/2014/main" xmlns="" id="{7B8DED56-3ABF-4422-8665-48381F0C0568}"/>
               </a:ext>
             </a:extLst>
           </p:cNvPr>
@@ -876,7 +878,7 @@
           <p:cNvPr id="6" name="Marcador de número de diapositiva 5">
             <a:extLst>
               <a:ext uri="{FF2B5EF4-FFF2-40B4-BE49-F238E27FC236}">
-                <a16:creationId xmlns="" xmlns:a16="http://schemas.microsoft.com/office/drawing/2014/main" id="{C0D474F6-BC24-4A1E-A1D9-819D6BD798CD}"/>
+                <a16:creationId xmlns:a16="http://schemas.microsoft.com/office/drawing/2014/main" xmlns="" id="{C0D474F6-BC24-4A1E-A1D9-819D6BD798CD}"/>
               </a:ext>
             </a:extLst>
           </p:cNvPr>
@@ -904,7 +906,7 @@
     </p:spTree>
     <p:extLst>
       <p:ext uri="{BB962C8B-B14F-4D97-AF65-F5344CB8AC3E}">
-        <p14:creationId xmlns="" xmlns:p14="http://schemas.microsoft.com/office/powerpoint/2010/main" val="2215001954"/>
+        <p14:creationId xmlns:p14="http://schemas.microsoft.com/office/powerpoint/2010/main" xmlns="" val="2215001954"/>
       </p:ext>
     </p:extLst>
   </p:cSld>
@@ -936,7 +938,7 @@
           <p:cNvPr id="2" name="Título vertical 1">
             <a:extLst>
               <a:ext uri="{FF2B5EF4-FFF2-40B4-BE49-F238E27FC236}">
-                <a16:creationId xmlns="" xmlns:a16="http://schemas.microsoft.com/office/drawing/2014/main" id="{9DBD0DFD-DBE0-4A30-A382-F4CCE1E89C0F}"/>
+                <a16:creationId xmlns:a16="http://schemas.microsoft.com/office/drawing/2014/main" xmlns="" id="{9DBD0DFD-DBE0-4A30-A382-F4CCE1E89C0F}"/>
               </a:ext>
             </a:extLst>
           </p:cNvPr>
@@ -970,7 +972,7 @@
           <p:cNvPr id="3" name="Marcador de texto vertical 2">
             <a:extLst>
               <a:ext uri="{FF2B5EF4-FFF2-40B4-BE49-F238E27FC236}">
-                <a16:creationId xmlns="" xmlns:a16="http://schemas.microsoft.com/office/drawing/2014/main" id="{85AEBAEF-1865-4515-864E-093AD2AA9B0D}"/>
+                <a16:creationId xmlns:a16="http://schemas.microsoft.com/office/drawing/2014/main" xmlns="" id="{85AEBAEF-1865-4515-864E-093AD2AA9B0D}"/>
               </a:ext>
             </a:extLst>
           </p:cNvPr>
@@ -1033,7 +1035,7 @@
           <p:cNvPr id="4" name="Marcador de fecha 3">
             <a:extLst>
               <a:ext uri="{FF2B5EF4-FFF2-40B4-BE49-F238E27FC236}">
-                <a16:creationId xmlns="" xmlns:a16="http://schemas.microsoft.com/office/drawing/2014/main" id="{0399E220-0020-4E16-9447-7909779AEEC5}"/>
+                <a16:creationId xmlns:a16="http://schemas.microsoft.com/office/drawing/2014/main" xmlns="" id="{0399E220-0020-4E16-9447-7909779AEEC5}"/>
               </a:ext>
             </a:extLst>
           </p:cNvPr>
@@ -1063,7 +1065,7 @@
           <p:cNvPr id="5" name="Marcador de pie de página 4">
             <a:extLst>
               <a:ext uri="{FF2B5EF4-FFF2-40B4-BE49-F238E27FC236}">
-                <a16:creationId xmlns="" xmlns:a16="http://schemas.microsoft.com/office/drawing/2014/main" id="{9BCE9912-8458-4210-B5C4-BD2CE66A1980}"/>
+                <a16:creationId xmlns:a16="http://schemas.microsoft.com/office/drawing/2014/main" xmlns="" id="{9BCE9912-8458-4210-B5C4-BD2CE66A1980}"/>
               </a:ext>
             </a:extLst>
           </p:cNvPr>
@@ -1088,7 +1090,7 @@
           <p:cNvPr id="6" name="Marcador de número de diapositiva 5">
             <a:extLst>
               <a:ext uri="{FF2B5EF4-FFF2-40B4-BE49-F238E27FC236}">
-                <a16:creationId xmlns="" xmlns:a16="http://schemas.microsoft.com/office/drawing/2014/main" id="{37A1365D-27C1-4491-8847-544A3C2DE69B}"/>
+                <a16:creationId xmlns:a16="http://schemas.microsoft.com/office/drawing/2014/main" xmlns="" id="{37A1365D-27C1-4491-8847-544A3C2DE69B}"/>
               </a:ext>
             </a:extLst>
           </p:cNvPr>
@@ -1116,7 +1118,7 @@
     </p:spTree>
     <p:extLst>
       <p:ext uri="{BB962C8B-B14F-4D97-AF65-F5344CB8AC3E}">
-        <p14:creationId xmlns="" xmlns:p14="http://schemas.microsoft.com/office/powerpoint/2010/main" val="1008781817"/>
+        <p14:creationId xmlns:p14="http://schemas.microsoft.com/office/powerpoint/2010/main" xmlns="" val="1008781817"/>
       </p:ext>
     </p:extLst>
   </p:cSld>
@@ -1148,7 +1150,7 @@
           <p:cNvPr id="2" name="Título 1">
             <a:extLst>
               <a:ext uri="{FF2B5EF4-FFF2-40B4-BE49-F238E27FC236}">
-                <a16:creationId xmlns="" xmlns:a16="http://schemas.microsoft.com/office/drawing/2014/main" id="{D372CB92-D381-4D7F-A8FE-260B3A4E7A2C}"/>
+                <a16:creationId xmlns:a16="http://schemas.microsoft.com/office/drawing/2014/main" xmlns="" id="{D372CB92-D381-4D7F-A8FE-260B3A4E7A2C}"/>
               </a:ext>
             </a:extLst>
           </p:cNvPr>
@@ -1177,7 +1179,7 @@
           <p:cNvPr id="3" name="Marcador de contenido 2">
             <a:extLst>
               <a:ext uri="{FF2B5EF4-FFF2-40B4-BE49-F238E27FC236}">
-                <a16:creationId xmlns="" xmlns:a16="http://schemas.microsoft.com/office/drawing/2014/main" id="{64FEECEA-4DD5-4975-924A-D595398597FD}"/>
+                <a16:creationId xmlns:a16="http://schemas.microsoft.com/office/drawing/2014/main" xmlns="" id="{64FEECEA-4DD5-4975-924A-D595398597FD}"/>
               </a:ext>
             </a:extLst>
           </p:cNvPr>
@@ -1235,7 +1237,7 @@
           <p:cNvPr id="4" name="Marcador de fecha 3">
             <a:extLst>
               <a:ext uri="{FF2B5EF4-FFF2-40B4-BE49-F238E27FC236}">
-                <a16:creationId xmlns="" xmlns:a16="http://schemas.microsoft.com/office/drawing/2014/main" id="{1D2E53C3-8F9D-48ED-893D-142E3A3BF976}"/>
+                <a16:creationId xmlns:a16="http://schemas.microsoft.com/office/drawing/2014/main" xmlns="" id="{1D2E53C3-8F9D-48ED-893D-142E3A3BF976}"/>
               </a:ext>
             </a:extLst>
           </p:cNvPr>
@@ -1265,7 +1267,7 @@
           <p:cNvPr id="5" name="Marcador de pie de página 4">
             <a:extLst>
               <a:ext uri="{FF2B5EF4-FFF2-40B4-BE49-F238E27FC236}">
-                <a16:creationId xmlns="" xmlns:a16="http://schemas.microsoft.com/office/drawing/2014/main" id="{103955D1-8FCC-412A-93C2-CBD4F700E62B}"/>
+                <a16:creationId xmlns:a16="http://schemas.microsoft.com/office/drawing/2014/main" xmlns="" id="{103955D1-8FCC-412A-93C2-CBD4F700E62B}"/>
               </a:ext>
             </a:extLst>
           </p:cNvPr>
@@ -1290,7 +1292,7 @@
           <p:cNvPr id="6" name="Marcador de número de diapositiva 5">
             <a:extLst>
               <a:ext uri="{FF2B5EF4-FFF2-40B4-BE49-F238E27FC236}">
-                <a16:creationId xmlns="" xmlns:a16="http://schemas.microsoft.com/office/drawing/2014/main" id="{268DE382-651C-461D-8C5A-D0C2CE8FAF96}"/>
+                <a16:creationId xmlns:a16="http://schemas.microsoft.com/office/drawing/2014/main" xmlns="" id="{268DE382-651C-461D-8C5A-D0C2CE8FAF96}"/>
               </a:ext>
             </a:extLst>
           </p:cNvPr>
@@ -1318,7 +1320,7 @@
     </p:spTree>
     <p:extLst>
       <p:ext uri="{BB962C8B-B14F-4D97-AF65-F5344CB8AC3E}">
-        <p14:creationId xmlns="" xmlns:p14="http://schemas.microsoft.com/office/powerpoint/2010/main" val="2275775723"/>
+        <p14:creationId xmlns:p14="http://schemas.microsoft.com/office/powerpoint/2010/main" xmlns="" val="2275775723"/>
       </p:ext>
     </p:extLst>
   </p:cSld>
@@ -1350,7 +1352,7 @@
           <p:cNvPr id="2" name="Título 1">
             <a:extLst>
               <a:ext uri="{FF2B5EF4-FFF2-40B4-BE49-F238E27FC236}">
-                <a16:creationId xmlns="" xmlns:a16="http://schemas.microsoft.com/office/drawing/2014/main" id="{B97BAF2A-926E-422C-9654-7B2B18B88B7B}"/>
+                <a16:creationId xmlns:a16="http://schemas.microsoft.com/office/drawing/2014/main" xmlns="" id="{B97BAF2A-926E-422C-9654-7B2B18B88B7B}"/>
               </a:ext>
             </a:extLst>
           </p:cNvPr>
@@ -1388,7 +1390,7 @@
           <p:cNvPr id="3" name="Marcador de texto 2">
             <a:extLst>
               <a:ext uri="{FF2B5EF4-FFF2-40B4-BE49-F238E27FC236}">
-                <a16:creationId xmlns="" xmlns:a16="http://schemas.microsoft.com/office/drawing/2014/main" id="{ABB13B48-26ED-4B03-91B7-ABD0DD6B418A}"/>
+                <a16:creationId xmlns:a16="http://schemas.microsoft.com/office/drawing/2014/main" xmlns="" id="{ABB13B48-26ED-4B03-91B7-ABD0DD6B418A}"/>
               </a:ext>
             </a:extLst>
           </p:cNvPr>
@@ -1513,7 +1515,7 @@
           <p:cNvPr id="4" name="Marcador de fecha 3">
             <a:extLst>
               <a:ext uri="{FF2B5EF4-FFF2-40B4-BE49-F238E27FC236}">
-                <a16:creationId xmlns="" xmlns:a16="http://schemas.microsoft.com/office/drawing/2014/main" id="{A1311B42-A8BA-437D-9775-59CEC07B725C}"/>
+                <a16:creationId xmlns:a16="http://schemas.microsoft.com/office/drawing/2014/main" xmlns="" id="{A1311B42-A8BA-437D-9775-59CEC07B725C}"/>
               </a:ext>
             </a:extLst>
           </p:cNvPr>
@@ -1543,7 +1545,7 @@
           <p:cNvPr id="5" name="Marcador de pie de página 4">
             <a:extLst>
               <a:ext uri="{FF2B5EF4-FFF2-40B4-BE49-F238E27FC236}">
-                <a16:creationId xmlns="" xmlns:a16="http://schemas.microsoft.com/office/drawing/2014/main" id="{C5C0AE95-AF91-4F30-89D9-C7041EDFF3A9}"/>
+                <a16:creationId xmlns:a16="http://schemas.microsoft.com/office/drawing/2014/main" xmlns="" id="{C5C0AE95-AF91-4F30-89D9-C7041EDFF3A9}"/>
               </a:ext>
             </a:extLst>
           </p:cNvPr>
@@ -1568,7 +1570,7 @@
           <p:cNvPr id="6" name="Marcador de número de diapositiva 5">
             <a:extLst>
               <a:ext uri="{FF2B5EF4-FFF2-40B4-BE49-F238E27FC236}">
-                <a16:creationId xmlns="" xmlns:a16="http://schemas.microsoft.com/office/drawing/2014/main" id="{AEF9F116-2681-4EA1-9E60-55AD19DF969D}"/>
+                <a16:creationId xmlns:a16="http://schemas.microsoft.com/office/drawing/2014/main" xmlns="" id="{AEF9F116-2681-4EA1-9E60-55AD19DF969D}"/>
               </a:ext>
             </a:extLst>
           </p:cNvPr>
@@ -1596,7 +1598,7 @@
     </p:spTree>
     <p:extLst>
       <p:ext uri="{BB962C8B-B14F-4D97-AF65-F5344CB8AC3E}">
-        <p14:creationId xmlns="" xmlns:p14="http://schemas.microsoft.com/office/powerpoint/2010/main" val="1782366122"/>
+        <p14:creationId xmlns:p14="http://schemas.microsoft.com/office/powerpoint/2010/main" xmlns="" val="1782366122"/>
       </p:ext>
     </p:extLst>
   </p:cSld>
@@ -1628,7 +1630,7 @@
           <p:cNvPr id="2" name="Título 1">
             <a:extLst>
               <a:ext uri="{FF2B5EF4-FFF2-40B4-BE49-F238E27FC236}">
-                <a16:creationId xmlns="" xmlns:a16="http://schemas.microsoft.com/office/drawing/2014/main" id="{0B9B5E15-EA85-4952-AAD5-114A1E4F2277}"/>
+                <a16:creationId xmlns:a16="http://schemas.microsoft.com/office/drawing/2014/main" xmlns="" id="{0B9B5E15-EA85-4952-AAD5-114A1E4F2277}"/>
               </a:ext>
             </a:extLst>
           </p:cNvPr>
@@ -1657,7 +1659,7 @@
           <p:cNvPr id="3" name="Marcador de contenido 2">
             <a:extLst>
               <a:ext uri="{FF2B5EF4-FFF2-40B4-BE49-F238E27FC236}">
-                <a16:creationId xmlns="" xmlns:a16="http://schemas.microsoft.com/office/drawing/2014/main" id="{03B3360A-3506-440D-9030-535B5E946B16}"/>
+                <a16:creationId xmlns:a16="http://schemas.microsoft.com/office/drawing/2014/main" xmlns="" id="{03B3360A-3506-440D-9030-535B5E946B16}"/>
               </a:ext>
             </a:extLst>
           </p:cNvPr>
@@ -1720,7 +1722,7 @@
           <p:cNvPr id="4" name="Marcador de contenido 3">
             <a:extLst>
               <a:ext uri="{FF2B5EF4-FFF2-40B4-BE49-F238E27FC236}">
-                <a16:creationId xmlns="" xmlns:a16="http://schemas.microsoft.com/office/drawing/2014/main" id="{EF604BF2-C3FE-474E-8D93-F9434B7D6ADF}"/>
+                <a16:creationId xmlns:a16="http://schemas.microsoft.com/office/drawing/2014/main" xmlns="" id="{EF604BF2-C3FE-474E-8D93-F9434B7D6ADF}"/>
               </a:ext>
             </a:extLst>
           </p:cNvPr>
@@ -1783,7 +1785,7 @@
           <p:cNvPr id="5" name="Marcador de fecha 4">
             <a:extLst>
               <a:ext uri="{FF2B5EF4-FFF2-40B4-BE49-F238E27FC236}">
-                <a16:creationId xmlns="" xmlns:a16="http://schemas.microsoft.com/office/drawing/2014/main" id="{7C61BC72-B3C9-4906-BF75-094CD50853BA}"/>
+                <a16:creationId xmlns:a16="http://schemas.microsoft.com/office/drawing/2014/main" xmlns="" id="{7C61BC72-B3C9-4906-BF75-094CD50853BA}"/>
               </a:ext>
             </a:extLst>
           </p:cNvPr>
@@ -1813,7 +1815,7 @@
           <p:cNvPr id="6" name="Marcador de pie de página 5">
             <a:extLst>
               <a:ext uri="{FF2B5EF4-FFF2-40B4-BE49-F238E27FC236}">
-                <a16:creationId xmlns="" xmlns:a16="http://schemas.microsoft.com/office/drawing/2014/main" id="{B7546B36-0031-4649-9C5E-642961A61F99}"/>
+                <a16:creationId xmlns:a16="http://schemas.microsoft.com/office/drawing/2014/main" xmlns="" id="{B7546B36-0031-4649-9C5E-642961A61F99}"/>
               </a:ext>
             </a:extLst>
           </p:cNvPr>
@@ -1838,7 +1840,7 @@
           <p:cNvPr id="7" name="Marcador de número de diapositiva 6">
             <a:extLst>
               <a:ext uri="{FF2B5EF4-FFF2-40B4-BE49-F238E27FC236}">
-                <a16:creationId xmlns="" xmlns:a16="http://schemas.microsoft.com/office/drawing/2014/main" id="{956A137E-5045-4A00-A55D-6613C58D39C0}"/>
+                <a16:creationId xmlns:a16="http://schemas.microsoft.com/office/drawing/2014/main" xmlns="" id="{956A137E-5045-4A00-A55D-6613C58D39C0}"/>
               </a:ext>
             </a:extLst>
           </p:cNvPr>
@@ -1866,7 +1868,7 @@
     </p:spTree>
     <p:extLst>
       <p:ext uri="{BB962C8B-B14F-4D97-AF65-F5344CB8AC3E}">
-        <p14:creationId xmlns="" xmlns:p14="http://schemas.microsoft.com/office/powerpoint/2010/main" val="613673700"/>
+        <p14:creationId xmlns:p14="http://schemas.microsoft.com/office/powerpoint/2010/main" xmlns="" val="613673700"/>
       </p:ext>
     </p:extLst>
   </p:cSld>
@@ -1898,7 +1900,7 @@
           <p:cNvPr id="2" name="Título 1">
             <a:extLst>
               <a:ext uri="{FF2B5EF4-FFF2-40B4-BE49-F238E27FC236}">
-                <a16:creationId xmlns="" xmlns:a16="http://schemas.microsoft.com/office/drawing/2014/main" id="{B8001C67-4205-4C3A-92D6-7C61DB649CB3}"/>
+                <a16:creationId xmlns:a16="http://schemas.microsoft.com/office/drawing/2014/main" xmlns="" id="{B8001C67-4205-4C3A-92D6-7C61DB649CB3}"/>
               </a:ext>
             </a:extLst>
           </p:cNvPr>
@@ -1932,7 +1934,7 @@
           <p:cNvPr id="3" name="Marcador de texto 2">
             <a:extLst>
               <a:ext uri="{FF2B5EF4-FFF2-40B4-BE49-F238E27FC236}">
-                <a16:creationId xmlns="" xmlns:a16="http://schemas.microsoft.com/office/drawing/2014/main" id="{A2098CAC-0F93-49E4-BB60-862C5E2DDA3F}"/>
+                <a16:creationId xmlns:a16="http://schemas.microsoft.com/office/drawing/2014/main" xmlns="" id="{A2098CAC-0F93-49E4-BB60-862C5E2DDA3F}"/>
               </a:ext>
             </a:extLst>
           </p:cNvPr>
@@ -2003,7 +2005,7 @@
           <p:cNvPr id="4" name="Marcador de contenido 3">
             <a:extLst>
               <a:ext uri="{FF2B5EF4-FFF2-40B4-BE49-F238E27FC236}">
-                <a16:creationId xmlns="" xmlns:a16="http://schemas.microsoft.com/office/drawing/2014/main" id="{935FA08F-F12D-4D6E-A8AF-E95A2DF3CA2A}"/>
+                <a16:creationId xmlns:a16="http://schemas.microsoft.com/office/drawing/2014/main" xmlns="" id="{935FA08F-F12D-4D6E-A8AF-E95A2DF3CA2A}"/>
               </a:ext>
             </a:extLst>
           </p:cNvPr>
@@ -2066,7 +2068,7 @@
           <p:cNvPr id="5" name="Marcador de texto 4">
             <a:extLst>
               <a:ext uri="{FF2B5EF4-FFF2-40B4-BE49-F238E27FC236}">
-                <a16:creationId xmlns="" xmlns:a16="http://schemas.microsoft.com/office/drawing/2014/main" id="{E80E78A4-3078-4458-B52C-9186E62F8533}"/>
+                <a16:creationId xmlns:a16="http://schemas.microsoft.com/office/drawing/2014/main" xmlns="" id="{E80E78A4-3078-4458-B52C-9186E62F8533}"/>
               </a:ext>
             </a:extLst>
           </p:cNvPr>
@@ -2137,7 +2139,7 @@
           <p:cNvPr id="6" name="Marcador de contenido 5">
             <a:extLst>
               <a:ext uri="{FF2B5EF4-FFF2-40B4-BE49-F238E27FC236}">
-                <a16:creationId xmlns="" xmlns:a16="http://schemas.microsoft.com/office/drawing/2014/main" id="{13E752C3-33A4-4CD0-B9E7-45DCBA81C8E6}"/>
+                <a16:creationId xmlns:a16="http://schemas.microsoft.com/office/drawing/2014/main" xmlns="" id="{13E752C3-33A4-4CD0-B9E7-45DCBA81C8E6}"/>
               </a:ext>
             </a:extLst>
           </p:cNvPr>
@@ -2200,7 +2202,7 @@
           <p:cNvPr id="7" name="Marcador de fecha 6">
             <a:extLst>
               <a:ext uri="{FF2B5EF4-FFF2-40B4-BE49-F238E27FC236}">
-                <a16:creationId xmlns="" xmlns:a16="http://schemas.microsoft.com/office/drawing/2014/main" id="{20A9343F-E6A6-4934-83BA-45E867390912}"/>
+                <a16:creationId xmlns:a16="http://schemas.microsoft.com/office/drawing/2014/main" xmlns="" id="{20A9343F-E6A6-4934-83BA-45E867390912}"/>
               </a:ext>
             </a:extLst>
           </p:cNvPr>
@@ -2230,7 +2232,7 @@
           <p:cNvPr id="8" name="Marcador de pie de página 7">
             <a:extLst>
               <a:ext uri="{FF2B5EF4-FFF2-40B4-BE49-F238E27FC236}">
-                <a16:creationId xmlns="" xmlns:a16="http://schemas.microsoft.com/office/drawing/2014/main" id="{7535E2D0-DE9C-42A1-8EB8-A9F0916D4D4B}"/>
+                <a16:creationId xmlns:a16="http://schemas.microsoft.com/office/drawing/2014/main" xmlns="" id="{7535E2D0-DE9C-42A1-8EB8-A9F0916D4D4B}"/>
               </a:ext>
             </a:extLst>
           </p:cNvPr>
@@ -2255,7 +2257,7 @@
           <p:cNvPr id="9" name="Marcador de número de diapositiva 8">
             <a:extLst>
               <a:ext uri="{FF2B5EF4-FFF2-40B4-BE49-F238E27FC236}">
-                <a16:creationId xmlns="" xmlns:a16="http://schemas.microsoft.com/office/drawing/2014/main" id="{A03FD6BA-2ACD-49BA-BEA1-46FD5E1C3266}"/>
+                <a16:creationId xmlns:a16="http://schemas.microsoft.com/office/drawing/2014/main" xmlns="" id="{A03FD6BA-2ACD-49BA-BEA1-46FD5E1C3266}"/>
               </a:ext>
             </a:extLst>
           </p:cNvPr>
@@ -2283,7 +2285,7 @@
     </p:spTree>
     <p:extLst>
       <p:ext uri="{BB962C8B-B14F-4D97-AF65-F5344CB8AC3E}">
-        <p14:creationId xmlns="" xmlns:p14="http://schemas.microsoft.com/office/powerpoint/2010/main" val="1450626424"/>
+        <p14:creationId xmlns:p14="http://schemas.microsoft.com/office/powerpoint/2010/main" xmlns="" val="1450626424"/>
       </p:ext>
     </p:extLst>
   </p:cSld>
@@ -2315,7 +2317,7 @@
           <p:cNvPr id="2" name="Título 1">
             <a:extLst>
               <a:ext uri="{FF2B5EF4-FFF2-40B4-BE49-F238E27FC236}">
-                <a16:creationId xmlns="" xmlns:a16="http://schemas.microsoft.com/office/drawing/2014/main" id="{0F25E007-4309-4DD0-8752-EAA0D2030A99}"/>
+                <a16:creationId xmlns:a16="http://schemas.microsoft.com/office/drawing/2014/main" xmlns="" id="{0F25E007-4309-4DD0-8752-EAA0D2030A99}"/>
               </a:ext>
             </a:extLst>
           </p:cNvPr>
@@ -2344,7 +2346,7 @@
           <p:cNvPr id="3" name="Marcador de fecha 2">
             <a:extLst>
               <a:ext uri="{FF2B5EF4-FFF2-40B4-BE49-F238E27FC236}">
-                <a16:creationId xmlns="" xmlns:a16="http://schemas.microsoft.com/office/drawing/2014/main" id="{9D05A6F8-2F0A-4EF4-BBCE-DB2F20A6B501}"/>
+                <a16:creationId xmlns:a16="http://schemas.microsoft.com/office/drawing/2014/main" xmlns="" id="{9D05A6F8-2F0A-4EF4-BBCE-DB2F20A6B501}"/>
               </a:ext>
             </a:extLst>
           </p:cNvPr>
@@ -2374,7 +2376,7 @@
           <p:cNvPr id="4" name="Marcador de pie de página 3">
             <a:extLst>
               <a:ext uri="{FF2B5EF4-FFF2-40B4-BE49-F238E27FC236}">
-                <a16:creationId xmlns="" xmlns:a16="http://schemas.microsoft.com/office/drawing/2014/main" id="{6B0A3A5D-3E4C-4774-8797-89BF671FE2ED}"/>
+                <a16:creationId xmlns:a16="http://schemas.microsoft.com/office/drawing/2014/main" xmlns="" id="{6B0A3A5D-3E4C-4774-8797-89BF671FE2ED}"/>
               </a:ext>
             </a:extLst>
           </p:cNvPr>
@@ -2399,7 +2401,7 @@
           <p:cNvPr id="5" name="Marcador de número de diapositiva 4">
             <a:extLst>
               <a:ext uri="{FF2B5EF4-FFF2-40B4-BE49-F238E27FC236}">
-                <a16:creationId xmlns="" xmlns:a16="http://schemas.microsoft.com/office/drawing/2014/main" id="{A48DCAAF-3D26-495F-A7AC-03D312DF328D}"/>
+                <a16:creationId xmlns:a16="http://schemas.microsoft.com/office/drawing/2014/main" xmlns="" id="{A48DCAAF-3D26-495F-A7AC-03D312DF328D}"/>
               </a:ext>
             </a:extLst>
           </p:cNvPr>
@@ -2427,7 +2429,7 @@
     </p:spTree>
     <p:extLst>
       <p:ext uri="{BB962C8B-B14F-4D97-AF65-F5344CB8AC3E}">
-        <p14:creationId xmlns="" xmlns:p14="http://schemas.microsoft.com/office/powerpoint/2010/main" val="666902052"/>
+        <p14:creationId xmlns:p14="http://schemas.microsoft.com/office/powerpoint/2010/main" xmlns="" val="666902052"/>
       </p:ext>
     </p:extLst>
   </p:cSld>
@@ -2459,7 +2461,7 @@
           <p:cNvPr id="2" name="Marcador de fecha 1">
             <a:extLst>
               <a:ext uri="{FF2B5EF4-FFF2-40B4-BE49-F238E27FC236}">
-                <a16:creationId xmlns="" xmlns:a16="http://schemas.microsoft.com/office/drawing/2014/main" id="{6F012BED-D5A4-460E-A953-A480237F21AF}"/>
+                <a16:creationId xmlns:a16="http://schemas.microsoft.com/office/drawing/2014/main" xmlns="" id="{6F012BED-D5A4-460E-A953-A480237F21AF}"/>
               </a:ext>
             </a:extLst>
           </p:cNvPr>
@@ -2489,7 +2491,7 @@
           <p:cNvPr id="3" name="Marcador de pie de página 2">
             <a:extLst>
               <a:ext uri="{FF2B5EF4-FFF2-40B4-BE49-F238E27FC236}">
-                <a16:creationId xmlns="" xmlns:a16="http://schemas.microsoft.com/office/drawing/2014/main" id="{6A0F9BEE-FFAF-44BF-994F-BD966EDDE86E}"/>
+                <a16:creationId xmlns:a16="http://schemas.microsoft.com/office/drawing/2014/main" xmlns="" id="{6A0F9BEE-FFAF-44BF-994F-BD966EDDE86E}"/>
               </a:ext>
             </a:extLst>
           </p:cNvPr>
@@ -2514,7 +2516,7 @@
           <p:cNvPr id="4" name="Marcador de número de diapositiva 3">
             <a:extLst>
               <a:ext uri="{FF2B5EF4-FFF2-40B4-BE49-F238E27FC236}">
-                <a16:creationId xmlns="" xmlns:a16="http://schemas.microsoft.com/office/drawing/2014/main" id="{B51312AE-CB8C-495B-914D-D6E50ECF7FDC}"/>
+                <a16:creationId xmlns:a16="http://schemas.microsoft.com/office/drawing/2014/main" xmlns="" id="{B51312AE-CB8C-495B-914D-D6E50ECF7FDC}"/>
               </a:ext>
             </a:extLst>
           </p:cNvPr>
@@ -2542,7 +2544,7 @@
     </p:spTree>
     <p:extLst>
       <p:ext uri="{BB962C8B-B14F-4D97-AF65-F5344CB8AC3E}">
-        <p14:creationId xmlns="" xmlns:p14="http://schemas.microsoft.com/office/powerpoint/2010/main" val="1002598647"/>
+        <p14:creationId xmlns:p14="http://schemas.microsoft.com/office/powerpoint/2010/main" xmlns="" val="1002598647"/>
       </p:ext>
     </p:extLst>
   </p:cSld>
@@ -2574,7 +2576,7 @@
           <p:cNvPr id="2" name="Título 1">
             <a:extLst>
               <a:ext uri="{FF2B5EF4-FFF2-40B4-BE49-F238E27FC236}">
-                <a16:creationId xmlns="" xmlns:a16="http://schemas.microsoft.com/office/drawing/2014/main" id="{BFC417D3-80B9-4701-B7AD-CDE3F2226176}"/>
+                <a16:creationId xmlns:a16="http://schemas.microsoft.com/office/drawing/2014/main" xmlns="" id="{BFC417D3-80B9-4701-B7AD-CDE3F2226176}"/>
               </a:ext>
             </a:extLst>
           </p:cNvPr>
@@ -2612,7 +2614,7 @@
           <p:cNvPr id="3" name="Marcador de contenido 2">
             <a:extLst>
               <a:ext uri="{FF2B5EF4-FFF2-40B4-BE49-F238E27FC236}">
-                <a16:creationId xmlns="" xmlns:a16="http://schemas.microsoft.com/office/drawing/2014/main" id="{AE43D5EC-C059-46EF-8D46-CBACEBCF7E83}"/>
+                <a16:creationId xmlns:a16="http://schemas.microsoft.com/office/drawing/2014/main" xmlns="" id="{AE43D5EC-C059-46EF-8D46-CBACEBCF7E83}"/>
               </a:ext>
             </a:extLst>
           </p:cNvPr>
@@ -2703,7 +2705,7 @@
           <p:cNvPr id="4" name="Marcador de texto 3">
             <a:extLst>
               <a:ext uri="{FF2B5EF4-FFF2-40B4-BE49-F238E27FC236}">
-                <a16:creationId xmlns="" xmlns:a16="http://schemas.microsoft.com/office/drawing/2014/main" id="{2D3BF213-48DF-408B-838D-989811B8C8E8}"/>
+                <a16:creationId xmlns:a16="http://schemas.microsoft.com/office/drawing/2014/main" xmlns="" id="{2D3BF213-48DF-408B-838D-989811B8C8E8}"/>
               </a:ext>
             </a:extLst>
           </p:cNvPr>
@@ -2774,7 +2776,7 @@
           <p:cNvPr id="5" name="Marcador de fecha 4">
             <a:extLst>
               <a:ext uri="{FF2B5EF4-FFF2-40B4-BE49-F238E27FC236}">
-                <a16:creationId xmlns="" xmlns:a16="http://schemas.microsoft.com/office/drawing/2014/main" id="{9310A5AC-654F-43F0-8F01-583BA182B948}"/>
+                <a16:creationId xmlns:a16="http://schemas.microsoft.com/office/drawing/2014/main" xmlns="" id="{9310A5AC-654F-43F0-8F01-583BA182B948}"/>
               </a:ext>
             </a:extLst>
           </p:cNvPr>
@@ -2804,7 +2806,7 @@
           <p:cNvPr id="6" name="Marcador de pie de página 5">
             <a:extLst>
               <a:ext uri="{FF2B5EF4-FFF2-40B4-BE49-F238E27FC236}">
-                <a16:creationId xmlns="" xmlns:a16="http://schemas.microsoft.com/office/drawing/2014/main" id="{8A0CEB51-9EA9-404A-87EB-17CBDE105BE7}"/>
+                <a16:creationId xmlns:a16="http://schemas.microsoft.com/office/drawing/2014/main" xmlns="" id="{8A0CEB51-9EA9-404A-87EB-17CBDE105BE7}"/>
               </a:ext>
             </a:extLst>
           </p:cNvPr>
@@ -2829,7 +2831,7 @@
           <p:cNvPr id="7" name="Marcador de número de diapositiva 6">
             <a:extLst>
               <a:ext uri="{FF2B5EF4-FFF2-40B4-BE49-F238E27FC236}">
-                <a16:creationId xmlns="" xmlns:a16="http://schemas.microsoft.com/office/drawing/2014/main" id="{537F7B3C-57BC-4612-855F-941E13E5EC33}"/>
+                <a16:creationId xmlns:a16="http://schemas.microsoft.com/office/drawing/2014/main" xmlns="" id="{537F7B3C-57BC-4612-855F-941E13E5EC33}"/>
               </a:ext>
             </a:extLst>
           </p:cNvPr>
@@ -2857,7 +2859,7 @@
     </p:spTree>
     <p:extLst>
       <p:ext uri="{BB962C8B-B14F-4D97-AF65-F5344CB8AC3E}">
-        <p14:creationId xmlns="" xmlns:p14="http://schemas.microsoft.com/office/powerpoint/2010/main" val="2240754405"/>
+        <p14:creationId xmlns:p14="http://schemas.microsoft.com/office/powerpoint/2010/main" xmlns="" val="2240754405"/>
       </p:ext>
     </p:extLst>
   </p:cSld>
@@ -2889,7 +2891,7 @@
           <p:cNvPr id="2" name="Título 1">
             <a:extLst>
               <a:ext uri="{FF2B5EF4-FFF2-40B4-BE49-F238E27FC236}">
-                <a16:creationId xmlns="" xmlns:a16="http://schemas.microsoft.com/office/drawing/2014/main" id="{422A434A-9BA4-46D0-A16D-E30C42B5EFB2}"/>
+                <a16:creationId xmlns:a16="http://schemas.microsoft.com/office/drawing/2014/main" xmlns="" id="{422A434A-9BA4-46D0-A16D-E30C42B5EFB2}"/>
               </a:ext>
             </a:extLst>
           </p:cNvPr>
@@ -2927,7 +2929,7 @@
           <p:cNvPr id="3" name="Marcador de posición de imagen 2">
             <a:extLst>
               <a:ext uri="{FF2B5EF4-FFF2-40B4-BE49-F238E27FC236}">
-                <a16:creationId xmlns="" xmlns:a16="http://schemas.microsoft.com/office/drawing/2014/main" id="{206D9D14-E2F4-40C6-9554-70FC65BDEBD3}"/>
+                <a16:creationId xmlns:a16="http://schemas.microsoft.com/office/drawing/2014/main" xmlns="" id="{206D9D14-E2F4-40C6-9554-70FC65BDEBD3}"/>
               </a:ext>
             </a:extLst>
           </p:cNvPr>
@@ -2994,7 +2996,7 @@
           <p:cNvPr id="4" name="Marcador de texto 3">
             <a:extLst>
               <a:ext uri="{FF2B5EF4-FFF2-40B4-BE49-F238E27FC236}">
-                <a16:creationId xmlns="" xmlns:a16="http://schemas.microsoft.com/office/drawing/2014/main" id="{36CA046C-B779-4CC8-8D3A-B166EC9724E7}"/>
+                <a16:creationId xmlns:a16="http://schemas.microsoft.com/office/drawing/2014/main" xmlns="" id="{36CA046C-B779-4CC8-8D3A-B166EC9724E7}"/>
               </a:ext>
             </a:extLst>
           </p:cNvPr>
@@ -3065,7 +3067,7 @@
           <p:cNvPr id="5" name="Marcador de fecha 4">
             <a:extLst>
               <a:ext uri="{FF2B5EF4-FFF2-40B4-BE49-F238E27FC236}">
-                <a16:creationId xmlns="" xmlns:a16="http://schemas.microsoft.com/office/drawing/2014/main" id="{1748E0F8-5E30-4258-989E-66807214C71E}"/>
+                <a16:creationId xmlns:a16="http://schemas.microsoft.com/office/drawing/2014/main" xmlns="" id="{1748E0F8-5E30-4258-989E-66807214C71E}"/>
               </a:ext>
             </a:extLst>
           </p:cNvPr>
@@ -3095,7 +3097,7 @@
           <p:cNvPr id="6" name="Marcador de pie de página 5">
             <a:extLst>
               <a:ext uri="{FF2B5EF4-FFF2-40B4-BE49-F238E27FC236}">
-                <a16:creationId xmlns="" xmlns:a16="http://schemas.microsoft.com/office/drawing/2014/main" id="{C4C1BA79-CAC8-4E5D-A7B4-6E7C047B210E}"/>
+                <a16:creationId xmlns:a16="http://schemas.microsoft.com/office/drawing/2014/main" xmlns="" id="{C4C1BA79-CAC8-4E5D-A7B4-6E7C047B210E}"/>
               </a:ext>
             </a:extLst>
           </p:cNvPr>
@@ -3120,7 +3122,7 @@
           <p:cNvPr id="7" name="Marcador de número de diapositiva 6">
             <a:extLst>
               <a:ext uri="{FF2B5EF4-FFF2-40B4-BE49-F238E27FC236}">
-                <a16:creationId xmlns="" xmlns:a16="http://schemas.microsoft.com/office/drawing/2014/main" id="{2CE2F116-8D27-481E-8A54-ABB00629ED08}"/>
+                <a16:creationId xmlns:a16="http://schemas.microsoft.com/office/drawing/2014/main" xmlns="" id="{2CE2F116-8D27-481E-8A54-ABB00629ED08}"/>
               </a:ext>
             </a:extLst>
           </p:cNvPr>
@@ -3148,7 +3150,7 @@
     </p:spTree>
     <p:extLst>
       <p:ext uri="{BB962C8B-B14F-4D97-AF65-F5344CB8AC3E}">
-        <p14:creationId xmlns="" xmlns:p14="http://schemas.microsoft.com/office/powerpoint/2010/main" val="2560774286"/>
+        <p14:creationId xmlns:p14="http://schemas.microsoft.com/office/powerpoint/2010/main" xmlns="" val="2560774286"/>
       </p:ext>
     </p:extLst>
   </p:cSld>
@@ -3185,7 +3187,7 @@
           <p:cNvPr id="2" name="Marcador de título 1">
             <a:extLst>
               <a:ext uri="{FF2B5EF4-FFF2-40B4-BE49-F238E27FC236}">
-                <a16:creationId xmlns="" xmlns:a16="http://schemas.microsoft.com/office/drawing/2014/main" id="{52DE0E5D-D112-411F-BD69-B4CEBFCC6709}"/>
+                <a16:creationId xmlns:a16="http://schemas.microsoft.com/office/drawing/2014/main" xmlns="" id="{52DE0E5D-D112-411F-BD69-B4CEBFCC6709}"/>
               </a:ext>
             </a:extLst>
           </p:cNvPr>
@@ -3224,7 +3226,7 @@
           <p:cNvPr id="3" name="Marcador de texto 2">
             <a:extLst>
               <a:ext uri="{FF2B5EF4-FFF2-40B4-BE49-F238E27FC236}">
-                <a16:creationId xmlns="" xmlns:a16="http://schemas.microsoft.com/office/drawing/2014/main" id="{CEAE0AF8-9B8F-4FED-AE73-BA55D3E4B886}"/>
+                <a16:creationId xmlns:a16="http://schemas.microsoft.com/office/drawing/2014/main" xmlns="" id="{CEAE0AF8-9B8F-4FED-AE73-BA55D3E4B886}"/>
               </a:ext>
             </a:extLst>
           </p:cNvPr>
@@ -3292,7 +3294,7 @@
           <p:cNvPr id="4" name="Marcador de fecha 3">
             <a:extLst>
               <a:ext uri="{FF2B5EF4-FFF2-40B4-BE49-F238E27FC236}">
-                <a16:creationId xmlns="" xmlns:a16="http://schemas.microsoft.com/office/drawing/2014/main" id="{3444712B-7900-41BC-AA8C-106865480EDA}"/>
+                <a16:creationId xmlns:a16="http://schemas.microsoft.com/office/drawing/2014/main" xmlns="" id="{3444712B-7900-41BC-AA8C-106865480EDA}"/>
               </a:ext>
             </a:extLst>
           </p:cNvPr>
@@ -3340,7 +3342,7 @@
           <p:cNvPr id="5" name="Marcador de pie de página 4">
             <a:extLst>
               <a:ext uri="{FF2B5EF4-FFF2-40B4-BE49-F238E27FC236}">
-                <a16:creationId xmlns="" xmlns:a16="http://schemas.microsoft.com/office/drawing/2014/main" id="{2373E149-596D-4E13-A8B4-BBB10A73719A}"/>
+                <a16:creationId xmlns:a16="http://schemas.microsoft.com/office/drawing/2014/main" xmlns="" id="{2373E149-596D-4E13-A8B4-BBB10A73719A}"/>
               </a:ext>
             </a:extLst>
           </p:cNvPr>
@@ -3383,7 +3385,7 @@
           <p:cNvPr id="6" name="Marcador de número de diapositiva 5">
             <a:extLst>
               <a:ext uri="{FF2B5EF4-FFF2-40B4-BE49-F238E27FC236}">
-                <a16:creationId xmlns="" xmlns:a16="http://schemas.microsoft.com/office/drawing/2014/main" id="{E6A242C2-85FC-44F2-A1B2-E82ACCFDFC75}"/>
+                <a16:creationId xmlns:a16="http://schemas.microsoft.com/office/drawing/2014/main" xmlns="" id="{E6A242C2-85FC-44F2-A1B2-E82ACCFDFC75}"/>
               </a:ext>
             </a:extLst>
           </p:cNvPr>
@@ -3429,7 +3431,7 @@
     </p:spTree>
     <p:extLst>
       <p:ext uri="{BB962C8B-B14F-4D97-AF65-F5344CB8AC3E}">
-        <p14:creationId xmlns="" xmlns:p14="http://schemas.microsoft.com/office/powerpoint/2010/main" val="1185042189"/>
+        <p14:creationId xmlns:p14="http://schemas.microsoft.com/office/powerpoint/2010/main" xmlns="" val="1185042189"/>
       </p:ext>
     </p:extLst>
   </p:cSld>
@@ -3753,7 +3755,7 @@
           <p:cNvPr id="2" name="Título 1">
             <a:extLst>
               <a:ext uri="{FF2B5EF4-FFF2-40B4-BE49-F238E27FC236}">
-                <a16:creationId xmlns="" xmlns:a16="http://schemas.microsoft.com/office/drawing/2014/main" id="{6E6E4FB4-8B78-4F75-A84F-759DAB023277}"/>
+                <a16:creationId xmlns:a16="http://schemas.microsoft.com/office/drawing/2014/main" xmlns="" id="{6E6E4FB4-8B78-4F75-A84F-759DAB023277}"/>
               </a:ext>
             </a:extLst>
           </p:cNvPr>
@@ -3802,7 +3804,7 @@
           <p:cNvPr id="3" name="Subtítulo 2">
             <a:extLst>
               <a:ext uri="{FF2B5EF4-FFF2-40B4-BE49-F238E27FC236}">
-                <a16:creationId xmlns="" xmlns:a16="http://schemas.microsoft.com/office/drawing/2014/main" id="{28EBACEA-7670-4DCB-9273-883D81114319}"/>
+                <a16:creationId xmlns:a16="http://schemas.microsoft.com/office/drawing/2014/main" xmlns="" id="{28EBACEA-7670-4DCB-9273-883D81114319}"/>
               </a:ext>
             </a:extLst>
           </p:cNvPr>
@@ -3851,7 +3853,7 @@
     </p:spTree>
     <p:extLst>
       <p:ext uri="{BB962C8B-B14F-4D97-AF65-F5344CB8AC3E}">
-        <p14:creationId xmlns:p14="http://schemas.microsoft.com/office/powerpoint/2010/main" xmlns="" val="938995131"/>
+        <p14:creationId xmlns="" xmlns:p14="http://schemas.microsoft.com/office/powerpoint/2010/main" val="938995131"/>
       </p:ext>
     </p:extLst>
   </p:cSld>
@@ -3878,47 +3880,9 @@
           <a:chExt cx="0" cy="0"/>
         </a:xfrm>
       </p:grpSpPr>
-      <p:sp>
-        <p:nvSpPr>
-          <p:cNvPr id="2" name="1 Título"/>
-          <p:cNvSpPr>
-            <a:spLocks noGrp="1"/>
-          </p:cNvSpPr>
-          <p:nvPr>
-            <p:ph type="title"/>
-          </p:nvPr>
-        </p:nvSpPr>
-        <p:spPr/>
-        <p:txBody>
-          <a:bodyPr/>
-          <a:lstStyle/>
-          <a:p>
-            <a:endParaRPr lang="en-US"/>
-          </a:p>
-        </p:txBody>
-      </p:sp>
-      <p:sp>
-        <p:nvSpPr>
-          <p:cNvPr id="3" name="2 Marcador de contenido"/>
-          <p:cNvSpPr>
-            <a:spLocks noGrp="1"/>
-          </p:cNvSpPr>
-          <p:nvPr>
-            <p:ph idx="1"/>
-          </p:nvPr>
-        </p:nvSpPr>
-        <p:spPr/>
-        <p:txBody>
-          <a:bodyPr/>
-          <a:lstStyle/>
-          <a:p>
-            <a:endParaRPr lang="en-US" dirty="0"/>
-          </a:p>
-        </p:txBody>
-      </p:sp>
       <p:pic>
         <p:nvPicPr>
-          <p:cNvPr id="1026" name="Picture 2"/>
+          <p:cNvPr id="17" name="Picture 4"/>
           <p:cNvPicPr>
             <a:picLocks noChangeAspect="1" noChangeArrowheads="1"/>
           </p:cNvPicPr>
@@ -3926,15 +3890,15 @@
         </p:nvPicPr>
         <p:blipFill>
           <a:blip r:embed="rId2"/>
-          <a:srcRect t="11877" r="9808" b="8632"/>
+          <a:srcRect/>
           <a:stretch>
             <a:fillRect/>
           </a:stretch>
         </p:blipFill>
         <p:spPr bwMode="auto">
           <a:xfrm>
-            <a:off x="0" y="-377371"/>
-            <a:ext cx="12100225" cy="6574972"/>
+            <a:off x="1127743" y="458689"/>
+            <a:ext cx="4235827" cy="6034457"/>
           </a:xfrm>
           <a:prstGeom prst="rect">
             <a:avLst/>
@@ -3951,10 +3915,10 @@
       </p:pic>
       <p:sp>
         <p:nvSpPr>
-          <p:cNvPr id="5" name="CuadroTexto 6">
-            <a:extLst>
-              <a:ext uri="{FF2B5EF4-FFF2-40B4-BE49-F238E27FC236}">
-                <a16:creationId xmlns="" xmlns:a16="http://schemas.microsoft.com/office/drawing/2014/main" id="{4C1428CB-200C-4FCD-994D-30D30253A07B}"/>
+          <p:cNvPr id="11" name="CuadroTexto 6">
+            <a:extLst>
+              <a:ext uri="{FF2B5EF4-FFF2-40B4-BE49-F238E27FC236}">
+                <a16:creationId xmlns:a16="http://schemas.microsoft.com/office/drawing/2014/main" xmlns="" id="{4C1428CB-200C-4FCD-994D-30D30253A07B}"/>
               </a:ext>
             </a:extLst>
           </p:cNvPr>
@@ -3963,8 +3927,8 @@
         </p:nvSpPr>
         <p:spPr>
           <a:xfrm>
-            <a:off x="3432292" y="1701681"/>
-            <a:ext cx="3505537" cy="923330"/>
+            <a:off x="309767" y="2949475"/>
+            <a:ext cx="1928461" cy="1477328"/>
           </a:xfrm>
           <a:prstGeom prst="rect">
             <a:avLst/>
@@ -3990,7 +3954,7 @@
             <a:pPr algn="just"/>
             <a:r>
               <a:rPr lang="es-CO" b="1" dirty="0" smtClean="0"/>
-              <a:t>En esta barra puedes escribir el nombre de tu canción favorita y aparecerá en segundos.</a:t>
+              <a:t>Acá vas a poder modificar los datos  que habías ingresado al registrarte.</a:t>
             </a:r>
             <a:endParaRPr lang="es-CO" b="1" dirty="0"/>
           </a:p>
@@ -3998,21 +3962,23 @@
       </p:sp>
       <p:sp>
         <p:nvSpPr>
-          <p:cNvPr id="9" name="8 Flecha abajo"/>
+          <p:cNvPr id="14" name="13 Elipse"/>
           <p:cNvSpPr/>
           <p:nvPr/>
         </p:nvSpPr>
         <p:spPr>
-          <a:xfrm rot="11537676">
-            <a:off x="3437736" y="236716"/>
-            <a:ext cx="551778" cy="1419236"/>
-          </a:xfrm>
-          <a:prstGeom prst="downArrow">
-            <a:avLst>
-              <a:gd name="adj1" fmla="val 31350"/>
-              <a:gd name="adj2" fmla="val 119870"/>
-            </a:avLst>
+          <a:xfrm>
+            <a:off x="600495" y="1719619"/>
+            <a:ext cx="1228299" cy="1173707"/>
+          </a:xfrm>
+          <a:prstGeom prst="ellipse">
+            <a:avLst/>
           </a:prstGeom>
+          <a:ln>
+            <a:solidFill>
+              <a:schemeClr val="tx1"/>
+            </a:solidFill>
+          </a:ln>
         </p:spPr>
         <p:style>
           <a:lnRef idx="2">
@@ -4035,13 +4001,215 @@
           <a:lstStyle/>
           <a:p>
             <a:pPr algn="ctr"/>
-            <a:endParaRPr lang="en-US"/>
-          </a:p>
-        </p:txBody>
-      </p:sp>
-      <p:sp>
-        <p:nvSpPr>
-          <p:cNvPr id="7" name="6 Marcador de número de diapositiva"/>
+            <a:r>
+              <a:rPr lang="en-US" sz="8800" b="1" dirty="0" smtClean="0">
+                <a:ln w="18415" cmpd="sng">
+                  <a:solidFill>
+                    <a:srgbClr val="FFFFFF"/>
+                  </a:solidFill>
+                  <a:prstDash val="solid"/>
+                </a:ln>
+                <a:solidFill>
+                  <a:srgbClr val="FFFFFF"/>
+                </a:solidFill>
+                <a:effectLst>
+                  <a:outerShdw blurRad="63500" dir="3600000" algn="tl" rotWithShape="0">
+                    <a:srgbClr val="000000">
+                      <a:alpha val="70000"/>
+                    </a:srgbClr>
+                  </a:outerShdw>
+                </a:effectLst>
+              </a:rPr>
+              <a:t>1</a:t>
+            </a:r>
+            <a:endParaRPr lang="en-US" b="1" dirty="0">
+              <a:ln w="18415" cmpd="sng">
+                <a:solidFill>
+                  <a:srgbClr val="FFFFFF"/>
+                </a:solidFill>
+                <a:prstDash val="solid"/>
+              </a:ln>
+              <a:solidFill>
+                <a:srgbClr val="FFFFFF"/>
+              </a:solidFill>
+              <a:effectLst>
+                <a:outerShdw blurRad="63500" dir="3600000" algn="tl" rotWithShape="0">
+                  <a:srgbClr val="000000">
+                    <a:alpha val="70000"/>
+                  </a:srgbClr>
+                </a:outerShdw>
+              </a:effectLst>
+            </a:endParaRPr>
+          </a:p>
+        </p:txBody>
+      </p:sp>
+      <p:pic>
+        <p:nvPicPr>
+          <p:cNvPr id="18" name="Picture 5"/>
+          <p:cNvPicPr>
+            <a:picLocks noChangeAspect="1" noChangeArrowheads="1"/>
+          </p:cNvPicPr>
+          <p:nvPr/>
+        </p:nvPicPr>
+        <p:blipFill>
+          <a:blip r:embed="rId3"/>
+          <a:srcRect/>
+          <a:stretch>
+            <a:fillRect/>
+          </a:stretch>
+        </p:blipFill>
+        <p:spPr bwMode="auto">
+          <a:xfrm>
+            <a:off x="6281254" y="477672"/>
+            <a:ext cx="4146649" cy="5964071"/>
+          </a:xfrm>
+          <a:prstGeom prst="rect">
+            <a:avLst/>
+          </a:prstGeom>
+          <a:noFill/>
+          <a:ln w="3175">
+            <a:solidFill>
+              <a:schemeClr val="tx1"/>
+            </a:solidFill>
+            <a:miter lim="800000"/>
+            <a:headEnd/>
+            <a:tailEnd/>
+          </a:ln>
+          <a:effectLst/>
+        </p:spPr>
+      </p:pic>
+      <p:sp>
+        <p:nvSpPr>
+          <p:cNvPr id="20" name="CuadroTexto 6">
+            <a:extLst>
+              <a:ext uri="{FF2B5EF4-FFF2-40B4-BE49-F238E27FC236}">
+                <a16:creationId xmlns:a16="http://schemas.microsoft.com/office/drawing/2014/main" xmlns="" id="{4C1428CB-200C-4FCD-994D-30D30253A07B}"/>
+              </a:ext>
+            </a:extLst>
+          </p:cNvPr>
+          <p:cNvSpPr txBox="1"/>
+          <p:nvPr/>
+        </p:nvSpPr>
+        <p:spPr>
+          <a:xfrm>
+            <a:off x="10388640" y="5300919"/>
+            <a:ext cx="1803360" cy="1200329"/>
+          </a:xfrm>
+          <a:prstGeom prst="rect">
+            <a:avLst/>
+          </a:prstGeom>
+          <a:solidFill>
+            <a:schemeClr val="accent1">
+              <a:lumMod val="20000"/>
+              <a:lumOff val="80000"/>
+            </a:schemeClr>
+          </a:solidFill>
+          <a:ln w="57150">
+            <a:solidFill>
+              <a:srgbClr val="00B0F0"/>
+            </a:solidFill>
+          </a:ln>
+        </p:spPr>
+        <p:txBody>
+          <a:bodyPr wrap="square" rtlCol="0">
+            <a:spAutoFit/>
+          </a:bodyPr>
+          <a:lstStyle/>
+          <a:p>
+            <a:r>
+              <a:rPr lang="es-CO" b="1" dirty="0" smtClean="0"/>
+              <a:t>Le das guardar y ya quedaran actualizados tus datos.</a:t>
+            </a:r>
+            <a:endParaRPr lang="es-CO" b="1" dirty="0"/>
+          </a:p>
+        </p:txBody>
+      </p:sp>
+      <p:sp>
+        <p:nvSpPr>
+          <p:cNvPr id="21" name="20 Elipse"/>
+          <p:cNvSpPr/>
+          <p:nvPr/>
+        </p:nvSpPr>
+        <p:spPr>
+          <a:xfrm>
+            <a:off x="9066916" y="5324903"/>
+            <a:ext cx="1228299" cy="1173707"/>
+          </a:xfrm>
+          <a:prstGeom prst="ellipse">
+            <a:avLst/>
+          </a:prstGeom>
+          <a:ln>
+            <a:solidFill>
+              <a:schemeClr val="tx1"/>
+            </a:solidFill>
+          </a:ln>
+        </p:spPr>
+        <p:style>
+          <a:lnRef idx="2">
+            <a:schemeClr val="accent1">
+              <a:shade val="50000"/>
+            </a:schemeClr>
+          </a:lnRef>
+          <a:fillRef idx="1">
+            <a:schemeClr val="accent1"/>
+          </a:fillRef>
+          <a:effectRef idx="0">
+            <a:schemeClr val="accent1"/>
+          </a:effectRef>
+          <a:fontRef idx="minor">
+            <a:schemeClr val="lt1"/>
+          </a:fontRef>
+        </p:style>
+        <p:txBody>
+          <a:bodyPr rtlCol="0" anchor="ctr"/>
+          <a:lstStyle/>
+          <a:p>
+            <a:pPr algn="ctr"/>
+            <a:r>
+              <a:rPr lang="en-US" sz="8800" b="1" dirty="0" smtClean="0">
+                <a:ln w="18415" cmpd="sng">
+                  <a:solidFill>
+                    <a:srgbClr val="FFFFFF"/>
+                  </a:solidFill>
+                  <a:prstDash val="solid"/>
+                </a:ln>
+                <a:solidFill>
+                  <a:srgbClr val="FFFFFF"/>
+                </a:solidFill>
+                <a:effectLst>
+                  <a:outerShdw blurRad="63500" dir="3600000" algn="tl" rotWithShape="0">
+                    <a:srgbClr val="000000">
+                      <a:alpha val="70000"/>
+                    </a:srgbClr>
+                  </a:outerShdw>
+                </a:effectLst>
+              </a:rPr>
+              <a:t>2</a:t>
+            </a:r>
+            <a:endParaRPr lang="en-US" b="1" dirty="0">
+              <a:ln w="18415" cmpd="sng">
+                <a:solidFill>
+                  <a:srgbClr val="FFFFFF"/>
+                </a:solidFill>
+                <a:prstDash val="solid"/>
+              </a:ln>
+              <a:solidFill>
+                <a:srgbClr val="FFFFFF"/>
+              </a:solidFill>
+              <a:effectLst>
+                <a:outerShdw blurRad="63500" dir="3600000" algn="tl" rotWithShape="0">
+                  <a:srgbClr val="000000">
+                    <a:alpha val="70000"/>
+                  </a:srgbClr>
+                </a:outerShdw>
+              </a:effectLst>
+            </a:endParaRPr>
+          </a:p>
+        </p:txBody>
+      </p:sp>
+      <p:sp>
+        <p:nvSpPr>
+          <p:cNvPr id="8" name="7 Marcador de número de diapositiva"/>
           <p:cNvSpPr>
             <a:spLocks noGrp="1"/>
           </p:cNvSpPr>
@@ -4060,6 +4228,46 @@
               <a:t>10</a:t>
             </a:fld>
             <a:endParaRPr lang="es-CO"/>
+          </a:p>
+        </p:txBody>
+      </p:sp>
+      <p:sp>
+        <p:nvSpPr>
+          <p:cNvPr id="9" name="8 Flecha derecha"/>
+          <p:cNvSpPr/>
+          <p:nvPr/>
+        </p:nvSpPr>
+        <p:spPr>
+          <a:xfrm>
+            <a:off x="5473337" y="2991394"/>
+            <a:ext cx="666206" cy="496389"/>
+          </a:xfrm>
+          <a:prstGeom prst="rightArrow">
+            <a:avLst/>
+          </a:prstGeom>
+        </p:spPr>
+        <p:style>
+          <a:lnRef idx="2">
+            <a:schemeClr val="accent1">
+              <a:shade val="50000"/>
+            </a:schemeClr>
+          </a:lnRef>
+          <a:fillRef idx="1">
+            <a:schemeClr val="accent1"/>
+          </a:fillRef>
+          <a:effectRef idx="0">
+            <a:schemeClr val="accent1"/>
+          </a:effectRef>
+          <a:fontRef idx="minor">
+            <a:schemeClr val="lt1"/>
+          </a:fontRef>
+        </p:style>
+        <p:txBody>
+          <a:bodyPr rtlCol="0" anchor="ctr"/>
+          <a:lstStyle/>
+          <a:p>
+            <a:pPr algn="ctr"/>
+            <a:endParaRPr lang="en-US"/>
           </a:p>
         </p:txBody>
       </p:sp>
@@ -4088,28 +4296,9 @@
           <a:chExt cx="0" cy="0"/>
         </a:xfrm>
       </p:grpSpPr>
-      <p:sp>
-        <p:nvSpPr>
-          <p:cNvPr id="3" name="2 Marcador de contenido"/>
-          <p:cNvSpPr>
-            <a:spLocks noGrp="1"/>
-          </p:cNvSpPr>
-          <p:nvPr>
-            <p:ph idx="1"/>
-          </p:nvPr>
-        </p:nvSpPr>
-        <p:spPr/>
-        <p:txBody>
-          <a:bodyPr/>
-          <a:lstStyle/>
-          <a:p>
-            <a:endParaRPr lang="en-US"/>
-          </a:p>
-        </p:txBody>
-      </p:sp>
       <p:pic>
         <p:nvPicPr>
-          <p:cNvPr id="2050" name="Picture 2"/>
+          <p:cNvPr id="3080" name="Picture 8"/>
           <p:cNvPicPr>
             <a:picLocks noChangeAspect="1" noChangeArrowheads="1"/>
           </p:cNvPicPr>
@@ -4117,15 +4306,15 @@
         </p:nvPicPr>
         <p:blipFill>
           <a:blip r:embed="rId2"/>
-          <a:srcRect t="13095" r="3507" b="9722"/>
+          <a:srcRect/>
           <a:stretch>
             <a:fillRect/>
           </a:stretch>
         </p:blipFill>
         <p:spPr bwMode="auto">
           <a:xfrm>
-            <a:off x="0" y="493486"/>
-            <a:ext cx="12192000" cy="6364513"/>
+            <a:off x="5036024" y="315191"/>
+            <a:ext cx="4080680" cy="6373434"/>
           </a:xfrm>
           <a:prstGeom prst="rect">
             <a:avLst/>
@@ -4142,10 +4331,10 @@
       </p:pic>
       <p:sp>
         <p:nvSpPr>
-          <p:cNvPr id="5" name="CuadroTexto 6">
-            <a:extLst>
-              <a:ext uri="{FF2B5EF4-FFF2-40B4-BE49-F238E27FC236}">
-                <a16:creationId xmlns="" xmlns:a16="http://schemas.microsoft.com/office/drawing/2014/main" id="{4C1428CB-200C-4FCD-994D-30D30253A07B}"/>
+          <p:cNvPr id="8" name="CuadroTexto 6">
+            <a:extLst>
+              <a:ext uri="{FF2B5EF4-FFF2-40B4-BE49-F238E27FC236}">
+                <a16:creationId xmlns:a16="http://schemas.microsoft.com/office/drawing/2014/main" xmlns="" id="{4C1428CB-200C-4FCD-994D-30D30253A07B}"/>
               </a:ext>
             </a:extLst>
           </p:cNvPr>
@@ -4154,8 +4343,8 @@
         </p:nvSpPr>
         <p:spPr>
           <a:xfrm>
-            <a:off x="1544115" y="3102972"/>
-            <a:ext cx="3505537" cy="1754326"/>
+            <a:off x="3298626" y="3317964"/>
+            <a:ext cx="1928461" cy="1477328"/>
           </a:xfrm>
           <a:prstGeom prst="rect">
             <a:avLst/>
@@ -4178,31 +4367,33 @@
           </a:bodyPr>
           <a:lstStyle/>
           <a:p>
-            <a:pPr algn="just"/>
             <a:r>
               <a:rPr lang="es-CO" b="1" dirty="0" smtClean="0"/>
-              <a:t>En este menú a tu izquierda, vas a encontrar todas las categorías de música disponibles, puedes darle click a la que mas te guste y te cargaran los mejores videos de esa categoría.</a:t>
-            </a:r>
-          </a:p>
-        </p:txBody>
-      </p:sp>
-      <p:sp>
-        <p:nvSpPr>
-          <p:cNvPr id="6" name="5 Flecha abajo"/>
+              <a:t>Así quedaran tus datos, los puedes modificar y actualizar cuantas veces necesites.</a:t>
+            </a:r>
+            <a:endParaRPr lang="es-CO" b="1" dirty="0"/>
+          </a:p>
+        </p:txBody>
+      </p:sp>
+      <p:sp>
+        <p:nvSpPr>
+          <p:cNvPr id="10" name="9 Elipse"/>
           <p:cNvSpPr/>
           <p:nvPr/>
         </p:nvSpPr>
         <p:spPr>
-          <a:xfrm rot="10382648">
-            <a:off x="1371428" y="1661755"/>
-            <a:ext cx="551778" cy="1419236"/>
-          </a:xfrm>
-          <a:prstGeom prst="downArrow">
-            <a:avLst>
-              <a:gd name="adj1" fmla="val 31350"/>
-              <a:gd name="adj2" fmla="val 119870"/>
-            </a:avLst>
+          <a:xfrm>
+            <a:off x="3589354" y="2088108"/>
+            <a:ext cx="1228299" cy="1173707"/>
+          </a:xfrm>
+          <a:prstGeom prst="ellipse">
+            <a:avLst/>
           </a:prstGeom>
+          <a:ln>
+            <a:solidFill>
+              <a:schemeClr val="tx1"/>
+            </a:solidFill>
+          </a:ln>
         </p:spPr>
         <p:style>
           <a:lnRef idx="2">
@@ -4225,13 +4416,77 @@
           <a:lstStyle/>
           <a:p>
             <a:pPr algn="ctr"/>
-            <a:endParaRPr lang="en-US"/>
-          </a:p>
-        </p:txBody>
-      </p:sp>
-      <p:sp>
-        <p:nvSpPr>
-          <p:cNvPr id="7" name="6 Marcador de número de diapositiva"/>
+            <a:r>
+              <a:rPr lang="en-US" sz="8800" b="1" dirty="0" smtClean="0">
+                <a:ln w="18415" cmpd="sng">
+                  <a:solidFill>
+                    <a:srgbClr val="FFFFFF"/>
+                  </a:solidFill>
+                  <a:prstDash val="solid"/>
+                </a:ln>
+                <a:solidFill>
+                  <a:srgbClr val="FFFFFF"/>
+                </a:solidFill>
+                <a:effectLst>
+                  <a:outerShdw blurRad="63500" dir="3600000" algn="tl" rotWithShape="0">
+                    <a:srgbClr val="000000">
+                      <a:alpha val="70000"/>
+                    </a:srgbClr>
+                  </a:outerShdw>
+                </a:effectLst>
+              </a:rPr>
+              <a:t>3</a:t>
+            </a:r>
+            <a:endParaRPr lang="en-US" b="1" dirty="0">
+              <a:ln w="18415" cmpd="sng">
+                <a:solidFill>
+                  <a:srgbClr val="FFFFFF"/>
+                </a:solidFill>
+                <a:prstDash val="solid"/>
+              </a:ln>
+              <a:solidFill>
+                <a:srgbClr val="FFFFFF"/>
+              </a:solidFill>
+              <a:effectLst>
+                <a:outerShdw blurRad="63500" dir="3600000" algn="tl" rotWithShape="0">
+                  <a:srgbClr val="000000">
+                    <a:alpha val="70000"/>
+                  </a:srgbClr>
+                </a:outerShdw>
+              </a:effectLst>
+            </a:endParaRPr>
+          </a:p>
+        </p:txBody>
+      </p:sp>
+      <p:pic>
+        <p:nvPicPr>
+          <p:cNvPr id="1026" name="Picture 2" descr="C:\Users\luzgo\Desktop\PlayWeb-BICTIA\img\usuaria22.png"/>
+          <p:cNvPicPr>
+            <a:picLocks noChangeAspect="1" noChangeArrowheads="1"/>
+          </p:cNvPicPr>
+          <p:nvPr/>
+        </p:nvPicPr>
+        <p:blipFill>
+          <a:blip r:embed="rId3" cstate="print"/>
+          <a:srcRect/>
+          <a:stretch>
+            <a:fillRect/>
+          </a:stretch>
+        </p:blipFill>
+        <p:spPr bwMode="auto">
+          <a:xfrm>
+            <a:off x="6527631" y="1384660"/>
+            <a:ext cx="1194693" cy="1267099"/>
+          </a:xfrm>
+          <a:prstGeom prst="rect">
+            <a:avLst/>
+          </a:prstGeom>
+          <a:noFill/>
+        </p:spPr>
+      </p:pic>
+      <p:sp>
+        <p:nvSpPr>
+          <p:cNvPr id="6" name="5 Marcador de número de diapositiva"/>
           <p:cNvSpPr>
             <a:spLocks noGrp="1"/>
           </p:cNvSpPr>
@@ -4280,12 +4535,12 @@
       </p:grpSpPr>
       <p:sp>
         <p:nvSpPr>
-          <p:cNvPr id="2" name="1 Marcador de número de diapositiva"/>
-          <p:cNvSpPr>
-            <a:spLocks noGrp="1"/>
-          </p:cNvSpPr>
-          <p:nvPr>
-            <p:ph type="sldNum" sz="quarter" idx="12"/>
+          <p:cNvPr id="2" name="1 Título"/>
+          <p:cNvSpPr>
+            <a:spLocks noGrp="1"/>
+          </p:cNvSpPr>
+          <p:nvPr>
+            <p:ph type="title"/>
           </p:nvPr>
         </p:nvSpPr>
         <p:spPr/>
@@ -4293,18 +4548,32 @@
           <a:bodyPr/>
           <a:lstStyle/>
           <a:p>
-            <a:fld id="{E0424837-0642-404A-AA2B-7540A8D7DF1F}" type="slidenum">
-              <a:rPr lang="es-CO" smtClean="0"/>
-              <a:pPr/>
-              <a:t>12</a:t>
-            </a:fld>
-            <a:endParaRPr lang="es-CO"/>
+            <a:endParaRPr lang="en-US"/>
+          </a:p>
+        </p:txBody>
+      </p:sp>
+      <p:sp>
+        <p:nvSpPr>
+          <p:cNvPr id="3" name="2 Marcador de contenido"/>
+          <p:cNvSpPr>
+            <a:spLocks noGrp="1"/>
+          </p:cNvSpPr>
+          <p:nvPr>
+            <p:ph idx="1"/>
+          </p:nvPr>
+        </p:nvSpPr>
+        <p:spPr/>
+        <p:txBody>
+          <a:bodyPr/>
+          <a:lstStyle/>
+          <a:p>
+            <a:endParaRPr lang="en-US" dirty="0"/>
           </a:p>
         </p:txBody>
       </p:sp>
       <p:pic>
         <p:nvPicPr>
-          <p:cNvPr id="4098" name="Picture 2"/>
+          <p:cNvPr id="1026" name="Picture 2"/>
           <p:cNvPicPr>
             <a:picLocks noChangeAspect="1" noChangeArrowheads="1"/>
           </p:cNvPicPr>
@@ -4312,15 +4581,15 @@
         </p:nvPicPr>
         <p:blipFill>
           <a:blip r:embed="rId2"/>
-          <a:srcRect/>
+          <a:srcRect t="11877" r="9808" b="8632"/>
           <a:stretch>
             <a:fillRect/>
           </a:stretch>
         </p:blipFill>
         <p:spPr bwMode="auto">
           <a:xfrm>
-            <a:off x="0" y="607423"/>
-            <a:ext cx="8743950" cy="5486400"/>
+            <a:off x="0" y="-377371"/>
+            <a:ext cx="12100225" cy="6574972"/>
           </a:xfrm>
           <a:prstGeom prst="rect">
             <a:avLst/>
@@ -4337,23 +4606,68 @@
       </p:pic>
       <p:sp>
         <p:nvSpPr>
-          <p:cNvPr id="6" name="5 Flecha derecha"/>
+          <p:cNvPr id="5" name="CuadroTexto 6">
+            <a:extLst>
+              <a:ext uri="{FF2B5EF4-FFF2-40B4-BE49-F238E27FC236}">
+                <a16:creationId xmlns:a16="http://schemas.microsoft.com/office/drawing/2014/main" xmlns="" id="{4C1428CB-200C-4FCD-994D-30D30253A07B}"/>
+              </a:ext>
+            </a:extLst>
+          </p:cNvPr>
+          <p:cNvSpPr txBox="1"/>
+          <p:nvPr/>
+        </p:nvSpPr>
+        <p:spPr>
+          <a:xfrm>
+            <a:off x="3432292" y="1701681"/>
+            <a:ext cx="3505537" cy="923330"/>
+          </a:xfrm>
+          <a:prstGeom prst="rect">
+            <a:avLst/>
+          </a:prstGeom>
+          <a:solidFill>
+            <a:schemeClr val="accent1">
+              <a:lumMod val="20000"/>
+              <a:lumOff val="80000"/>
+            </a:schemeClr>
+          </a:solidFill>
+          <a:ln w="57150">
+            <a:solidFill>
+              <a:srgbClr val="00B0F0"/>
+            </a:solidFill>
+          </a:ln>
+        </p:spPr>
+        <p:txBody>
+          <a:bodyPr wrap="square" rtlCol="0">
+            <a:spAutoFit/>
+          </a:bodyPr>
+          <a:lstStyle/>
+          <a:p>
+            <a:pPr algn="just"/>
+            <a:r>
+              <a:rPr lang="es-CO" b="1" dirty="0" smtClean="0"/>
+              <a:t>En esta barra puedes escribir el nombre de tu canción favorita y aparecerá en segundos.</a:t>
+            </a:r>
+            <a:endParaRPr lang="es-CO" b="1" dirty="0"/>
+          </a:p>
+        </p:txBody>
+      </p:sp>
+      <p:sp>
+        <p:nvSpPr>
+          <p:cNvPr id="9" name="8 Flecha abajo"/>
           <p:cNvSpPr/>
           <p:nvPr/>
         </p:nvSpPr>
         <p:spPr>
-          <a:xfrm rot="12616214">
-            <a:off x="6976716" y="2559087"/>
-            <a:ext cx="1527678" cy="496389"/>
-          </a:xfrm>
-          <a:prstGeom prst="rightArrow">
-            <a:avLst/>
+          <a:xfrm rot="11537676">
+            <a:off x="3437736" y="236716"/>
+            <a:ext cx="551778" cy="1419236"/>
+          </a:xfrm>
+          <a:prstGeom prst="downArrow">
+            <a:avLst>
+              <a:gd name="adj1" fmla="val 31350"/>
+              <a:gd name="adj2" fmla="val 119870"/>
+            </a:avLst>
           </a:prstGeom>
-          <a:ln>
-            <a:solidFill>
-              <a:schemeClr val="bg1"/>
-            </a:solidFill>
-          </a:ln>
         </p:spPr>
         <p:style>
           <a:lnRef idx="2">
@@ -4382,48 +4696,25 @@
       </p:sp>
       <p:sp>
         <p:nvSpPr>
-          <p:cNvPr id="8" name="CuadroTexto 6">
-            <a:extLst>
-              <a:ext uri="{FF2B5EF4-FFF2-40B4-BE49-F238E27FC236}">
-                <a16:creationId xmlns="" xmlns:a16="http://schemas.microsoft.com/office/drawing/2014/main" id="{4C1428CB-200C-4FCD-994D-30D30253A07B}"/>
-              </a:ext>
-            </a:extLst>
-          </p:cNvPr>
-          <p:cNvSpPr txBox="1"/>
-          <p:nvPr/>
-        </p:nvSpPr>
-        <p:spPr>
-          <a:xfrm>
-            <a:off x="8435366" y="2968779"/>
-            <a:ext cx="3505537" cy="646331"/>
-          </a:xfrm>
-          <a:prstGeom prst="rect">
-            <a:avLst/>
-          </a:prstGeom>
-          <a:solidFill>
-            <a:schemeClr val="accent1">
-              <a:lumMod val="20000"/>
-              <a:lumOff val="80000"/>
-            </a:schemeClr>
-          </a:solidFill>
-          <a:ln w="57150">
-            <a:solidFill>
-              <a:srgbClr val="00B0F0"/>
-            </a:solidFill>
-          </a:ln>
-        </p:spPr>
-        <p:txBody>
-          <a:bodyPr wrap="square" rtlCol="0">
-            <a:spAutoFit/>
-          </a:bodyPr>
-          <a:lstStyle/>
-          <a:p>
-            <a:pPr algn="just"/>
-            <a:r>
-              <a:rPr lang="es-CO" b="1" dirty="0" smtClean="0"/>
-              <a:t>Al dar click en el titulo de video podrás entrar a su página </a:t>
-            </a:r>
-            <a:endParaRPr lang="es-CO" b="1" dirty="0" smtClean="0"/>
+          <p:cNvPr id="7" name="6 Marcador de número de diapositiva"/>
+          <p:cNvSpPr>
+            <a:spLocks noGrp="1"/>
+          </p:cNvSpPr>
+          <p:nvPr>
+            <p:ph type="sldNum" sz="quarter" idx="12"/>
+          </p:nvPr>
+        </p:nvSpPr>
+        <p:spPr/>
+        <p:txBody>
+          <a:bodyPr/>
+          <a:lstStyle/>
+          <a:p>
+            <a:fld id="{E0424837-0642-404A-AA2B-7540A8D7DF1F}" type="slidenum">
+              <a:rPr lang="es-CO" smtClean="0"/>
+              <a:pPr/>
+              <a:t>12</a:t>
+            </a:fld>
+            <a:endParaRPr lang="es-CO"/>
           </a:p>
         </p:txBody>
       </p:sp>
@@ -4454,7 +4745,148 @@
       </p:grpSpPr>
       <p:sp>
         <p:nvSpPr>
-          <p:cNvPr id="2" name="1 Marcador de número de diapositiva"/>
+          <p:cNvPr id="3" name="2 Marcador de contenido"/>
+          <p:cNvSpPr>
+            <a:spLocks noGrp="1"/>
+          </p:cNvSpPr>
+          <p:nvPr>
+            <p:ph idx="1"/>
+          </p:nvPr>
+        </p:nvSpPr>
+        <p:spPr/>
+        <p:txBody>
+          <a:bodyPr/>
+          <a:lstStyle/>
+          <a:p>
+            <a:endParaRPr lang="en-US"/>
+          </a:p>
+        </p:txBody>
+      </p:sp>
+      <p:pic>
+        <p:nvPicPr>
+          <p:cNvPr id="2050" name="Picture 2"/>
+          <p:cNvPicPr>
+            <a:picLocks noChangeAspect="1" noChangeArrowheads="1"/>
+          </p:cNvPicPr>
+          <p:nvPr/>
+        </p:nvPicPr>
+        <p:blipFill>
+          <a:blip r:embed="rId2"/>
+          <a:srcRect t="13095" r="3507" b="9722"/>
+          <a:stretch>
+            <a:fillRect/>
+          </a:stretch>
+        </p:blipFill>
+        <p:spPr bwMode="auto">
+          <a:xfrm>
+            <a:off x="0" y="493486"/>
+            <a:ext cx="12192000" cy="6364513"/>
+          </a:xfrm>
+          <a:prstGeom prst="rect">
+            <a:avLst/>
+          </a:prstGeom>
+          <a:noFill/>
+          <a:ln w="9525">
+            <a:noFill/>
+            <a:miter lim="800000"/>
+            <a:headEnd/>
+            <a:tailEnd/>
+          </a:ln>
+          <a:effectLst/>
+        </p:spPr>
+      </p:pic>
+      <p:sp>
+        <p:nvSpPr>
+          <p:cNvPr id="5" name="CuadroTexto 6">
+            <a:extLst>
+              <a:ext uri="{FF2B5EF4-FFF2-40B4-BE49-F238E27FC236}">
+                <a16:creationId xmlns:a16="http://schemas.microsoft.com/office/drawing/2014/main" xmlns="" id="{4C1428CB-200C-4FCD-994D-30D30253A07B}"/>
+              </a:ext>
+            </a:extLst>
+          </p:cNvPr>
+          <p:cNvSpPr txBox="1"/>
+          <p:nvPr/>
+        </p:nvSpPr>
+        <p:spPr>
+          <a:xfrm>
+            <a:off x="1544115" y="3102972"/>
+            <a:ext cx="3505537" cy="1754326"/>
+          </a:xfrm>
+          <a:prstGeom prst="rect">
+            <a:avLst/>
+          </a:prstGeom>
+          <a:solidFill>
+            <a:schemeClr val="accent1">
+              <a:lumMod val="20000"/>
+              <a:lumOff val="80000"/>
+            </a:schemeClr>
+          </a:solidFill>
+          <a:ln w="57150">
+            <a:solidFill>
+              <a:srgbClr val="00B0F0"/>
+            </a:solidFill>
+          </a:ln>
+        </p:spPr>
+        <p:txBody>
+          <a:bodyPr wrap="square" rtlCol="0">
+            <a:spAutoFit/>
+          </a:bodyPr>
+          <a:lstStyle/>
+          <a:p>
+            <a:pPr algn="just"/>
+            <a:r>
+              <a:rPr lang="es-CO" b="1" dirty="0" smtClean="0"/>
+              <a:t>En este menú a tu izquierda, vas a encontrar todas las categorías de música disponibles, puedes darle click a la que mas te guste y te cargaran los mejores videos de esa categoría.</a:t>
+            </a:r>
+          </a:p>
+        </p:txBody>
+      </p:sp>
+      <p:sp>
+        <p:nvSpPr>
+          <p:cNvPr id="6" name="5 Flecha abajo"/>
+          <p:cNvSpPr/>
+          <p:nvPr/>
+        </p:nvSpPr>
+        <p:spPr>
+          <a:xfrm rot="10382648">
+            <a:off x="1371428" y="1661755"/>
+            <a:ext cx="551778" cy="1419236"/>
+          </a:xfrm>
+          <a:prstGeom prst="downArrow">
+            <a:avLst>
+              <a:gd name="adj1" fmla="val 31350"/>
+              <a:gd name="adj2" fmla="val 119870"/>
+            </a:avLst>
+          </a:prstGeom>
+        </p:spPr>
+        <p:style>
+          <a:lnRef idx="2">
+            <a:schemeClr val="accent1">
+              <a:shade val="50000"/>
+            </a:schemeClr>
+          </a:lnRef>
+          <a:fillRef idx="1">
+            <a:schemeClr val="accent1"/>
+          </a:fillRef>
+          <a:effectRef idx="0">
+            <a:schemeClr val="accent1"/>
+          </a:effectRef>
+          <a:fontRef idx="minor">
+            <a:schemeClr val="lt1"/>
+          </a:fontRef>
+        </p:style>
+        <p:txBody>
+          <a:bodyPr rtlCol="0" anchor="ctr"/>
+          <a:lstStyle/>
+          <a:p>
+            <a:pPr algn="ctr"/>
+            <a:endParaRPr lang="en-US"/>
+          </a:p>
+        </p:txBody>
+      </p:sp>
+      <p:sp>
+        <p:nvSpPr>
+          <p:cNvPr id="7" name="6 Marcador de número de diapositiva"/>
           <p:cNvSpPr>
             <a:spLocks noGrp="1"/>
           </p:cNvSpPr>
@@ -4471,6 +4903,228 @@
               <a:rPr lang="es-CO" smtClean="0"/>
               <a:pPr/>
               <a:t>13</a:t>
+            </a:fld>
+            <a:endParaRPr lang="es-CO"/>
+          </a:p>
+        </p:txBody>
+      </p:sp>
+    </p:spTree>
+  </p:cSld>
+  <p:clrMapOvr>
+    <a:masterClrMapping/>
+  </p:clrMapOvr>
+</p:sld>
+</file>
+
+<file path=ppt/slides/slide14.xml><?xml version="1.0" encoding="utf-8"?>
+<p:sld xmlns:a="http://schemas.openxmlformats.org/drawingml/2006/main" xmlns:r="http://schemas.openxmlformats.org/officeDocument/2006/relationships" xmlns:p="http://schemas.openxmlformats.org/presentationml/2006/main">
+  <p:cSld>
+    <p:spTree>
+      <p:nvGrpSpPr>
+        <p:cNvPr id="1" name=""/>
+        <p:cNvGrpSpPr/>
+        <p:nvPr/>
+      </p:nvGrpSpPr>
+      <p:grpSpPr>
+        <a:xfrm>
+          <a:off x="0" y="0"/>
+          <a:ext cx="0" cy="0"/>
+          <a:chOff x="0" y="0"/>
+          <a:chExt cx="0" cy="0"/>
+        </a:xfrm>
+      </p:grpSpPr>
+      <p:sp>
+        <p:nvSpPr>
+          <p:cNvPr id="2" name="1 Marcador de número de diapositiva"/>
+          <p:cNvSpPr>
+            <a:spLocks noGrp="1"/>
+          </p:cNvSpPr>
+          <p:nvPr>
+            <p:ph type="sldNum" sz="quarter" idx="12"/>
+          </p:nvPr>
+        </p:nvSpPr>
+        <p:spPr/>
+        <p:txBody>
+          <a:bodyPr/>
+          <a:lstStyle/>
+          <a:p>
+            <a:fld id="{E0424837-0642-404A-AA2B-7540A8D7DF1F}" type="slidenum">
+              <a:rPr lang="es-CO" smtClean="0"/>
+              <a:pPr/>
+              <a:t>14</a:t>
+            </a:fld>
+            <a:endParaRPr lang="es-CO"/>
+          </a:p>
+        </p:txBody>
+      </p:sp>
+      <p:pic>
+        <p:nvPicPr>
+          <p:cNvPr id="4098" name="Picture 2"/>
+          <p:cNvPicPr>
+            <a:picLocks noChangeAspect="1" noChangeArrowheads="1"/>
+          </p:cNvPicPr>
+          <p:nvPr/>
+        </p:nvPicPr>
+        <p:blipFill>
+          <a:blip r:embed="rId2"/>
+          <a:srcRect/>
+          <a:stretch>
+            <a:fillRect/>
+          </a:stretch>
+        </p:blipFill>
+        <p:spPr bwMode="auto">
+          <a:xfrm>
+            <a:off x="0" y="607423"/>
+            <a:ext cx="8743950" cy="5486400"/>
+          </a:xfrm>
+          <a:prstGeom prst="rect">
+            <a:avLst/>
+          </a:prstGeom>
+          <a:noFill/>
+          <a:ln w="9525">
+            <a:noFill/>
+            <a:miter lim="800000"/>
+            <a:headEnd/>
+            <a:tailEnd/>
+          </a:ln>
+          <a:effectLst/>
+        </p:spPr>
+      </p:pic>
+      <p:sp>
+        <p:nvSpPr>
+          <p:cNvPr id="6" name="5 Flecha derecha"/>
+          <p:cNvSpPr/>
+          <p:nvPr/>
+        </p:nvSpPr>
+        <p:spPr>
+          <a:xfrm rot="12616214">
+            <a:off x="6976716" y="2559087"/>
+            <a:ext cx="1527678" cy="496389"/>
+          </a:xfrm>
+          <a:prstGeom prst="rightArrow">
+            <a:avLst/>
+          </a:prstGeom>
+          <a:ln>
+            <a:solidFill>
+              <a:schemeClr val="bg1"/>
+            </a:solidFill>
+          </a:ln>
+        </p:spPr>
+        <p:style>
+          <a:lnRef idx="2">
+            <a:schemeClr val="accent1">
+              <a:shade val="50000"/>
+            </a:schemeClr>
+          </a:lnRef>
+          <a:fillRef idx="1">
+            <a:schemeClr val="accent1"/>
+          </a:fillRef>
+          <a:effectRef idx="0">
+            <a:schemeClr val="accent1"/>
+          </a:effectRef>
+          <a:fontRef idx="minor">
+            <a:schemeClr val="lt1"/>
+          </a:fontRef>
+        </p:style>
+        <p:txBody>
+          <a:bodyPr rtlCol="0" anchor="ctr"/>
+          <a:lstStyle/>
+          <a:p>
+            <a:pPr algn="ctr"/>
+            <a:endParaRPr lang="en-US"/>
+          </a:p>
+        </p:txBody>
+      </p:sp>
+      <p:sp>
+        <p:nvSpPr>
+          <p:cNvPr id="8" name="CuadroTexto 6">
+            <a:extLst>
+              <a:ext uri="{FF2B5EF4-FFF2-40B4-BE49-F238E27FC236}">
+                <a16:creationId xmlns:a16="http://schemas.microsoft.com/office/drawing/2014/main" xmlns="" id="{4C1428CB-200C-4FCD-994D-30D30253A07B}"/>
+              </a:ext>
+            </a:extLst>
+          </p:cNvPr>
+          <p:cNvSpPr txBox="1"/>
+          <p:nvPr/>
+        </p:nvSpPr>
+        <p:spPr>
+          <a:xfrm>
+            <a:off x="8435366" y="2968779"/>
+            <a:ext cx="3505537" cy="646331"/>
+          </a:xfrm>
+          <a:prstGeom prst="rect">
+            <a:avLst/>
+          </a:prstGeom>
+          <a:solidFill>
+            <a:schemeClr val="accent1">
+              <a:lumMod val="20000"/>
+              <a:lumOff val="80000"/>
+            </a:schemeClr>
+          </a:solidFill>
+          <a:ln w="57150">
+            <a:solidFill>
+              <a:srgbClr val="00B0F0"/>
+            </a:solidFill>
+          </a:ln>
+        </p:spPr>
+        <p:txBody>
+          <a:bodyPr wrap="square" rtlCol="0">
+            <a:spAutoFit/>
+          </a:bodyPr>
+          <a:lstStyle/>
+          <a:p>
+            <a:pPr algn="just"/>
+            <a:r>
+              <a:rPr lang="es-CO" b="1" dirty="0" smtClean="0"/>
+              <a:t>Al dar click en el titulo de video podrás entrar a su página </a:t>
+            </a:r>
+          </a:p>
+        </p:txBody>
+      </p:sp>
+    </p:spTree>
+  </p:cSld>
+  <p:clrMapOvr>
+    <a:masterClrMapping/>
+  </p:clrMapOvr>
+</p:sld>
+</file>
+
+<file path=ppt/slides/slide15.xml><?xml version="1.0" encoding="utf-8"?>
+<p:sld xmlns:a="http://schemas.openxmlformats.org/drawingml/2006/main" xmlns:r="http://schemas.openxmlformats.org/officeDocument/2006/relationships" xmlns:p="http://schemas.openxmlformats.org/presentationml/2006/main">
+  <p:cSld>
+    <p:spTree>
+      <p:nvGrpSpPr>
+        <p:cNvPr id="1" name=""/>
+        <p:cNvGrpSpPr/>
+        <p:nvPr/>
+      </p:nvGrpSpPr>
+      <p:grpSpPr>
+        <a:xfrm>
+          <a:off x="0" y="0"/>
+          <a:ext cx="0" cy="0"/>
+          <a:chOff x="0" y="0"/>
+          <a:chExt cx="0" cy="0"/>
+        </a:xfrm>
+      </p:grpSpPr>
+      <p:sp>
+        <p:nvSpPr>
+          <p:cNvPr id="2" name="1 Marcador de número de diapositiva"/>
+          <p:cNvSpPr>
+            <a:spLocks noGrp="1"/>
+          </p:cNvSpPr>
+          <p:nvPr>
+            <p:ph type="sldNum" sz="quarter" idx="12"/>
+          </p:nvPr>
+        </p:nvSpPr>
+        <p:spPr/>
+        <p:txBody>
+          <a:bodyPr/>
+          <a:lstStyle/>
+          <a:p>
+            <a:fld id="{E0424837-0642-404A-AA2B-7540A8D7DF1F}" type="slidenum">
+              <a:rPr lang="es-CO" smtClean="0"/>
+              <a:pPr/>
+              <a:t>15</a:t>
             </a:fld>
             <a:endParaRPr lang="es-CO"/>
           </a:p>
@@ -4514,7 +5168,7 @@
           <p:cNvPr id="4" name="CuadroTexto 6">
             <a:extLst>
               <a:ext uri="{FF2B5EF4-FFF2-40B4-BE49-F238E27FC236}">
-                <a16:creationId xmlns="" xmlns:a16="http://schemas.microsoft.com/office/drawing/2014/main" id="{4C1428CB-200C-4FCD-994D-30D30253A07B}"/>
+                <a16:creationId xmlns:a16="http://schemas.microsoft.com/office/drawing/2014/main" xmlns="" id="{4C1428CB-200C-4FCD-994D-30D30253A07B}"/>
               </a:ext>
             </a:extLst>
           </p:cNvPr>
@@ -4552,7 +5206,6 @@
               <a:rPr lang="es-CO" b="1" dirty="0" smtClean="0"/>
               <a:t>En la pagina del video podrás seleccionar manito arriba o abajo al video</a:t>
             </a:r>
-            <a:endParaRPr lang="es-CO" b="1" dirty="0" smtClean="0"/>
           </a:p>
         </p:txBody>
       </p:sp>
@@ -4561,7 +5214,7 @@
           <p:cNvPr id="5" name="CuadroTexto 6">
             <a:extLst>
               <a:ext uri="{FF2B5EF4-FFF2-40B4-BE49-F238E27FC236}">
-                <a16:creationId xmlns="" xmlns:a16="http://schemas.microsoft.com/office/drawing/2014/main" id="{4C1428CB-200C-4FCD-994D-30D30253A07B}"/>
+                <a16:creationId xmlns:a16="http://schemas.microsoft.com/office/drawing/2014/main" xmlns="" id="{4C1428CB-200C-4FCD-994D-30D30253A07B}"/>
               </a:ext>
             </a:extLst>
           </p:cNvPr>
@@ -4599,7 +5252,6 @@
               <a:rPr lang="es-CO" b="1" dirty="0" smtClean="0"/>
               <a:t>En el costado derecho vas a encontrar videos relacionados en la misma categoría</a:t>
             </a:r>
-            <a:endParaRPr lang="es-CO" b="1" dirty="0" smtClean="0"/>
           </a:p>
         </p:txBody>
       </p:sp>
@@ -4656,7 +5308,7 @@
 </p:sld>
 </file>
 
-<file path=ppt/slides/slide14.xml><?xml version="1.0" encoding="utf-8"?>
+<file path=ppt/slides/slide16.xml><?xml version="1.0" encoding="utf-8"?>
 <p:sld xmlns:a="http://schemas.openxmlformats.org/drawingml/2006/main" xmlns:r="http://schemas.openxmlformats.org/officeDocument/2006/relationships" xmlns:p="http://schemas.openxmlformats.org/presentationml/2006/main">
   <p:cSld>
     <p:spTree>
@@ -4754,7 +5406,7 @@
           <p:cNvPr id="5" name="CuadroTexto 6">
             <a:extLst>
               <a:ext uri="{FF2B5EF4-FFF2-40B4-BE49-F238E27FC236}">
-                <a16:creationId xmlns="" xmlns:a16="http://schemas.microsoft.com/office/drawing/2014/main" id="{4C1428CB-200C-4FCD-994D-30D30253A07B}"/>
+                <a16:creationId xmlns:a16="http://schemas.microsoft.com/office/drawing/2014/main" xmlns="" id="{4C1428CB-200C-4FCD-994D-30D30253A07B}"/>
               </a:ext>
             </a:extLst>
           </p:cNvPr>
@@ -4814,7 +5466,7 @@
             <a:fld id="{E0424837-0642-404A-AA2B-7540A8D7DF1F}" type="slidenum">
               <a:rPr lang="es-CO" smtClean="0"/>
               <a:pPr/>
-              <a:t>14</a:t>
+              <a:t>16</a:t>
             </a:fld>
             <a:endParaRPr lang="es-CO" dirty="0"/>
           </a:p>
@@ -4847,18 +5499,12 @@
       </p:grpSpPr>
       <p:sp>
         <p:nvSpPr>
-          <p:cNvPr id="2" name="Título 1">
-            <a:extLst>
-              <a:ext uri="{FF2B5EF4-FFF2-40B4-BE49-F238E27FC236}">
-                <a16:creationId xmlns="" xmlns:a16="http://schemas.microsoft.com/office/drawing/2014/main" id="{BD7E0FBA-7CB6-48D9-B152-F004B4812F61}"/>
-              </a:ext>
-            </a:extLst>
-          </p:cNvPr>
-          <p:cNvSpPr>
-            <a:spLocks noGrp="1"/>
-          </p:cNvSpPr>
-          <p:nvPr>
-            <p:ph type="ctrTitle"/>
+          <p:cNvPr id="2" name="1 Marcador de número de diapositiva"/>
+          <p:cNvSpPr>
+            <a:spLocks noGrp="1"/>
+          </p:cNvSpPr>
+          <p:nvPr>
+            <p:ph type="sldNum" sz="quarter" idx="12"/>
           </p:nvPr>
         </p:nvSpPr>
         <p:spPr/>
@@ -4866,70 +5512,137 @@
           <a:bodyPr/>
           <a:lstStyle/>
           <a:p>
-            <a:endParaRPr lang="es-CO"/>
-          </a:p>
-        </p:txBody>
-      </p:sp>
-      <p:sp>
-        <p:nvSpPr>
-          <p:cNvPr id="3" name="Subtítulo 2">
-            <a:extLst>
-              <a:ext uri="{FF2B5EF4-FFF2-40B4-BE49-F238E27FC236}">
-                <a16:creationId xmlns="" xmlns:a16="http://schemas.microsoft.com/office/drawing/2014/main" id="{887128CA-248A-4732-AA59-8E0535A8AB63}"/>
-              </a:ext>
-            </a:extLst>
-          </p:cNvPr>
-          <p:cNvSpPr>
-            <a:spLocks noGrp="1"/>
-          </p:cNvSpPr>
-          <p:nvPr>
-            <p:ph type="subTitle" idx="1"/>
-          </p:nvPr>
-        </p:nvSpPr>
-        <p:spPr/>
-        <p:txBody>
-          <a:bodyPr/>
-          <a:lstStyle/>
-          <a:p>
+            <a:fld id="{E0424837-0642-404A-AA2B-7540A8D7DF1F}" type="slidenum">
+              <a:rPr lang="es-CO" smtClean="0"/>
+              <a:pPr/>
+              <a:t>2</a:t>
+            </a:fld>
             <a:endParaRPr lang="es-CO"/>
           </a:p>
         </p:txBody>
       </p:sp>
       <p:pic>
         <p:nvPicPr>
-          <p:cNvPr id="4" name="Imagen 3">
-            <a:extLst>
-              <a:ext uri="{FF2B5EF4-FFF2-40B4-BE49-F238E27FC236}">
-                <a16:creationId xmlns="" xmlns:a16="http://schemas.microsoft.com/office/drawing/2014/main" id="{607BB2F5-B99B-4AC1-829F-D76A1632DC81}"/>
-              </a:ext>
-            </a:extLst>
-          </p:cNvPr>
+          <p:cNvPr id="1026" name="Picture 2"/>
           <p:cNvPicPr>
-            <a:picLocks noChangeAspect="1"/>
+            <a:picLocks noChangeAspect="1" noChangeArrowheads="1"/>
           </p:cNvPicPr>
           <p:nvPr/>
         </p:nvPicPr>
-        <p:blipFill rotWithShape="1">
+        <p:blipFill>
           <a:blip r:embed="rId2"/>
-          <a:srcRect t="9355" b="6228"/>
-          <a:stretch/>
+          <a:srcRect/>
+          <a:stretch>
+            <a:fillRect/>
+          </a:stretch>
         </p:blipFill>
-        <p:spPr>
+        <p:spPr bwMode="auto">
           <a:xfrm>
-            <a:off x="0" y="616744"/>
-            <a:ext cx="12192000" cy="5786437"/>
+            <a:off x="672235" y="615462"/>
+            <a:ext cx="11519766" cy="5732585"/>
           </a:xfrm>
           <a:prstGeom prst="rect">
             <a:avLst/>
           </a:prstGeom>
+          <a:noFill/>
+          <a:ln w="9525">
+            <a:noFill/>
+            <a:miter lim="800000"/>
+            <a:headEnd/>
+            <a:tailEnd/>
+          </a:ln>
+          <a:effectLst/>
         </p:spPr>
       </p:pic>
       <p:sp>
         <p:nvSpPr>
+          <p:cNvPr id="5" name="Título 1">
+            <a:extLst>
+              <a:ext uri="{FF2B5EF4-FFF2-40B4-BE49-F238E27FC236}">
+                <a16:creationId xmlns:a16="http://schemas.microsoft.com/office/drawing/2014/main" xmlns="" id="{6548487D-2BD6-4A8E-93BA-A223432C6815}"/>
+              </a:ext>
+            </a:extLst>
+          </p:cNvPr>
+          <p:cNvSpPr txBox="1">
+            <a:spLocks/>
+          </p:cNvSpPr>
+          <p:nvPr/>
+        </p:nvSpPr>
+        <p:spPr>
+          <a:xfrm rot="16200000">
+            <a:off x="-2157013" y="2761923"/>
+            <a:ext cx="5762681" cy="1448655"/>
+          </a:xfrm>
+          <a:prstGeom prst="rect">
+            <a:avLst/>
+          </a:prstGeom>
+          <a:solidFill>
+            <a:schemeClr val="accent1"/>
+          </a:solidFill>
+        </p:spPr>
+        <p:txBody>
+          <a:bodyPr vert="horz" lIns="91440" tIns="45720" rIns="91440" bIns="45720" rtlCol="0" anchor="ctr" anchorCtr="0">
+            <a:normAutofit/>
+          </a:bodyPr>
+          <a:lstStyle/>
+          <a:p>
+            <a:pPr marL="0" marR="0" lvl="0" indent="0" algn="ctr" defTabSz="914400" rtl="0" eaLnBrk="1" fontAlgn="auto" latinLnBrk="0" hangingPunct="1">
+              <a:lnSpc>
+                <a:spcPct val="90000"/>
+              </a:lnSpc>
+              <a:spcBef>
+                <a:spcPct val="0"/>
+              </a:spcBef>
+              <a:spcAft>
+                <a:spcPts val="0"/>
+              </a:spcAft>
+              <a:buClrTx/>
+              <a:buSzTx/>
+              <a:buFontTx/>
+              <a:buNone/>
+              <a:tabLst/>
+              <a:defRPr/>
+            </a:pPr>
+            <a:r>
+              <a:rPr kumimoji="0" lang="es-CO" sz="3600" b="0" i="0" u="none" strike="noStrike" kern="1200" cap="none" spc="0" normalizeH="0" baseline="0" noProof="0" dirty="0" smtClean="0">
+                <a:ln>
+                  <a:noFill/>
+                </a:ln>
+                <a:solidFill>
+                  <a:schemeClr val="bg1"/>
+                </a:solidFill>
+                <a:effectLst/>
+                <a:uLnTx/>
+                <a:uFillTx/>
+                <a:latin typeface="Corbel" pitchFamily="34" charset="0"/>
+                <a:ea typeface="+mj-ea"/>
+                <a:cs typeface="+mj-cs"/>
+              </a:rPr>
+              <a:t>FLUJO DE PÁGINAS</a:t>
+            </a:r>
+            <a:endParaRPr kumimoji="0" lang="es-CO" sz="3600" b="0" i="0" u="none" strike="noStrike" kern="1200" cap="none" spc="0" normalizeH="0" baseline="0" noProof="0" dirty="0">
+              <a:ln>
+                <a:noFill/>
+              </a:ln>
+              <a:solidFill>
+                <a:schemeClr val="bg1"/>
+              </a:solidFill>
+              <a:effectLst/>
+              <a:uLnTx/>
+              <a:uFillTx/>
+              <a:latin typeface="Corbel" pitchFamily="34" charset="0"/>
+              <a:ea typeface="+mj-ea"/>
+              <a:cs typeface="+mj-cs"/>
+            </a:endParaRPr>
+          </a:p>
+        </p:txBody>
+      </p:sp>
+      <p:sp>
+        <p:nvSpPr>
           <p:cNvPr id="7" name="Flecha: a la derecha 6">
             <a:extLst>
               <a:ext uri="{FF2B5EF4-FFF2-40B4-BE49-F238E27FC236}">
-                <a16:creationId xmlns="" xmlns:a16="http://schemas.microsoft.com/office/drawing/2014/main" id="{29E280D4-B6F5-4FCE-8E2C-1E29EA8381AF}"/>
+                <a16:creationId xmlns:a16="http://schemas.microsoft.com/office/drawing/2014/main" xmlns="" id="{29E280D4-B6F5-4FCE-8E2C-1E29EA8381AF}"/>
               </a:ext>
             </a:extLst>
           </p:cNvPr>
@@ -4938,7 +5651,7 @@
         </p:nvSpPr>
         <p:spPr>
           <a:xfrm flipH="1">
-            <a:off x="8321040" y="2559582"/>
+            <a:off x="4417256" y="783536"/>
             <a:ext cx="3631473" cy="2479284"/>
           </a:xfrm>
           <a:prstGeom prst="rightArrow">
@@ -4990,7 +5703,15 @@
                   <a:schemeClr val="bg1"/>
                 </a:solidFill>
               </a:rPr>
-              <a:t>Si </a:t>
+              <a:t>Desde el </a:t>
+            </a:r>
+            <a:r>
+              <a:rPr lang="es-CO" dirty="0" err="1" smtClean="0">
+                <a:solidFill>
+                  <a:schemeClr val="bg1"/>
+                </a:solidFill>
+              </a:rPr>
+              <a:t>index</a:t>
             </a:r>
             <a:r>
               <a:rPr lang="es-CO" dirty="0" smtClean="0">
@@ -4998,7 +5719,203 @@
                   <a:schemeClr val="bg1"/>
                 </a:solidFill>
               </a:rPr>
-              <a:t>ya tienes una cuenta, puedes ingresar a la plataforma utilizando tu usuario y contraseña</a:t>
+              <a:t> se accede al </a:t>
+            </a:r>
+            <a:r>
+              <a:rPr lang="es-CO" dirty="0" err="1" smtClean="0">
+                <a:solidFill>
+                  <a:schemeClr val="bg1"/>
+                </a:solidFill>
+              </a:rPr>
+              <a:t>login</a:t>
+            </a:r>
+            <a:r>
+              <a:rPr lang="es-CO" dirty="0" smtClean="0">
+                <a:solidFill>
+                  <a:schemeClr val="bg1"/>
+                </a:solidFill>
+              </a:rPr>
+              <a:t> o al registro</a:t>
+            </a:r>
+            <a:endParaRPr lang="es-CO" dirty="0">
+              <a:solidFill>
+                <a:schemeClr val="bg1"/>
+              </a:solidFill>
+            </a:endParaRPr>
+          </a:p>
+        </p:txBody>
+      </p:sp>
+    </p:spTree>
+  </p:cSld>
+  <p:clrMapOvr>
+    <a:masterClrMapping/>
+  </p:clrMapOvr>
+</p:sld>
+</file>
+
+<file path=ppt/slides/slide3.xml><?xml version="1.0" encoding="utf-8"?>
+<p:sld xmlns:a="http://schemas.openxmlformats.org/drawingml/2006/main" xmlns:r="http://schemas.openxmlformats.org/officeDocument/2006/relationships" xmlns:p="http://schemas.openxmlformats.org/presentationml/2006/main">
+  <p:cSld>
+    <p:spTree>
+      <p:nvGrpSpPr>
+        <p:cNvPr id="1" name=""/>
+        <p:cNvGrpSpPr/>
+        <p:nvPr/>
+      </p:nvGrpSpPr>
+      <p:grpSpPr>
+        <a:xfrm>
+          <a:off x="0" y="0"/>
+          <a:ext cx="0" cy="0"/>
+          <a:chOff x="0" y="0"/>
+          <a:chExt cx="0" cy="0"/>
+        </a:xfrm>
+      </p:grpSpPr>
+      <p:sp>
+        <p:nvSpPr>
+          <p:cNvPr id="2" name="Título 1">
+            <a:extLst>
+              <a:ext uri="{FF2B5EF4-FFF2-40B4-BE49-F238E27FC236}">
+                <a16:creationId xmlns:a16="http://schemas.microsoft.com/office/drawing/2014/main" xmlns="" id="{BD7E0FBA-7CB6-48D9-B152-F004B4812F61}"/>
+              </a:ext>
+            </a:extLst>
+          </p:cNvPr>
+          <p:cNvSpPr>
+            <a:spLocks noGrp="1"/>
+          </p:cNvSpPr>
+          <p:nvPr>
+            <p:ph type="ctrTitle"/>
+          </p:nvPr>
+        </p:nvSpPr>
+        <p:spPr/>
+        <p:txBody>
+          <a:bodyPr/>
+          <a:lstStyle/>
+          <a:p>
+            <a:endParaRPr lang="es-CO"/>
+          </a:p>
+        </p:txBody>
+      </p:sp>
+      <p:sp>
+        <p:nvSpPr>
+          <p:cNvPr id="3" name="Subtítulo 2">
+            <a:extLst>
+              <a:ext uri="{FF2B5EF4-FFF2-40B4-BE49-F238E27FC236}">
+                <a16:creationId xmlns:a16="http://schemas.microsoft.com/office/drawing/2014/main" xmlns="" id="{887128CA-248A-4732-AA59-8E0535A8AB63}"/>
+              </a:ext>
+            </a:extLst>
+          </p:cNvPr>
+          <p:cNvSpPr>
+            <a:spLocks noGrp="1"/>
+          </p:cNvSpPr>
+          <p:nvPr>
+            <p:ph type="subTitle" idx="1"/>
+          </p:nvPr>
+        </p:nvSpPr>
+        <p:spPr/>
+        <p:txBody>
+          <a:bodyPr/>
+          <a:lstStyle/>
+          <a:p>
+            <a:endParaRPr lang="es-CO"/>
+          </a:p>
+        </p:txBody>
+      </p:sp>
+      <p:pic>
+        <p:nvPicPr>
+          <p:cNvPr id="4" name="Imagen 3">
+            <a:extLst>
+              <a:ext uri="{FF2B5EF4-FFF2-40B4-BE49-F238E27FC236}">
+                <a16:creationId xmlns:a16="http://schemas.microsoft.com/office/drawing/2014/main" xmlns="" id="{607BB2F5-B99B-4AC1-829F-D76A1632DC81}"/>
+              </a:ext>
+            </a:extLst>
+          </p:cNvPr>
+          <p:cNvPicPr>
+            <a:picLocks noChangeAspect="1"/>
+          </p:cNvPicPr>
+          <p:nvPr/>
+        </p:nvPicPr>
+        <p:blipFill rotWithShape="1">
+          <a:blip r:embed="rId2"/>
+          <a:srcRect t="9355" b="6228"/>
+          <a:stretch/>
+        </p:blipFill>
+        <p:spPr>
+          <a:xfrm>
+            <a:off x="0" y="616744"/>
+            <a:ext cx="12192000" cy="5786437"/>
+          </a:xfrm>
+          <a:prstGeom prst="rect">
+            <a:avLst/>
+          </a:prstGeom>
+        </p:spPr>
+      </p:pic>
+      <p:sp>
+        <p:nvSpPr>
+          <p:cNvPr id="7" name="Flecha: a la derecha 6">
+            <a:extLst>
+              <a:ext uri="{FF2B5EF4-FFF2-40B4-BE49-F238E27FC236}">
+                <a16:creationId xmlns:a16="http://schemas.microsoft.com/office/drawing/2014/main" xmlns="" id="{29E280D4-B6F5-4FCE-8E2C-1E29EA8381AF}"/>
+              </a:ext>
+            </a:extLst>
+          </p:cNvPr>
+          <p:cNvSpPr/>
+          <p:nvPr/>
+        </p:nvSpPr>
+        <p:spPr>
+          <a:xfrm flipH="1">
+            <a:off x="8321040" y="2559582"/>
+            <a:ext cx="3631473" cy="2479284"/>
+          </a:xfrm>
+          <a:prstGeom prst="rightArrow">
+            <a:avLst>
+              <a:gd name="adj1" fmla="val 50000"/>
+              <a:gd name="adj2" fmla="val 45258"/>
+            </a:avLst>
+          </a:prstGeom>
+          <a:solidFill>
+            <a:schemeClr val="tx1">
+              <a:lumMod val="75000"/>
+              <a:lumOff val="25000"/>
+            </a:schemeClr>
+          </a:solidFill>
+          <a:ln w="76200"/>
+        </p:spPr>
+        <p:style>
+          <a:lnRef idx="2">
+            <a:schemeClr val="accent1">
+              <a:shade val="50000"/>
+            </a:schemeClr>
+          </a:lnRef>
+          <a:fillRef idx="1">
+            <a:schemeClr val="accent1"/>
+          </a:fillRef>
+          <a:effectRef idx="0">
+            <a:schemeClr val="accent1"/>
+          </a:effectRef>
+          <a:fontRef idx="minor">
+            <a:schemeClr val="lt1"/>
+          </a:fontRef>
+        </p:style>
+        <p:txBody>
+          <a:bodyPr rtlCol="0" anchor="ctr"/>
+          <a:lstStyle/>
+          <a:p>
+            <a:pPr algn="just"/>
+            <a:endParaRPr lang="es-CO" dirty="0" smtClean="0">
+              <a:solidFill>
+                <a:schemeClr val="bg1"/>
+              </a:solidFill>
+            </a:endParaRPr>
+          </a:p>
+          <a:p>
+            <a:pPr algn="just"/>
+            <a:r>
+              <a:rPr lang="es-CO" dirty="0" smtClean="0">
+                <a:solidFill>
+                  <a:schemeClr val="bg1"/>
+                </a:solidFill>
+              </a:rPr>
+              <a:t>Si ya tienes una cuenta, puedes ingresar a la plataforma utilizando tu usuario y contraseña</a:t>
             </a:r>
           </a:p>
           <a:p>
@@ -5016,7 +5933,7 @@
           <p:cNvPr id="8" name="Rectángulo 7">
             <a:extLst>
               <a:ext uri="{FF2B5EF4-FFF2-40B4-BE49-F238E27FC236}">
-                <a16:creationId xmlns="" xmlns:a16="http://schemas.microsoft.com/office/drawing/2014/main" id="{8B5CF1B1-9B69-4024-88A3-54B3AC5D6EEF}"/>
+                <a16:creationId xmlns:a16="http://schemas.microsoft.com/office/drawing/2014/main" xmlns="" id="{8B5CF1B1-9B69-4024-88A3-54B3AC5D6EEF}"/>
               </a:ext>
             </a:extLst>
           </p:cNvPr>
@@ -5070,7 +5987,7 @@
           <p:cNvPr id="9" name="Rectángulo 8">
             <a:extLst>
               <a:ext uri="{FF2B5EF4-FFF2-40B4-BE49-F238E27FC236}">
-                <a16:creationId xmlns="" xmlns:a16="http://schemas.microsoft.com/office/drawing/2014/main" id="{4882930A-EB17-4C8E-96BE-77AE4DE051B0}"/>
+                <a16:creationId xmlns:a16="http://schemas.microsoft.com/office/drawing/2014/main" xmlns="" id="{4882930A-EB17-4C8E-96BE-77AE4DE051B0}"/>
               </a:ext>
             </a:extLst>
           </p:cNvPr>
@@ -5138,7 +6055,7 @@
             <a:fld id="{E0424837-0642-404A-AA2B-7540A8D7DF1F}" type="slidenum">
               <a:rPr lang="es-CO" smtClean="0"/>
               <a:pPr/>
-              <a:t>2</a:t>
+              <a:t>3</a:t>
             </a:fld>
             <a:endParaRPr lang="es-CO"/>
           </a:p>
@@ -5149,7 +6066,7 @@
           <p:cNvPr id="12" name="Título 1">
             <a:extLst>
               <a:ext uri="{FF2B5EF4-FFF2-40B4-BE49-F238E27FC236}">
-                <a16:creationId xmlns="" xmlns:a16="http://schemas.microsoft.com/office/drawing/2014/main" id="{6548487D-2BD6-4A8E-93BA-A223432C6815}"/>
+                <a16:creationId xmlns:a16="http://schemas.microsoft.com/office/drawing/2014/main" xmlns="" id="{6548487D-2BD6-4A8E-93BA-A223432C6815}"/>
               </a:ext>
             </a:extLst>
           </p:cNvPr>
@@ -5160,7 +6077,7 @@
         </p:nvSpPr>
         <p:spPr>
           <a:xfrm rot="16200000">
-            <a:off x="-2157011" y="2797092"/>
+            <a:off x="-2157013" y="2761923"/>
             <a:ext cx="5762681" cy="1448655"/>
           </a:xfrm>
           <a:prstGeom prst="rect">
@@ -5230,7 +6147,7 @@
     </p:spTree>
     <p:extLst>
       <p:ext uri="{BB962C8B-B14F-4D97-AF65-F5344CB8AC3E}">
-        <p14:creationId xmlns="" xmlns:p14="http://schemas.microsoft.com/office/powerpoint/2010/main" val="1726636936"/>
+        <p14:creationId xmlns:p14="http://schemas.microsoft.com/office/powerpoint/2010/main" xmlns="" val="1726636936"/>
       </p:ext>
     </p:extLst>
   </p:cSld>
@@ -5247,7 +6164,324 @@
 </p:sld>
 </file>
 
-<file path=ppt/slides/slide3.xml><?xml version="1.0" encoding="utf-8"?>
+<file path=ppt/slides/slide4.xml><?xml version="1.0" encoding="utf-8"?>
+<p:sld xmlns:a="http://schemas.openxmlformats.org/drawingml/2006/main" xmlns:r="http://schemas.openxmlformats.org/officeDocument/2006/relationships" xmlns:p="http://schemas.openxmlformats.org/presentationml/2006/main">
+  <p:cSld>
+    <p:bg>
+      <p:bgPr>
+        <a:solidFill>
+          <a:schemeClr val="tx1"/>
+        </a:solidFill>
+        <a:effectLst/>
+      </p:bgPr>
+    </p:bg>
+    <p:spTree>
+      <p:nvGrpSpPr>
+        <p:cNvPr id="1" name=""/>
+        <p:cNvGrpSpPr/>
+        <p:nvPr/>
+      </p:nvGrpSpPr>
+      <p:grpSpPr>
+        <a:xfrm>
+          <a:off x="0" y="0"/>
+          <a:ext cx="0" cy="0"/>
+          <a:chOff x="0" y="0"/>
+          <a:chExt cx="0" cy="0"/>
+        </a:xfrm>
+      </p:grpSpPr>
+      <p:sp>
+        <p:nvSpPr>
+          <p:cNvPr id="11" name="10 Marcador de número de diapositiva"/>
+          <p:cNvSpPr>
+            <a:spLocks noGrp="1"/>
+          </p:cNvSpPr>
+          <p:nvPr>
+            <p:ph type="sldNum" sz="quarter" idx="12"/>
+          </p:nvPr>
+        </p:nvSpPr>
+        <p:spPr/>
+        <p:txBody>
+          <a:bodyPr/>
+          <a:lstStyle/>
+          <a:p>
+            <a:fld id="{E0424837-0642-404A-AA2B-7540A8D7DF1F}" type="slidenum">
+              <a:rPr lang="es-CO" smtClean="0"/>
+              <a:pPr/>
+              <a:t>4</a:t>
+            </a:fld>
+            <a:endParaRPr lang="es-CO"/>
+          </a:p>
+        </p:txBody>
+      </p:sp>
+      <p:sp>
+        <p:nvSpPr>
+          <p:cNvPr id="12" name="Título 1">
+            <a:extLst>
+              <a:ext uri="{FF2B5EF4-FFF2-40B4-BE49-F238E27FC236}">
+                <a16:creationId xmlns:a16="http://schemas.microsoft.com/office/drawing/2014/main" xmlns="" id="{6548487D-2BD6-4A8E-93BA-A223432C6815}"/>
+              </a:ext>
+            </a:extLst>
+          </p:cNvPr>
+          <p:cNvSpPr txBox="1">
+            <a:spLocks/>
+          </p:cNvSpPr>
+          <p:nvPr/>
+        </p:nvSpPr>
+        <p:spPr>
+          <a:xfrm rot="16200000">
+            <a:off x="-2169093" y="2913677"/>
+            <a:ext cx="5786846" cy="1448655"/>
+          </a:xfrm>
+          <a:prstGeom prst="rect">
+            <a:avLst/>
+          </a:prstGeom>
+          <a:solidFill>
+            <a:schemeClr val="accent1"/>
+          </a:solidFill>
+        </p:spPr>
+        <p:txBody>
+          <a:bodyPr vert="horz" lIns="91440" tIns="45720" rIns="91440" bIns="45720" rtlCol="0" anchor="ctr" anchorCtr="0">
+            <a:normAutofit/>
+          </a:bodyPr>
+          <a:lstStyle/>
+          <a:p>
+            <a:pPr marL="0" marR="0" lvl="0" indent="0" algn="ctr" defTabSz="914400" rtl="0" eaLnBrk="1" fontAlgn="auto" latinLnBrk="0" hangingPunct="1">
+              <a:lnSpc>
+                <a:spcPct val="90000"/>
+              </a:lnSpc>
+              <a:spcBef>
+                <a:spcPct val="0"/>
+              </a:spcBef>
+              <a:spcAft>
+                <a:spcPts val="0"/>
+              </a:spcAft>
+              <a:buClrTx/>
+              <a:buSzTx/>
+              <a:buFontTx/>
+              <a:buNone/>
+              <a:tabLst/>
+              <a:defRPr/>
+            </a:pPr>
+            <a:r>
+              <a:rPr kumimoji="0" lang="es-CO" sz="3600" b="0" i="0" u="none" strike="noStrike" kern="1200" cap="none" spc="0" normalizeH="0" baseline="0" noProof="0" dirty="0" smtClean="0">
+                <a:ln>
+                  <a:noFill/>
+                </a:ln>
+                <a:solidFill>
+                  <a:schemeClr val="bg1"/>
+                </a:solidFill>
+                <a:effectLst/>
+                <a:uLnTx/>
+                <a:uFillTx/>
+                <a:latin typeface="Corbel" pitchFamily="34" charset="0"/>
+                <a:ea typeface="+mj-ea"/>
+                <a:cs typeface="+mj-cs"/>
+              </a:rPr>
+              <a:t>FLUJO DE PÁGINAS</a:t>
+            </a:r>
+            <a:endParaRPr kumimoji="0" lang="es-CO" sz="3600" b="0" i="0" u="none" strike="noStrike" kern="1200" cap="none" spc="0" normalizeH="0" baseline="0" noProof="0" dirty="0">
+              <a:ln>
+                <a:noFill/>
+              </a:ln>
+              <a:solidFill>
+                <a:schemeClr val="bg1"/>
+              </a:solidFill>
+              <a:effectLst/>
+              <a:uLnTx/>
+              <a:uFillTx/>
+              <a:latin typeface="Corbel" pitchFamily="34" charset="0"/>
+              <a:ea typeface="+mj-ea"/>
+              <a:cs typeface="+mj-cs"/>
+            </a:endParaRPr>
+          </a:p>
+        </p:txBody>
+      </p:sp>
+      <p:pic>
+        <p:nvPicPr>
+          <p:cNvPr id="13" name="Picture 3"/>
+          <p:cNvPicPr>
+            <a:picLocks noChangeAspect="1" noChangeArrowheads="1"/>
+          </p:cNvPicPr>
+          <p:nvPr/>
+        </p:nvPicPr>
+        <p:blipFill>
+          <a:blip r:embed="rId2"/>
+          <a:srcRect/>
+          <a:stretch>
+            <a:fillRect/>
+          </a:stretch>
+        </p:blipFill>
+        <p:spPr bwMode="auto">
+          <a:xfrm>
+            <a:off x="2733848" y="1318160"/>
+            <a:ext cx="2949287" cy="3206335"/>
+          </a:xfrm>
+          <a:prstGeom prst="rect">
+            <a:avLst/>
+          </a:prstGeom>
+          <a:solidFill>
+            <a:srgbClr val="000000">
+              <a:shade val="95000"/>
+            </a:srgbClr>
+          </a:solidFill>
+          <a:ln w="444500" cap="sq">
+            <a:solidFill>
+              <a:schemeClr val="bg1"/>
+            </a:solidFill>
+            <a:miter lim="800000"/>
+          </a:ln>
+          <a:effectLst>
+            <a:outerShdw blurRad="254000" dist="190500" dir="2700000" sy="90000" algn="bl" rotWithShape="0">
+              <a:srgbClr val="000000">
+                <a:alpha val="40000"/>
+              </a:srgbClr>
+            </a:outerShdw>
+          </a:effectLst>
+        </p:spPr>
+      </p:pic>
+      <p:pic>
+        <p:nvPicPr>
+          <p:cNvPr id="14" name="Picture 4"/>
+          <p:cNvPicPr>
+            <a:picLocks noChangeAspect="1" noChangeArrowheads="1"/>
+          </p:cNvPicPr>
+          <p:nvPr/>
+        </p:nvPicPr>
+        <p:blipFill>
+          <a:blip r:embed="rId3"/>
+          <a:srcRect/>
+          <a:stretch>
+            <a:fillRect/>
+          </a:stretch>
+        </p:blipFill>
+        <p:spPr bwMode="auto">
+          <a:xfrm>
+            <a:off x="7309981" y="1309218"/>
+            <a:ext cx="3021157" cy="3228772"/>
+          </a:xfrm>
+          <a:prstGeom prst="rect">
+            <a:avLst/>
+          </a:prstGeom>
+          <a:solidFill>
+            <a:srgbClr val="000000">
+              <a:shade val="95000"/>
+            </a:srgbClr>
+          </a:solidFill>
+          <a:ln w="444500" cap="sq">
+            <a:solidFill>
+              <a:schemeClr val="bg1"/>
+            </a:solidFill>
+            <a:miter lim="800000"/>
+          </a:ln>
+          <a:effectLst>
+            <a:outerShdw blurRad="254000" dist="190500" dir="2700000" sy="90000" algn="bl" rotWithShape="0">
+              <a:srgbClr val="000000">
+                <a:alpha val="40000"/>
+              </a:srgbClr>
+            </a:outerShdw>
+          </a:effectLst>
+        </p:spPr>
+      </p:pic>
+      <p:sp>
+        <p:nvSpPr>
+          <p:cNvPr id="15" name="Rectángulo 6">
+            <a:extLst>
+              <a:ext uri="{FF2B5EF4-FFF2-40B4-BE49-F238E27FC236}">
+                <a16:creationId xmlns:a16="http://schemas.microsoft.com/office/drawing/2014/main" xmlns="" id="{E1457C3D-61FA-49FD-AF6F-EA67EEA74276}"/>
+              </a:ext>
+            </a:extLst>
+          </p:cNvPr>
+          <p:cNvSpPr/>
+          <p:nvPr/>
+        </p:nvSpPr>
+        <p:spPr>
+          <a:xfrm>
+            <a:off x="6189859" y="5188789"/>
+            <a:ext cx="3489718" cy="646331"/>
+          </a:xfrm>
+          <a:prstGeom prst="rect">
+            <a:avLst/>
+          </a:prstGeom>
+          <a:ln w="57150">
+            <a:noFill/>
+          </a:ln>
+        </p:spPr>
+        <p:txBody>
+          <a:bodyPr wrap="square">
+            <a:spAutoFit/>
+          </a:bodyPr>
+          <a:lstStyle/>
+          <a:p>
+            <a:pPr algn="just"/>
+            <a:r>
+              <a:rPr lang="es-CO" dirty="0">
+                <a:solidFill>
+                  <a:schemeClr val="bg1"/>
+                </a:solidFill>
+              </a:rPr>
+              <a:t>Si no ingresas </a:t>
+            </a:r>
+            <a:r>
+              <a:rPr lang="es-CO" dirty="0" smtClean="0">
+                <a:solidFill>
+                  <a:schemeClr val="bg1"/>
+                </a:solidFill>
+              </a:rPr>
+              <a:t>correcta, te </a:t>
+            </a:r>
+            <a:r>
+              <a:rPr lang="es-CO" dirty="0" err="1" smtClean="0">
+                <a:solidFill>
+                  <a:schemeClr val="bg1"/>
+                </a:solidFill>
+              </a:rPr>
+              <a:t>aparecera</a:t>
+            </a:r>
+            <a:r>
+              <a:rPr lang="es-CO" dirty="0" smtClean="0">
+                <a:solidFill>
+                  <a:schemeClr val="bg1"/>
+                </a:solidFill>
+              </a:rPr>
+              <a:t> un alerta </a:t>
+            </a:r>
+            <a:r>
+              <a:rPr lang="es-CO" dirty="0" err="1" smtClean="0">
+                <a:solidFill>
+                  <a:schemeClr val="bg1"/>
+                </a:solidFill>
+              </a:rPr>
+              <a:t>indicandolo</a:t>
+            </a:r>
+            <a:endParaRPr lang="es-CO" dirty="0">
+              <a:solidFill>
+                <a:schemeClr val="bg1"/>
+              </a:solidFill>
+            </a:endParaRPr>
+          </a:p>
+        </p:txBody>
+      </p:sp>
+    </p:spTree>
+    <p:extLst>
+      <p:ext uri="{BB962C8B-B14F-4D97-AF65-F5344CB8AC3E}">
+        <p14:creationId xmlns:p14="http://schemas.microsoft.com/office/powerpoint/2010/main" xmlns="" val="1989813191"/>
+      </p:ext>
+    </p:extLst>
+  </p:cSld>
+  <p:clrMapOvr>
+    <a:masterClrMapping/>
+  </p:clrMapOvr>
+  <p:timing>
+    <p:tnLst>
+      <p:par>
+        <p:cTn id="1" dur="indefinite" restart="never" nodeType="tmRoot"/>
+      </p:par>
+    </p:tnLst>
+  </p:timing>
+</p:sld>
+</file>
+
+<file path=ppt/slides/slide5.xml><?xml version="1.0" encoding="utf-8"?>
 <p:sld xmlns:a="http://schemas.openxmlformats.org/drawingml/2006/main" xmlns:r="http://schemas.openxmlformats.org/officeDocument/2006/relationships" xmlns:p="http://schemas.openxmlformats.org/presentationml/2006/main">
   <p:cSld>
     <p:spTree>
@@ -5269,7 +6503,7 @@
           <p:cNvPr id="2" name="Título 1">
             <a:extLst>
               <a:ext uri="{FF2B5EF4-FFF2-40B4-BE49-F238E27FC236}">
-                <a16:creationId xmlns="" xmlns:a16="http://schemas.microsoft.com/office/drawing/2014/main" id="{BD7E0FBA-7CB6-48D9-B152-F004B4812F61}"/>
+                <a16:creationId xmlns:a16="http://schemas.microsoft.com/office/drawing/2014/main" xmlns="" id="{BD7E0FBA-7CB6-48D9-B152-F004B4812F61}"/>
               </a:ext>
             </a:extLst>
           </p:cNvPr>
@@ -5294,7 +6528,7 @@
           <p:cNvPr id="3" name="Subtítulo 2">
             <a:extLst>
               <a:ext uri="{FF2B5EF4-FFF2-40B4-BE49-F238E27FC236}">
-                <a16:creationId xmlns="" xmlns:a16="http://schemas.microsoft.com/office/drawing/2014/main" id="{887128CA-248A-4732-AA59-8E0535A8AB63}"/>
+                <a16:creationId xmlns:a16="http://schemas.microsoft.com/office/drawing/2014/main" xmlns="" id="{887128CA-248A-4732-AA59-8E0535A8AB63}"/>
               </a:ext>
             </a:extLst>
           </p:cNvPr>
@@ -5319,7 +6553,7 @@
           <p:cNvPr id="4" name="Imagen 3">
             <a:extLst>
               <a:ext uri="{FF2B5EF4-FFF2-40B4-BE49-F238E27FC236}">
-                <a16:creationId xmlns="" xmlns:a16="http://schemas.microsoft.com/office/drawing/2014/main" id="{607BB2F5-B99B-4AC1-829F-D76A1632DC81}"/>
+                <a16:creationId xmlns:a16="http://schemas.microsoft.com/office/drawing/2014/main" xmlns="" id="{607BB2F5-B99B-4AC1-829F-D76A1632DC81}"/>
               </a:ext>
             </a:extLst>
           </p:cNvPr>
@@ -5348,7 +6582,7 @@
           <p:cNvPr id="5" name="CuadroTexto 4">
             <a:extLst>
               <a:ext uri="{FF2B5EF4-FFF2-40B4-BE49-F238E27FC236}">
-                <a16:creationId xmlns="" xmlns:a16="http://schemas.microsoft.com/office/drawing/2014/main" id="{90C27D6D-4F4B-49D9-AF51-F7A38B4DCFE7}"/>
+                <a16:creationId xmlns:a16="http://schemas.microsoft.com/office/drawing/2014/main" xmlns="" id="{90C27D6D-4F4B-49D9-AF51-F7A38B4DCFE7}"/>
               </a:ext>
             </a:extLst>
           </p:cNvPr>
@@ -5388,7 +6622,7 @@
           <p:cNvPr id="9" name="Rectángulo 8">
             <a:extLst>
               <a:ext uri="{FF2B5EF4-FFF2-40B4-BE49-F238E27FC236}">
-                <a16:creationId xmlns="" xmlns:a16="http://schemas.microsoft.com/office/drawing/2014/main" id="{4882930A-EB17-4C8E-96BE-77AE4DE051B0}"/>
+                <a16:creationId xmlns:a16="http://schemas.microsoft.com/office/drawing/2014/main" xmlns="" id="{4882930A-EB17-4C8E-96BE-77AE4DE051B0}"/>
               </a:ext>
             </a:extLst>
           </p:cNvPr>
@@ -5462,7 +6696,7 @@
           <p:cNvPr id="6" name="Rectángulo: esquinas redondeadas 5">
             <a:extLst>
               <a:ext uri="{FF2B5EF4-FFF2-40B4-BE49-F238E27FC236}">
-                <a16:creationId xmlns="" xmlns:a16="http://schemas.microsoft.com/office/drawing/2014/main" id="{A18D2BA0-CB31-47A9-870E-A99A344D391D}"/>
+                <a16:creationId xmlns:a16="http://schemas.microsoft.com/office/drawing/2014/main" xmlns="" id="{A18D2BA0-CB31-47A9-870E-A99A344D391D}"/>
               </a:ext>
             </a:extLst>
           </p:cNvPr>
@@ -5510,7 +6744,7 @@
           <p:cNvPr id="10" name="Flecha: curvada hacia arriba 9">
             <a:extLst>
               <a:ext uri="{FF2B5EF4-FFF2-40B4-BE49-F238E27FC236}">
-                <a16:creationId xmlns="" xmlns:a16="http://schemas.microsoft.com/office/drawing/2014/main" id="{801AB8A9-0842-4054-B861-E73B34DF5D40}"/>
+                <a16:creationId xmlns:a16="http://schemas.microsoft.com/office/drawing/2014/main" xmlns="" id="{801AB8A9-0842-4054-B861-E73B34DF5D40}"/>
               </a:ext>
             </a:extLst>
           </p:cNvPr>
@@ -5577,7 +6811,7 @@
             <a:fld id="{E0424837-0642-404A-AA2B-7540A8D7DF1F}" type="slidenum">
               <a:rPr lang="es-CO" smtClean="0"/>
               <a:pPr/>
-              <a:t>3</a:t>
+              <a:t>5</a:t>
             </a:fld>
             <a:endParaRPr lang="es-CO"/>
           </a:p>
@@ -5588,7 +6822,7 @@
           <p:cNvPr id="12" name="Título 1">
             <a:extLst>
               <a:ext uri="{FF2B5EF4-FFF2-40B4-BE49-F238E27FC236}">
-                <a16:creationId xmlns="" xmlns:a16="http://schemas.microsoft.com/office/drawing/2014/main" id="{6548487D-2BD6-4A8E-93BA-A223432C6815}"/>
+                <a16:creationId xmlns:a16="http://schemas.microsoft.com/office/drawing/2014/main" xmlns="" id="{6548487D-2BD6-4A8E-93BA-A223432C6815}"/>
               </a:ext>
             </a:extLst>
           </p:cNvPr>
@@ -5669,7 +6903,7 @@
     </p:spTree>
     <p:extLst>
       <p:ext uri="{BB962C8B-B14F-4D97-AF65-F5344CB8AC3E}">
-        <p14:creationId xmlns="" xmlns:p14="http://schemas.microsoft.com/office/powerpoint/2010/main" val="1989813191"/>
+        <p14:creationId xmlns:p14="http://schemas.microsoft.com/office/powerpoint/2010/main" xmlns="" val="1989813191"/>
       </p:ext>
     </p:extLst>
   </p:cSld>
@@ -5686,7 +6920,7 @@
 </p:sld>
 </file>
 
-<file path=ppt/slides/slide4.xml><?xml version="1.0" encoding="utf-8"?>
+<file path=ppt/slides/slide6.xml><?xml version="1.0" encoding="utf-8"?>
 <p:sld xmlns:a="http://schemas.openxmlformats.org/drawingml/2006/main" xmlns:r="http://schemas.openxmlformats.org/officeDocument/2006/relationships" xmlns:p="http://schemas.openxmlformats.org/presentationml/2006/main">
   <p:cSld>
     <p:spTree>
@@ -5708,7 +6942,7 @@
           <p:cNvPr id="2" name="Título 1">
             <a:extLst>
               <a:ext uri="{FF2B5EF4-FFF2-40B4-BE49-F238E27FC236}">
-                <a16:creationId xmlns="" xmlns:a16="http://schemas.microsoft.com/office/drawing/2014/main" id="{AF781C62-DAE4-4F1E-8D64-7654F687D5EA}"/>
+                <a16:creationId xmlns:a16="http://schemas.microsoft.com/office/drawing/2014/main" xmlns="" id="{AF781C62-DAE4-4F1E-8D64-7654F687D5EA}"/>
               </a:ext>
             </a:extLst>
           </p:cNvPr>
@@ -5733,7 +6967,7 @@
           <p:cNvPr id="3" name="Marcador de contenido 2">
             <a:extLst>
               <a:ext uri="{FF2B5EF4-FFF2-40B4-BE49-F238E27FC236}">
-                <a16:creationId xmlns="" xmlns:a16="http://schemas.microsoft.com/office/drawing/2014/main" id="{3506D3BC-A174-407E-B275-4CA4E5B331B8}"/>
+                <a16:creationId xmlns:a16="http://schemas.microsoft.com/office/drawing/2014/main" xmlns="" id="{3506D3BC-A174-407E-B275-4CA4E5B331B8}"/>
               </a:ext>
             </a:extLst>
           </p:cNvPr>
@@ -5758,7 +6992,7 @@
           <p:cNvPr id="4" name="Imagen 3">
             <a:extLst>
               <a:ext uri="{FF2B5EF4-FFF2-40B4-BE49-F238E27FC236}">
-                <a16:creationId xmlns="" xmlns:a16="http://schemas.microsoft.com/office/drawing/2014/main" id="{FF9F0603-7C9B-4435-B762-AFA4F39877BF}"/>
+                <a16:creationId xmlns:a16="http://schemas.microsoft.com/office/drawing/2014/main" xmlns="" id="{FF9F0603-7C9B-4435-B762-AFA4F39877BF}"/>
               </a:ext>
             </a:extLst>
           </p:cNvPr>
@@ -5788,7 +7022,7 @@
           <p:cNvPr id="5" name="Rectángulo 4">
             <a:extLst>
               <a:ext uri="{FF2B5EF4-FFF2-40B4-BE49-F238E27FC236}">
-                <a16:creationId xmlns="" xmlns:a16="http://schemas.microsoft.com/office/drawing/2014/main" id="{9D46BBD1-F96E-4F88-B816-E8B61F8F6084}"/>
+                <a16:creationId xmlns:a16="http://schemas.microsoft.com/office/drawing/2014/main" xmlns="" id="{9D46BBD1-F96E-4F88-B816-E8B61F8F6084}"/>
               </a:ext>
             </a:extLst>
           </p:cNvPr>
@@ -5862,7 +7096,7 @@
           <p:cNvPr id="7" name="CuadroTexto 6">
             <a:extLst>
               <a:ext uri="{FF2B5EF4-FFF2-40B4-BE49-F238E27FC236}">
-                <a16:creationId xmlns="" xmlns:a16="http://schemas.microsoft.com/office/drawing/2014/main" id="{4C1428CB-200C-4FCD-994D-30D30253A07B}"/>
+                <a16:creationId xmlns:a16="http://schemas.microsoft.com/office/drawing/2014/main" xmlns="" id="{4C1428CB-200C-4FCD-994D-30D30253A07B}"/>
               </a:ext>
             </a:extLst>
           </p:cNvPr>
@@ -5912,7 +7146,7 @@
           <p:cNvPr id="11" name="Cerrar llave 10">
             <a:extLst>
               <a:ext uri="{FF2B5EF4-FFF2-40B4-BE49-F238E27FC236}">
-                <a16:creationId xmlns="" xmlns:a16="http://schemas.microsoft.com/office/drawing/2014/main" id="{9C7F74CF-FBD5-4300-BE56-266F05B66A06}"/>
+                <a16:creationId xmlns:a16="http://schemas.microsoft.com/office/drawing/2014/main" xmlns="" id="{9C7F74CF-FBD5-4300-BE56-266F05B66A06}"/>
               </a:ext>
             </a:extLst>
           </p:cNvPr>
@@ -5975,7 +7209,7 @@
             <a:fld id="{E0424837-0642-404A-AA2B-7540A8D7DF1F}" type="slidenum">
               <a:rPr lang="es-CO" smtClean="0"/>
               <a:pPr/>
-              <a:t>4</a:t>
+              <a:t>6</a:t>
             </a:fld>
             <a:endParaRPr lang="es-CO"/>
           </a:p>
@@ -5986,7 +7220,7 @@
           <p:cNvPr id="9" name="Título 1">
             <a:extLst>
               <a:ext uri="{FF2B5EF4-FFF2-40B4-BE49-F238E27FC236}">
-                <a16:creationId xmlns="" xmlns:a16="http://schemas.microsoft.com/office/drawing/2014/main" id="{6548487D-2BD6-4A8E-93BA-A223432C6815}"/>
+                <a16:creationId xmlns:a16="http://schemas.microsoft.com/office/drawing/2014/main" xmlns="" id="{6548487D-2BD6-4A8E-93BA-A223432C6815}"/>
               </a:ext>
             </a:extLst>
           </p:cNvPr>
@@ -6067,561 +7301,9 @@
     </p:spTree>
     <p:extLst>
       <p:ext uri="{BB962C8B-B14F-4D97-AF65-F5344CB8AC3E}">
-        <p14:creationId xmlns="" xmlns:p14="http://schemas.microsoft.com/office/powerpoint/2010/main" val="652220024"/>
+        <p14:creationId xmlns:p14="http://schemas.microsoft.com/office/powerpoint/2010/main" xmlns="" val="652220024"/>
       </p:ext>
     </p:extLst>
-  </p:cSld>
-  <p:clrMapOvr>
-    <a:masterClrMapping/>
-  </p:clrMapOvr>
-</p:sld>
-</file>
-
-<file path=ppt/slides/slide5.xml><?xml version="1.0" encoding="utf-8"?>
-<p:sld xmlns:a="http://schemas.openxmlformats.org/drawingml/2006/main" xmlns:r="http://schemas.openxmlformats.org/officeDocument/2006/relationships" xmlns:p="http://schemas.openxmlformats.org/presentationml/2006/main">
-  <p:cSld>
-    <p:spTree>
-      <p:nvGrpSpPr>
-        <p:cNvPr id="1" name=""/>
-        <p:cNvGrpSpPr/>
-        <p:nvPr/>
-      </p:nvGrpSpPr>
-      <p:grpSpPr>
-        <a:xfrm>
-          <a:off x="0" y="0"/>
-          <a:ext cx="0" cy="0"/>
-          <a:chOff x="0" y="0"/>
-          <a:chExt cx="0" cy="0"/>
-        </a:xfrm>
-      </p:grpSpPr>
-      <p:sp>
-        <p:nvSpPr>
-          <p:cNvPr id="2" name="Título 1">
-            <a:extLst>
-              <a:ext uri="{FF2B5EF4-FFF2-40B4-BE49-F238E27FC236}">
-                <a16:creationId xmlns="" xmlns:a16="http://schemas.microsoft.com/office/drawing/2014/main" id="{AF781C62-DAE4-4F1E-8D64-7654F687D5EA}"/>
-              </a:ext>
-            </a:extLst>
-          </p:cNvPr>
-          <p:cNvSpPr>
-            <a:spLocks noGrp="1"/>
-          </p:cNvSpPr>
-          <p:nvPr>
-            <p:ph type="title"/>
-          </p:nvPr>
-        </p:nvSpPr>
-        <p:spPr/>
-        <p:txBody>
-          <a:bodyPr/>
-          <a:lstStyle/>
-          <a:p>
-            <a:endParaRPr lang="es-CO"/>
-          </a:p>
-        </p:txBody>
-      </p:sp>
-      <p:sp>
-        <p:nvSpPr>
-          <p:cNvPr id="3" name="Marcador de contenido 2">
-            <a:extLst>
-              <a:ext uri="{FF2B5EF4-FFF2-40B4-BE49-F238E27FC236}">
-                <a16:creationId xmlns="" xmlns:a16="http://schemas.microsoft.com/office/drawing/2014/main" id="{3506D3BC-A174-407E-B275-4CA4E5B331B8}"/>
-              </a:ext>
-            </a:extLst>
-          </p:cNvPr>
-          <p:cNvSpPr>
-            <a:spLocks noGrp="1"/>
-          </p:cNvSpPr>
-          <p:nvPr>
-            <p:ph idx="1"/>
-          </p:nvPr>
-        </p:nvSpPr>
-        <p:spPr/>
-        <p:txBody>
-          <a:bodyPr/>
-          <a:lstStyle/>
-          <a:p>
-            <a:endParaRPr lang="es-CO"/>
-          </a:p>
-        </p:txBody>
-      </p:sp>
-      <p:pic>
-        <p:nvPicPr>
-          <p:cNvPr id="5" name="Imagen 4">
-            <a:extLst>
-              <a:ext uri="{FF2B5EF4-FFF2-40B4-BE49-F238E27FC236}">
-                <a16:creationId xmlns="" xmlns:a16="http://schemas.microsoft.com/office/drawing/2014/main" id="{AA0436B4-9B1F-448D-B703-BE3A2771195A}"/>
-              </a:ext>
-            </a:extLst>
-          </p:cNvPr>
-          <p:cNvPicPr>
-            <a:picLocks noChangeAspect="1"/>
-          </p:cNvPicPr>
-          <p:nvPr/>
-        </p:nvPicPr>
-        <p:blipFill>
-          <a:blip r:embed="rId2"/>
-          <a:stretch>
-            <a:fillRect/>
-          </a:stretch>
-        </p:blipFill>
-        <p:spPr>
-          <a:xfrm>
-            <a:off x="0" y="1673"/>
-            <a:ext cx="12192000" cy="6854653"/>
-          </a:xfrm>
-          <a:prstGeom prst="rect">
-            <a:avLst/>
-          </a:prstGeom>
-        </p:spPr>
-      </p:pic>
-      <p:sp>
-        <p:nvSpPr>
-          <p:cNvPr id="7" name="Rectángulo 6">
-            <a:extLst>
-              <a:ext uri="{FF2B5EF4-FFF2-40B4-BE49-F238E27FC236}">
-                <a16:creationId xmlns="" xmlns:a16="http://schemas.microsoft.com/office/drawing/2014/main" id="{E1457C3D-61FA-49FD-AF6F-EA67EEA74276}"/>
-              </a:ext>
-            </a:extLst>
-          </p:cNvPr>
-          <p:cNvSpPr/>
-          <p:nvPr/>
-        </p:nvSpPr>
-        <p:spPr>
-          <a:xfrm>
-            <a:off x="8475859" y="2523966"/>
-            <a:ext cx="3002838" cy="1477328"/>
-          </a:xfrm>
-          <a:prstGeom prst="rect">
-            <a:avLst/>
-          </a:prstGeom>
-          <a:ln w="57150">
-            <a:noFill/>
-          </a:ln>
-        </p:spPr>
-        <p:txBody>
-          <a:bodyPr wrap="square">
-            <a:spAutoFit/>
-          </a:bodyPr>
-          <a:lstStyle/>
-          <a:p>
-            <a:pPr algn="just"/>
-            <a:r>
-              <a:rPr lang="es-CO" dirty="0">
-                <a:solidFill>
-                  <a:schemeClr val="bg1"/>
-                </a:solidFill>
-              </a:rPr>
-              <a:t>Si no ingresas completa la información o la ingresas de forma errada, la casilla o casillas faltantes se bordearán de rojo</a:t>
-            </a:r>
-          </a:p>
-        </p:txBody>
-      </p:sp>
-      <p:sp>
-        <p:nvSpPr>
-          <p:cNvPr id="8" name="Rectángulo 7">
-            <a:extLst>
-              <a:ext uri="{FF2B5EF4-FFF2-40B4-BE49-F238E27FC236}">
-                <a16:creationId xmlns="" xmlns:a16="http://schemas.microsoft.com/office/drawing/2014/main" id="{72818E13-AF1A-427E-B3C6-AF8D70002212}"/>
-              </a:ext>
-            </a:extLst>
-          </p:cNvPr>
-          <p:cNvSpPr/>
-          <p:nvPr/>
-        </p:nvSpPr>
-        <p:spPr>
-          <a:xfrm>
-            <a:off x="8475859" y="916922"/>
-            <a:ext cx="2972289" cy="707886"/>
-          </a:xfrm>
-          <a:prstGeom prst="rect">
-            <a:avLst/>
-          </a:prstGeom>
-          <a:noFill/>
-        </p:spPr>
-        <p:txBody>
-          <a:bodyPr wrap="none" lIns="91440" tIns="45720" rIns="91440" bIns="45720">
-            <a:spAutoFit/>
-          </a:bodyPr>
-          <a:lstStyle/>
-          <a:p>
-            <a:pPr algn="ctr"/>
-            <a:r>
-              <a:rPr lang="es-ES" sz="4000" b="1" dirty="0">
-                <a:ln w="12700">
-                  <a:solidFill>
-                    <a:schemeClr val="accent5"/>
-                  </a:solidFill>
-                  <a:prstDash val="solid"/>
-                </a:ln>
-                <a:pattFill prst="ltDnDiag">
-                  <a:fgClr>
-                    <a:schemeClr val="accent5">
-                      <a:lumMod val="60000"/>
-                      <a:lumOff val="40000"/>
-                    </a:schemeClr>
-                  </a:fgClr>
-                  <a:bgClr>
-                    <a:schemeClr val="bg1"/>
-                  </a:bgClr>
-                </a:pattFill>
-              </a:rPr>
-              <a:t>3. Soluciones</a:t>
-            </a:r>
-            <a:endParaRPr lang="es-ES" sz="4000" b="1" cap="none" spc="0" dirty="0">
-              <a:ln w="12700">
-                <a:solidFill>
-                  <a:schemeClr val="accent5"/>
-                </a:solidFill>
-                <a:prstDash val="solid"/>
-              </a:ln>
-              <a:pattFill prst="ltDnDiag">
-                <a:fgClr>
-                  <a:schemeClr val="accent5">
-                    <a:lumMod val="60000"/>
-                    <a:lumOff val="40000"/>
-                  </a:schemeClr>
-                </a:fgClr>
-                <a:bgClr>
-                  <a:schemeClr val="bg1"/>
-                </a:bgClr>
-              </a:pattFill>
-              <a:effectLst/>
-            </a:endParaRPr>
-          </a:p>
-        </p:txBody>
-      </p:sp>
-      <p:sp>
-        <p:nvSpPr>
-          <p:cNvPr id="9" name="Rectángulo 8">
-            <a:extLst>
-              <a:ext uri="{FF2B5EF4-FFF2-40B4-BE49-F238E27FC236}">
-                <a16:creationId xmlns="" xmlns:a16="http://schemas.microsoft.com/office/drawing/2014/main" id="{0CBB14D7-2A5A-42EB-858E-22A559096119}"/>
-              </a:ext>
-            </a:extLst>
-          </p:cNvPr>
-          <p:cNvSpPr/>
-          <p:nvPr/>
-        </p:nvSpPr>
-        <p:spPr>
-          <a:xfrm>
-            <a:off x="0" y="5032922"/>
-            <a:ext cx="3002838" cy="646331"/>
-          </a:xfrm>
-          <a:prstGeom prst="rect">
-            <a:avLst/>
-          </a:prstGeom>
-          <a:ln w="57150">
-            <a:noFill/>
-          </a:ln>
-        </p:spPr>
-        <p:txBody>
-          <a:bodyPr wrap="square">
-            <a:spAutoFit/>
-          </a:bodyPr>
-          <a:lstStyle/>
-          <a:p>
-            <a:pPr algn="just"/>
-            <a:r>
-              <a:rPr lang="es-CO" dirty="0">
-                <a:solidFill>
-                  <a:schemeClr val="bg1"/>
-                </a:solidFill>
-              </a:rPr>
-              <a:t>No olvides aceptar los Términos y condiciones</a:t>
-            </a:r>
-          </a:p>
-        </p:txBody>
-      </p:sp>
-      <p:sp>
-        <p:nvSpPr>
-          <p:cNvPr id="10" name="Flecha: a la derecha con bandas 9">
-            <a:extLst>
-              <a:ext uri="{FF2B5EF4-FFF2-40B4-BE49-F238E27FC236}">
-                <a16:creationId xmlns="" xmlns:a16="http://schemas.microsoft.com/office/drawing/2014/main" id="{170ADD24-8020-44C3-B121-0ADF7A6DBA05}"/>
-              </a:ext>
-            </a:extLst>
-          </p:cNvPr>
-          <p:cNvSpPr/>
-          <p:nvPr/>
-        </p:nvSpPr>
-        <p:spPr>
-          <a:xfrm>
-            <a:off x="3144960" y="5032922"/>
-            <a:ext cx="1020097" cy="762802"/>
-          </a:xfrm>
-          <a:prstGeom prst="stripedRightArrow">
-            <a:avLst/>
-          </a:prstGeom>
-        </p:spPr>
-        <p:style>
-          <a:lnRef idx="2">
-            <a:schemeClr val="accent1">
-              <a:shade val="50000"/>
-            </a:schemeClr>
-          </a:lnRef>
-          <a:fillRef idx="1">
-            <a:schemeClr val="accent1"/>
-          </a:fillRef>
-          <a:effectRef idx="0">
-            <a:schemeClr val="accent1"/>
-          </a:effectRef>
-          <a:fontRef idx="minor">
-            <a:schemeClr val="lt1"/>
-          </a:fontRef>
-        </p:style>
-        <p:txBody>
-          <a:bodyPr rtlCol="0" anchor="ctr"/>
-          <a:lstStyle/>
-          <a:p>
-            <a:pPr algn="ctr"/>
-            <a:endParaRPr lang="es-CO"/>
-          </a:p>
-        </p:txBody>
-      </p:sp>
-      <p:sp>
-        <p:nvSpPr>
-          <p:cNvPr id="11" name="10 Marcador de número de diapositiva"/>
-          <p:cNvSpPr>
-            <a:spLocks noGrp="1"/>
-          </p:cNvSpPr>
-          <p:nvPr>
-            <p:ph type="sldNum" sz="quarter" idx="12"/>
-          </p:nvPr>
-        </p:nvSpPr>
-        <p:spPr/>
-        <p:txBody>
-          <a:bodyPr/>
-          <a:lstStyle/>
-          <a:p>
-            <a:fld id="{E0424837-0642-404A-AA2B-7540A8D7DF1F}" type="slidenum">
-              <a:rPr lang="es-CO" smtClean="0"/>
-              <a:pPr/>
-              <a:t>5</a:t>
-            </a:fld>
-            <a:endParaRPr lang="es-CO"/>
-          </a:p>
-        </p:txBody>
-      </p:sp>
-    </p:spTree>
-    <p:extLst>
-      <p:ext uri="{BB962C8B-B14F-4D97-AF65-F5344CB8AC3E}">
-        <p14:creationId xmlns="" xmlns:p14="http://schemas.microsoft.com/office/powerpoint/2010/main" val="822748079"/>
-      </p:ext>
-    </p:extLst>
-  </p:cSld>
-  <p:clrMapOvr>
-    <a:masterClrMapping/>
-  </p:clrMapOvr>
-</p:sld>
-</file>
-
-<file path=ppt/slides/slide6.xml><?xml version="1.0" encoding="utf-8"?>
-<p:sld xmlns:a="http://schemas.openxmlformats.org/drawingml/2006/main" xmlns:r="http://schemas.openxmlformats.org/officeDocument/2006/relationships" xmlns:p="http://schemas.openxmlformats.org/presentationml/2006/main">
-  <p:cSld>
-    <p:spTree>
-      <p:nvGrpSpPr>
-        <p:cNvPr id="1" name=""/>
-        <p:cNvGrpSpPr/>
-        <p:nvPr/>
-      </p:nvGrpSpPr>
-      <p:grpSpPr>
-        <a:xfrm>
-          <a:off x="0" y="0"/>
-          <a:ext cx="0" cy="0"/>
-          <a:chOff x="0" y="0"/>
-          <a:chExt cx="0" cy="0"/>
-        </a:xfrm>
-      </p:grpSpPr>
-      <p:sp>
-        <p:nvSpPr>
-          <p:cNvPr id="4" name="3 Marcador de número de diapositiva"/>
-          <p:cNvSpPr>
-            <a:spLocks noGrp="1"/>
-          </p:cNvSpPr>
-          <p:nvPr>
-            <p:ph type="sldNum" sz="quarter" idx="12"/>
-          </p:nvPr>
-        </p:nvSpPr>
-        <p:spPr/>
-        <p:txBody>
-          <a:bodyPr/>
-          <a:lstStyle/>
-          <a:p>
-            <a:fld id="{E0424837-0642-404A-AA2B-7540A8D7DF1F}" type="slidenum">
-              <a:rPr lang="es-CO" smtClean="0"/>
-              <a:pPr/>
-              <a:t>6</a:t>
-            </a:fld>
-            <a:endParaRPr lang="es-CO"/>
-          </a:p>
-        </p:txBody>
-      </p:sp>
-      <p:pic>
-        <p:nvPicPr>
-          <p:cNvPr id="2051" name="Picture 3"/>
-          <p:cNvPicPr>
-            <a:picLocks noChangeAspect="1" noChangeArrowheads="1"/>
-          </p:cNvPicPr>
-          <p:nvPr/>
-        </p:nvPicPr>
-        <p:blipFill>
-          <a:blip r:embed="rId2"/>
-          <a:srcRect l="2810" r="17575"/>
-          <a:stretch>
-            <a:fillRect/>
-          </a:stretch>
-        </p:blipFill>
-        <p:spPr bwMode="auto">
-          <a:xfrm>
-            <a:off x="0" y="0"/>
-            <a:ext cx="12192000" cy="6858000"/>
-          </a:xfrm>
-          <a:prstGeom prst="rect">
-            <a:avLst/>
-          </a:prstGeom>
-          <a:noFill/>
-          <a:ln w="9525">
-            <a:noFill/>
-            <a:miter lim="800000"/>
-            <a:headEnd/>
-            <a:tailEnd/>
-          </a:ln>
-          <a:effectLst/>
-        </p:spPr>
-      </p:pic>
-      <p:pic>
-        <p:nvPicPr>
-          <p:cNvPr id="7" name="Picture 2"/>
-          <p:cNvPicPr>
-            <a:picLocks noChangeAspect="1" noChangeArrowheads="1"/>
-          </p:cNvPicPr>
-          <p:nvPr/>
-        </p:nvPicPr>
-        <p:blipFill>
-          <a:blip r:embed="rId3"/>
-          <a:srcRect b="22117"/>
-          <a:stretch>
-            <a:fillRect/>
-          </a:stretch>
-        </p:blipFill>
-        <p:spPr bwMode="auto">
-          <a:xfrm>
-            <a:off x="450510" y="246502"/>
-            <a:ext cx="6224610" cy="4048935"/>
-          </a:xfrm>
-          <a:prstGeom prst="roundRect">
-            <a:avLst/>
-          </a:prstGeom>
-          <a:ln w="38100" cap="sq">
-            <a:solidFill>
-              <a:srgbClr val="000000"/>
-            </a:solidFill>
-            <a:prstDash val="solid"/>
-            <a:miter lim="800000"/>
-          </a:ln>
-          <a:effectLst>
-            <a:outerShdw blurRad="50800" dist="38100" dir="2700000" algn="tl" rotWithShape="0">
-              <a:srgbClr val="000000">
-                <a:alpha val="43000"/>
-              </a:srgbClr>
-            </a:outerShdw>
-          </a:effectLst>
-        </p:spPr>
-      </p:pic>
-      <p:sp>
-        <p:nvSpPr>
-          <p:cNvPr id="8" name="Rectángulo 6">
-            <a:extLst>
-              <a:ext uri="{FF2B5EF4-FFF2-40B4-BE49-F238E27FC236}">
-                <a16:creationId xmlns="" xmlns:a16="http://schemas.microsoft.com/office/drawing/2014/main" id="{E1457C3D-61FA-49FD-AF6F-EA67EEA74276}"/>
-              </a:ext>
-            </a:extLst>
-          </p:cNvPr>
-          <p:cNvSpPr/>
-          <p:nvPr/>
-        </p:nvSpPr>
-        <p:spPr>
-          <a:xfrm>
-            <a:off x="8998373" y="2994229"/>
-            <a:ext cx="3002838" cy="923330"/>
-          </a:xfrm>
-          <a:prstGeom prst="rect">
-            <a:avLst/>
-          </a:prstGeom>
-          <a:ln w="57150">
-            <a:noFill/>
-          </a:ln>
-        </p:spPr>
-        <p:txBody>
-          <a:bodyPr wrap="square">
-            <a:spAutoFit/>
-          </a:bodyPr>
-          <a:lstStyle/>
-          <a:p>
-            <a:pPr algn="just"/>
-            <a:r>
-              <a:rPr lang="es-CO" dirty="0" smtClean="0">
-                <a:solidFill>
-                  <a:schemeClr val="bg1"/>
-                </a:solidFill>
-              </a:rPr>
-              <a:t>Puedes dar click en términos y condiciones para revisarlos en una nueva ventana</a:t>
-            </a:r>
-            <a:endParaRPr lang="es-CO" dirty="0">
-              <a:solidFill>
-                <a:schemeClr val="bg1"/>
-              </a:solidFill>
-            </a:endParaRPr>
-          </a:p>
-        </p:txBody>
-      </p:sp>
-      <p:sp>
-        <p:nvSpPr>
-          <p:cNvPr id="9" name="Flecha: a la derecha con bandas 9">
-            <a:extLst>
-              <a:ext uri="{FF2B5EF4-FFF2-40B4-BE49-F238E27FC236}">
-                <a16:creationId xmlns="" xmlns:a16="http://schemas.microsoft.com/office/drawing/2014/main" id="{170ADD24-8020-44C3-B121-0ADF7A6DBA05}"/>
-              </a:ext>
-            </a:extLst>
-          </p:cNvPr>
-          <p:cNvSpPr/>
-          <p:nvPr/>
-        </p:nvSpPr>
-        <p:spPr>
-          <a:xfrm rot="9640242">
-            <a:off x="8592172" y="4092396"/>
-            <a:ext cx="1020097" cy="762802"/>
-          </a:xfrm>
-          <a:prstGeom prst="stripedRightArrow">
-            <a:avLst/>
-          </a:prstGeom>
-        </p:spPr>
-        <p:style>
-          <a:lnRef idx="2">
-            <a:schemeClr val="accent1">
-              <a:shade val="50000"/>
-            </a:schemeClr>
-          </a:lnRef>
-          <a:fillRef idx="1">
-            <a:schemeClr val="accent1"/>
-          </a:fillRef>
-          <a:effectRef idx="0">
-            <a:schemeClr val="accent1"/>
-          </a:effectRef>
-          <a:fontRef idx="minor">
-            <a:schemeClr val="lt1"/>
-          </a:fontRef>
-        </p:style>
-        <p:txBody>
-          <a:bodyPr rtlCol="0" anchor="ctr"/>
-          <a:lstStyle/>
-          <a:p>
-            <a:pPr algn="ctr"/>
-            <a:endParaRPr lang="es-CO"/>
-          </a:p>
-        </p:txBody>
-      </p:sp>
-    </p:spTree>
   </p:cSld>
   <p:clrMapOvr>
     <a:masterClrMapping/>
@@ -6648,7 +7330,13 @@
       </p:grpSpPr>
       <p:sp>
         <p:nvSpPr>
-          <p:cNvPr id="2" name="1 Título"/>
+          <p:cNvPr id="2" name="Título 1">
+            <a:extLst>
+              <a:ext uri="{FF2B5EF4-FFF2-40B4-BE49-F238E27FC236}">
+                <a16:creationId xmlns:a16="http://schemas.microsoft.com/office/drawing/2014/main" xmlns="" id="{AF781C62-DAE4-4F1E-8D64-7654F687D5EA}"/>
+              </a:ext>
+            </a:extLst>
+          </p:cNvPr>
           <p:cNvSpPr>
             <a:spLocks noGrp="1"/>
           </p:cNvSpPr>
@@ -6661,13 +7349,19 @@
           <a:bodyPr/>
           <a:lstStyle/>
           <a:p>
-            <a:endParaRPr lang="en-US"/>
-          </a:p>
-        </p:txBody>
-      </p:sp>
-      <p:sp>
-        <p:nvSpPr>
-          <p:cNvPr id="3" name="2 Marcador de contenido"/>
+            <a:endParaRPr lang="es-CO"/>
+          </a:p>
+        </p:txBody>
+      </p:sp>
+      <p:sp>
+        <p:nvSpPr>
+          <p:cNvPr id="3" name="Marcador de contenido 2">
+            <a:extLst>
+              <a:ext uri="{FF2B5EF4-FFF2-40B4-BE49-F238E27FC236}">
+                <a16:creationId xmlns:a16="http://schemas.microsoft.com/office/drawing/2014/main" xmlns="" id="{3506D3BC-A174-407E-B275-4CA4E5B331B8}"/>
+              </a:ext>
+            </a:extLst>
+          </p:cNvPr>
           <p:cNvSpPr>
             <a:spLocks noGrp="1"/>
           </p:cNvSpPr>
@@ -6680,106 +7374,217 @@
           <a:bodyPr/>
           <a:lstStyle/>
           <a:p>
-            <a:endParaRPr lang="en-US" dirty="0"/>
+            <a:endParaRPr lang="es-CO"/>
           </a:p>
         </p:txBody>
       </p:sp>
       <p:pic>
         <p:nvPicPr>
-          <p:cNvPr id="1026" name="Picture 2"/>
+          <p:cNvPr id="5" name="Imagen 4">
+            <a:extLst>
+              <a:ext uri="{FF2B5EF4-FFF2-40B4-BE49-F238E27FC236}">
+                <a16:creationId xmlns:a16="http://schemas.microsoft.com/office/drawing/2014/main" xmlns="" id="{AA0436B4-9B1F-448D-B703-BE3A2771195A}"/>
+              </a:ext>
+            </a:extLst>
+          </p:cNvPr>
           <p:cNvPicPr>
-            <a:picLocks noChangeAspect="1" noChangeArrowheads="1"/>
+            <a:picLocks noChangeAspect="1"/>
           </p:cNvPicPr>
           <p:nvPr/>
         </p:nvPicPr>
         <p:blipFill>
           <a:blip r:embed="rId2"/>
-          <a:srcRect t="11877" r="9808" b="8632"/>
           <a:stretch>
             <a:fillRect/>
           </a:stretch>
         </p:blipFill>
-        <p:spPr bwMode="auto">
+        <p:spPr>
           <a:xfrm>
-            <a:off x="0" y="-377371"/>
-            <a:ext cx="12100225" cy="6574972"/>
+            <a:off x="0" y="1673"/>
+            <a:ext cx="12192000" cy="6854653"/>
+          </a:xfrm>
+          <a:prstGeom prst="rect">
+            <a:avLst/>
+          </a:prstGeom>
+        </p:spPr>
+      </p:pic>
+      <p:sp>
+        <p:nvSpPr>
+          <p:cNvPr id="7" name="Rectángulo 6">
+            <a:extLst>
+              <a:ext uri="{FF2B5EF4-FFF2-40B4-BE49-F238E27FC236}">
+                <a16:creationId xmlns:a16="http://schemas.microsoft.com/office/drawing/2014/main" xmlns="" id="{E1457C3D-61FA-49FD-AF6F-EA67EEA74276}"/>
+              </a:ext>
+            </a:extLst>
+          </p:cNvPr>
+          <p:cNvSpPr/>
+          <p:nvPr/>
+        </p:nvSpPr>
+        <p:spPr>
+          <a:xfrm>
+            <a:off x="8475859" y="2523966"/>
+            <a:ext cx="3002838" cy="1477328"/>
+          </a:xfrm>
+          <a:prstGeom prst="rect">
+            <a:avLst/>
+          </a:prstGeom>
+          <a:ln w="57150">
+            <a:noFill/>
+          </a:ln>
+        </p:spPr>
+        <p:txBody>
+          <a:bodyPr wrap="square">
+            <a:spAutoFit/>
+          </a:bodyPr>
+          <a:lstStyle/>
+          <a:p>
+            <a:pPr algn="just"/>
+            <a:r>
+              <a:rPr lang="es-CO" dirty="0">
+                <a:solidFill>
+                  <a:schemeClr val="bg1"/>
+                </a:solidFill>
+              </a:rPr>
+              <a:t>Si no ingresas completa la información o la ingresas de forma errada, la casilla o casillas faltantes se bordearán de rojo</a:t>
+            </a:r>
+          </a:p>
+        </p:txBody>
+      </p:sp>
+      <p:sp>
+        <p:nvSpPr>
+          <p:cNvPr id="8" name="Rectángulo 7">
+            <a:extLst>
+              <a:ext uri="{FF2B5EF4-FFF2-40B4-BE49-F238E27FC236}">
+                <a16:creationId xmlns:a16="http://schemas.microsoft.com/office/drawing/2014/main" xmlns="" id="{72818E13-AF1A-427E-B3C6-AF8D70002212}"/>
+              </a:ext>
+            </a:extLst>
+          </p:cNvPr>
+          <p:cNvSpPr/>
+          <p:nvPr/>
+        </p:nvSpPr>
+        <p:spPr>
+          <a:xfrm>
+            <a:off x="8475859" y="916922"/>
+            <a:ext cx="2972289" cy="707886"/>
           </a:xfrm>
           <a:prstGeom prst="rect">
             <a:avLst/>
           </a:prstGeom>
           <a:noFill/>
-          <a:ln w="9525">
-            <a:noFill/>
-            <a:miter lim="800000"/>
-            <a:headEnd/>
-            <a:tailEnd/>
-          </a:ln>
-          <a:effectLst/>
-        </p:spPr>
-      </p:pic>
-      <p:sp>
-        <p:nvSpPr>
-          <p:cNvPr id="5" name="CuadroTexto 6">
-            <a:extLst>
-              <a:ext uri="{FF2B5EF4-FFF2-40B4-BE49-F238E27FC236}">
-                <a16:creationId xmlns="" xmlns:a16="http://schemas.microsoft.com/office/drawing/2014/main" id="{4C1428CB-200C-4FCD-994D-30D30253A07B}"/>
-              </a:ext>
-            </a:extLst>
-          </p:cNvPr>
-          <p:cNvSpPr txBox="1"/>
+        </p:spPr>
+        <p:txBody>
+          <a:bodyPr wrap="none" lIns="91440" tIns="45720" rIns="91440" bIns="45720">
+            <a:spAutoFit/>
+          </a:bodyPr>
+          <a:lstStyle/>
+          <a:p>
+            <a:pPr algn="ctr"/>
+            <a:r>
+              <a:rPr lang="es-ES" sz="4000" b="1" dirty="0">
+                <a:ln w="12700">
+                  <a:solidFill>
+                    <a:schemeClr val="accent5"/>
+                  </a:solidFill>
+                  <a:prstDash val="solid"/>
+                </a:ln>
+                <a:pattFill prst="ltDnDiag">
+                  <a:fgClr>
+                    <a:schemeClr val="accent5">
+                      <a:lumMod val="60000"/>
+                      <a:lumOff val="40000"/>
+                    </a:schemeClr>
+                  </a:fgClr>
+                  <a:bgClr>
+                    <a:schemeClr val="bg1"/>
+                  </a:bgClr>
+                </a:pattFill>
+              </a:rPr>
+              <a:t>3. Soluciones</a:t>
+            </a:r>
+            <a:endParaRPr lang="es-ES" sz="4000" b="1" cap="none" spc="0" dirty="0">
+              <a:ln w="12700">
+                <a:solidFill>
+                  <a:schemeClr val="accent5"/>
+                </a:solidFill>
+                <a:prstDash val="solid"/>
+              </a:ln>
+              <a:pattFill prst="ltDnDiag">
+                <a:fgClr>
+                  <a:schemeClr val="accent5">
+                    <a:lumMod val="60000"/>
+                    <a:lumOff val="40000"/>
+                  </a:schemeClr>
+                </a:fgClr>
+                <a:bgClr>
+                  <a:schemeClr val="bg1"/>
+                </a:bgClr>
+              </a:pattFill>
+              <a:effectLst/>
+            </a:endParaRPr>
+          </a:p>
+        </p:txBody>
+      </p:sp>
+      <p:sp>
+        <p:nvSpPr>
+          <p:cNvPr id="9" name="Rectángulo 8">
+            <a:extLst>
+              <a:ext uri="{FF2B5EF4-FFF2-40B4-BE49-F238E27FC236}">
+                <a16:creationId xmlns:a16="http://schemas.microsoft.com/office/drawing/2014/main" xmlns="" id="{0CBB14D7-2A5A-42EB-858E-22A559096119}"/>
+              </a:ext>
+            </a:extLst>
+          </p:cNvPr>
+          <p:cNvSpPr/>
           <p:nvPr/>
         </p:nvSpPr>
         <p:spPr>
           <a:xfrm>
-            <a:off x="8280063" y="1571053"/>
-            <a:ext cx="3505537" cy="1477328"/>
+            <a:off x="0" y="5032922"/>
+            <a:ext cx="3002838" cy="646331"/>
           </a:xfrm>
           <a:prstGeom prst="rect">
             <a:avLst/>
           </a:prstGeom>
-          <a:solidFill>
-            <a:schemeClr val="accent1">
-              <a:lumMod val="20000"/>
-              <a:lumOff val="80000"/>
-            </a:schemeClr>
-          </a:solidFill>
           <a:ln w="57150">
-            <a:solidFill>
-              <a:srgbClr val="00B0F0"/>
-            </a:solidFill>
+            <a:noFill/>
           </a:ln>
         </p:spPr>
         <p:txBody>
-          <a:bodyPr wrap="square" rtlCol="0">
+          <a:bodyPr wrap="square">
             <a:spAutoFit/>
           </a:bodyPr>
           <a:lstStyle/>
           <a:p>
             <a:pPr algn="just"/>
             <a:r>
-              <a:rPr lang="es-CO" b="1" dirty="0" smtClean="0"/>
-              <a:t>Dando click en la palabra USUARIO tienes dos opciones, en perfil puedes actualizar los datos de tu cuenta PLAY WEB y también puedes cerrar sesión.</a:t>
-            </a:r>
-            <a:endParaRPr lang="es-CO" b="1" dirty="0"/>
-          </a:p>
-        </p:txBody>
-      </p:sp>
-      <p:sp>
-        <p:nvSpPr>
-          <p:cNvPr id="9" name="8 Flecha abajo"/>
+              <a:rPr lang="es-CO" dirty="0">
+                <a:solidFill>
+                  <a:schemeClr val="bg1"/>
+                </a:solidFill>
+              </a:rPr>
+              <a:t>No olvides aceptar los Términos y condiciones</a:t>
+            </a:r>
+          </a:p>
+        </p:txBody>
+      </p:sp>
+      <p:sp>
+        <p:nvSpPr>
+          <p:cNvPr id="10" name="Flecha: a la derecha con bandas 9">
+            <a:extLst>
+              <a:ext uri="{FF2B5EF4-FFF2-40B4-BE49-F238E27FC236}">
+                <a16:creationId xmlns:a16="http://schemas.microsoft.com/office/drawing/2014/main" xmlns="" id="{170ADD24-8020-44C3-B121-0ADF7A6DBA05}"/>
+              </a:ext>
+            </a:extLst>
+          </p:cNvPr>
           <p:cNvSpPr/>
           <p:nvPr/>
         </p:nvSpPr>
         <p:spPr>
-          <a:xfrm rot="11537676">
-            <a:off x="8706421" y="125540"/>
-            <a:ext cx="551778" cy="1419236"/>
-          </a:xfrm>
-          <a:prstGeom prst="downArrow">
-            <a:avLst>
-              <a:gd name="adj1" fmla="val 31350"/>
-              <a:gd name="adj2" fmla="val 119870"/>
-            </a:avLst>
+          <a:xfrm>
+            <a:off x="3144960" y="5032922"/>
+            <a:ext cx="1020097" cy="762802"/>
+          </a:xfrm>
+          <a:prstGeom prst="stripedRightArrow">
+            <a:avLst/>
           </a:prstGeom>
         </p:spPr>
         <p:style>
@@ -6803,13 +7608,13 @@
           <a:lstStyle/>
           <a:p>
             <a:pPr algn="ctr"/>
-            <a:endParaRPr lang="en-US"/>
-          </a:p>
-        </p:txBody>
-      </p:sp>
-      <p:sp>
-        <p:nvSpPr>
-          <p:cNvPr id="7" name="6 Marcador de número de diapositiva"/>
+            <a:endParaRPr lang="es-CO"/>
+          </a:p>
+        </p:txBody>
+      </p:sp>
+      <p:sp>
+        <p:nvSpPr>
+          <p:cNvPr id="11" name="10 Marcador de número de diapositiva"/>
           <p:cNvSpPr>
             <a:spLocks noGrp="1"/>
           </p:cNvSpPr>
@@ -6832,6 +7637,11 @@
         </p:txBody>
       </p:sp>
     </p:spTree>
+    <p:extLst>
+      <p:ext uri="{BB962C8B-B14F-4D97-AF65-F5344CB8AC3E}">
+        <p14:creationId xmlns:p14="http://schemas.microsoft.com/office/powerpoint/2010/main" xmlns="" val="822748079"/>
+      </p:ext>
+    </p:extLst>
   </p:cSld>
   <p:clrMapOvr>
     <a:masterClrMapping/>
@@ -6856,9 +7666,33 @@
           <a:chExt cx="0" cy="0"/>
         </a:xfrm>
       </p:grpSpPr>
+      <p:sp>
+        <p:nvSpPr>
+          <p:cNvPr id="4" name="3 Marcador de número de diapositiva"/>
+          <p:cNvSpPr>
+            <a:spLocks noGrp="1"/>
+          </p:cNvSpPr>
+          <p:nvPr>
+            <p:ph type="sldNum" sz="quarter" idx="12"/>
+          </p:nvPr>
+        </p:nvSpPr>
+        <p:spPr/>
+        <p:txBody>
+          <a:bodyPr/>
+          <a:lstStyle/>
+          <a:p>
+            <a:fld id="{E0424837-0642-404A-AA2B-7540A8D7DF1F}" type="slidenum">
+              <a:rPr lang="es-CO" smtClean="0"/>
+              <a:pPr/>
+              <a:t>8</a:t>
+            </a:fld>
+            <a:endParaRPr lang="es-CO"/>
+          </a:p>
+        </p:txBody>
+      </p:sp>
       <p:pic>
         <p:nvPicPr>
-          <p:cNvPr id="17" name="Picture 4"/>
+          <p:cNvPr id="2051" name="Picture 3"/>
           <p:cNvPicPr>
             <a:picLocks noChangeAspect="1" noChangeArrowheads="1"/>
           </p:cNvPicPr>
@@ -6866,15 +7700,15 @@
         </p:nvPicPr>
         <p:blipFill>
           <a:blip r:embed="rId2"/>
-          <a:srcRect/>
+          <a:srcRect l="2810" r="17575"/>
           <a:stretch>
             <a:fillRect/>
           </a:stretch>
         </p:blipFill>
         <p:spPr bwMode="auto">
           <a:xfrm>
-            <a:off x="1127743" y="458689"/>
-            <a:ext cx="4235827" cy="6034457"/>
+            <a:off x="0" y="0"/>
+            <a:ext cx="12192000" cy="6858000"/>
           </a:xfrm>
           <a:prstGeom prst="rect">
             <a:avLst/>
@@ -6889,72 +7723,112 @@
           <a:effectLst/>
         </p:spPr>
       </p:pic>
-      <p:sp>
-        <p:nvSpPr>
-          <p:cNvPr id="11" name="CuadroTexto 6">
-            <a:extLst>
-              <a:ext uri="{FF2B5EF4-FFF2-40B4-BE49-F238E27FC236}">
-                <a16:creationId xmlns="" xmlns:a16="http://schemas.microsoft.com/office/drawing/2014/main" id="{4C1428CB-200C-4FCD-994D-30D30253A07B}"/>
-              </a:ext>
-            </a:extLst>
-          </p:cNvPr>
-          <p:cNvSpPr txBox="1"/>
+      <p:pic>
+        <p:nvPicPr>
+          <p:cNvPr id="7" name="Picture 2"/>
+          <p:cNvPicPr>
+            <a:picLocks noChangeAspect="1" noChangeArrowheads="1"/>
+          </p:cNvPicPr>
+          <p:nvPr/>
+        </p:nvPicPr>
+        <p:blipFill>
+          <a:blip r:embed="rId3"/>
+          <a:srcRect b="22117"/>
+          <a:stretch>
+            <a:fillRect/>
+          </a:stretch>
+        </p:blipFill>
+        <p:spPr bwMode="auto">
+          <a:xfrm>
+            <a:off x="450510" y="246502"/>
+            <a:ext cx="6224610" cy="4048935"/>
+          </a:xfrm>
+          <a:prstGeom prst="roundRect">
+            <a:avLst/>
+          </a:prstGeom>
+          <a:ln w="38100" cap="sq">
+            <a:solidFill>
+              <a:srgbClr val="000000"/>
+            </a:solidFill>
+            <a:prstDash val="solid"/>
+            <a:miter lim="800000"/>
+          </a:ln>
+          <a:effectLst>
+            <a:outerShdw blurRad="50800" dist="38100" dir="2700000" algn="tl" rotWithShape="0">
+              <a:srgbClr val="000000">
+                <a:alpha val="43000"/>
+              </a:srgbClr>
+            </a:outerShdw>
+          </a:effectLst>
+        </p:spPr>
+      </p:pic>
+      <p:sp>
+        <p:nvSpPr>
+          <p:cNvPr id="8" name="Rectángulo 6">
+            <a:extLst>
+              <a:ext uri="{FF2B5EF4-FFF2-40B4-BE49-F238E27FC236}">
+                <a16:creationId xmlns:a16="http://schemas.microsoft.com/office/drawing/2014/main" xmlns="" id="{E1457C3D-61FA-49FD-AF6F-EA67EEA74276}"/>
+              </a:ext>
+            </a:extLst>
+          </p:cNvPr>
+          <p:cNvSpPr/>
           <p:nvPr/>
         </p:nvSpPr>
         <p:spPr>
           <a:xfrm>
-            <a:off x="309767" y="2949475"/>
-            <a:ext cx="1928461" cy="1477328"/>
+            <a:off x="8998373" y="2994229"/>
+            <a:ext cx="3002838" cy="923330"/>
           </a:xfrm>
           <a:prstGeom prst="rect">
             <a:avLst/>
           </a:prstGeom>
-          <a:solidFill>
-            <a:schemeClr val="accent1">
-              <a:lumMod val="20000"/>
-              <a:lumOff val="80000"/>
-            </a:schemeClr>
-          </a:solidFill>
           <a:ln w="57150">
-            <a:solidFill>
-              <a:srgbClr val="00B0F0"/>
-            </a:solidFill>
+            <a:noFill/>
           </a:ln>
         </p:spPr>
         <p:txBody>
-          <a:bodyPr wrap="square" rtlCol="0">
+          <a:bodyPr wrap="square">
             <a:spAutoFit/>
           </a:bodyPr>
           <a:lstStyle/>
           <a:p>
             <a:pPr algn="just"/>
             <a:r>
-              <a:rPr lang="es-CO" b="1" dirty="0" smtClean="0"/>
-              <a:t>Acá vas a poder modificar los datos  que habías ingresado al registrarte.</a:t>
-            </a:r>
-            <a:endParaRPr lang="es-CO" b="1" dirty="0"/>
-          </a:p>
-        </p:txBody>
-      </p:sp>
-      <p:sp>
-        <p:nvSpPr>
-          <p:cNvPr id="14" name="13 Elipse"/>
+              <a:rPr lang="es-CO" dirty="0" smtClean="0">
+                <a:solidFill>
+                  <a:schemeClr val="bg1"/>
+                </a:solidFill>
+              </a:rPr>
+              <a:t>Puedes dar click en términos y condiciones para revisarlos en una nueva ventana</a:t>
+            </a:r>
+            <a:endParaRPr lang="es-CO" dirty="0">
+              <a:solidFill>
+                <a:schemeClr val="bg1"/>
+              </a:solidFill>
+            </a:endParaRPr>
+          </a:p>
+        </p:txBody>
+      </p:sp>
+      <p:sp>
+        <p:nvSpPr>
+          <p:cNvPr id="9" name="Flecha: a la derecha con bandas 9">
+            <a:extLst>
+              <a:ext uri="{FF2B5EF4-FFF2-40B4-BE49-F238E27FC236}">
+                <a16:creationId xmlns:a16="http://schemas.microsoft.com/office/drawing/2014/main" xmlns="" id="{170ADD24-8020-44C3-B121-0ADF7A6DBA05}"/>
+              </a:ext>
+            </a:extLst>
+          </p:cNvPr>
           <p:cNvSpPr/>
           <p:nvPr/>
         </p:nvSpPr>
         <p:spPr>
-          <a:xfrm>
-            <a:off x="600495" y="1719619"/>
-            <a:ext cx="1228299" cy="1173707"/>
-          </a:xfrm>
-          <a:prstGeom prst="ellipse">
+          <a:xfrm rot="9640242">
+            <a:off x="8592172" y="4092396"/>
+            <a:ext cx="1020097" cy="762802"/>
+          </a:xfrm>
+          <a:prstGeom prst="stripedRightArrow">
             <a:avLst/>
           </a:prstGeom>
-          <a:ln>
-            <a:solidFill>
-              <a:schemeClr val="tx1"/>
-            </a:solidFill>
-          </a:ln>
         </p:spPr>
         <p:style>
           <a:lnRef idx="2">
@@ -6977,273 +7851,7 @@
           <a:lstStyle/>
           <a:p>
             <a:pPr algn="ctr"/>
-            <a:r>
-              <a:rPr lang="en-US" sz="8800" b="1" dirty="0" smtClean="0">
-                <a:ln w="18415" cmpd="sng">
-                  <a:solidFill>
-                    <a:srgbClr val="FFFFFF"/>
-                  </a:solidFill>
-                  <a:prstDash val="solid"/>
-                </a:ln>
-                <a:solidFill>
-                  <a:srgbClr val="FFFFFF"/>
-                </a:solidFill>
-                <a:effectLst>
-                  <a:outerShdw blurRad="63500" dir="3600000" algn="tl" rotWithShape="0">
-                    <a:srgbClr val="000000">
-                      <a:alpha val="70000"/>
-                    </a:srgbClr>
-                  </a:outerShdw>
-                </a:effectLst>
-              </a:rPr>
-              <a:t>1</a:t>
-            </a:r>
-            <a:endParaRPr lang="en-US" b="1" dirty="0">
-              <a:ln w="18415" cmpd="sng">
-                <a:solidFill>
-                  <a:srgbClr val="FFFFFF"/>
-                </a:solidFill>
-                <a:prstDash val="solid"/>
-              </a:ln>
-              <a:solidFill>
-                <a:srgbClr val="FFFFFF"/>
-              </a:solidFill>
-              <a:effectLst>
-                <a:outerShdw blurRad="63500" dir="3600000" algn="tl" rotWithShape="0">
-                  <a:srgbClr val="000000">
-                    <a:alpha val="70000"/>
-                  </a:srgbClr>
-                </a:outerShdw>
-              </a:effectLst>
-            </a:endParaRPr>
-          </a:p>
-        </p:txBody>
-      </p:sp>
-      <p:pic>
-        <p:nvPicPr>
-          <p:cNvPr id="18" name="Picture 5"/>
-          <p:cNvPicPr>
-            <a:picLocks noChangeAspect="1" noChangeArrowheads="1"/>
-          </p:cNvPicPr>
-          <p:nvPr/>
-        </p:nvPicPr>
-        <p:blipFill>
-          <a:blip r:embed="rId3"/>
-          <a:srcRect/>
-          <a:stretch>
-            <a:fillRect/>
-          </a:stretch>
-        </p:blipFill>
-        <p:spPr bwMode="auto">
-          <a:xfrm>
-            <a:off x="6281254" y="477672"/>
-            <a:ext cx="4146649" cy="5964071"/>
-          </a:xfrm>
-          <a:prstGeom prst="rect">
-            <a:avLst/>
-          </a:prstGeom>
-          <a:noFill/>
-          <a:ln w="3175">
-            <a:solidFill>
-              <a:schemeClr val="tx1"/>
-            </a:solidFill>
-            <a:miter lim="800000"/>
-            <a:headEnd/>
-            <a:tailEnd/>
-          </a:ln>
-          <a:effectLst/>
-        </p:spPr>
-      </p:pic>
-      <p:sp>
-        <p:nvSpPr>
-          <p:cNvPr id="20" name="CuadroTexto 6">
-            <a:extLst>
-              <a:ext uri="{FF2B5EF4-FFF2-40B4-BE49-F238E27FC236}">
-                <a16:creationId xmlns="" xmlns:a16="http://schemas.microsoft.com/office/drawing/2014/main" id="{4C1428CB-200C-4FCD-994D-30D30253A07B}"/>
-              </a:ext>
-            </a:extLst>
-          </p:cNvPr>
-          <p:cNvSpPr txBox="1"/>
-          <p:nvPr/>
-        </p:nvSpPr>
-        <p:spPr>
-          <a:xfrm>
-            <a:off x="10388640" y="5300919"/>
-            <a:ext cx="1803360" cy="1200329"/>
-          </a:xfrm>
-          <a:prstGeom prst="rect">
-            <a:avLst/>
-          </a:prstGeom>
-          <a:solidFill>
-            <a:schemeClr val="accent1">
-              <a:lumMod val="20000"/>
-              <a:lumOff val="80000"/>
-            </a:schemeClr>
-          </a:solidFill>
-          <a:ln w="57150">
-            <a:solidFill>
-              <a:srgbClr val="00B0F0"/>
-            </a:solidFill>
-          </a:ln>
-        </p:spPr>
-        <p:txBody>
-          <a:bodyPr wrap="square" rtlCol="0">
-            <a:spAutoFit/>
-          </a:bodyPr>
-          <a:lstStyle/>
-          <a:p>
-            <a:r>
-              <a:rPr lang="es-CO" b="1" dirty="0" smtClean="0"/>
-              <a:t>Le das guardar y ya quedaran actualizados tus datos.</a:t>
-            </a:r>
-            <a:endParaRPr lang="es-CO" b="1" dirty="0"/>
-          </a:p>
-        </p:txBody>
-      </p:sp>
-      <p:sp>
-        <p:nvSpPr>
-          <p:cNvPr id="21" name="20 Elipse"/>
-          <p:cNvSpPr/>
-          <p:nvPr/>
-        </p:nvSpPr>
-        <p:spPr>
-          <a:xfrm>
-            <a:off x="9066916" y="5324903"/>
-            <a:ext cx="1228299" cy="1173707"/>
-          </a:xfrm>
-          <a:prstGeom prst="ellipse">
-            <a:avLst/>
-          </a:prstGeom>
-          <a:ln>
-            <a:solidFill>
-              <a:schemeClr val="tx1"/>
-            </a:solidFill>
-          </a:ln>
-        </p:spPr>
-        <p:style>
-          <a:lnRef idx="2">
-            <a:schemeClr val="accent1">
-              <a:shade val="50000"/>
-            </a:schemeClr>
-          </a:lnRef>
-          <a:fillRef idx="1">
-            <a:schemeClr val="accent1"/>
-          </a:fillRef>
-          <a:effectRef idx="0">
-            <a:schemeClr val="accent1"/>
-          </a:effectRef>
-          <a:fontRef idx="minor">
-            <a:schemeClr val="lt1"/>
-          </a:fontRef>
-        </p:style>
-        <p:txBody>
-          <a:bodyPr rtlCol="0" anchor="ctr"/>
-          <a:lstStyle/>
-          <a:p>
-            <a:pPr algn="ctr"/>
-            <a:r>
-              <a:rPr lang="en-US" sz="8800" b="1" dirty="0" smtClean="0">
-                <a:ln w="18415" cmpd="sng">
-                  <a:solidFill>
-                    <a:srgbClr val="FFFFFF"/>
-                  </a:solidFill>
-                  <a:prstDash val="solid"/>
-                </a:ln>
-                <a:solidFill>
-                  <a:srgbClr val="FFFFFF"/>
-                </a:solidFill>
-                <a:effectLst>
-                  <a:outerShdw blurRad="63500" dir="3600000" algn="tl" rotWithShape="0">
-                    <a:srgbClr val="000000">
-                      <a:alpha val="70000"/>
-                    </a:srgbClr>
-                  </a:outerShdw>
-                </a:effectLst>
-              </a:rPr>
-              <a:t>2</a:t>
-            </a:r>
-            <a:endParaRPr lang="en-US" b="1" dirty="0">
-              <a:ln w="18415" cmpd="sng">
-                <a:solidFill>
-                  <a:srgbClr val="FFFFFF"/>
-                </a:solidFill>
-                <a:prstDash val="solid"/>
-              </a:ln>
-              <a:solidFill>
-                <a:srgbClr val="FFFFFF"/>
-              </a:solidFill>
-              <a:effectLst>
-                <a:outerShdw blurRad="63500" dir="3600000" algn="tl" rotWithShape="0">
-                  <a:srgbClr val="000000">
-                    <a:alpha val="70000"/>
-                  </a:srgbClr>
-                </a:outerShdw>
-              </a:effectLst>
-            </a:endParaRPr>
-          </a:p>
-        </p:txBody>
-      </p:sp>
-      <p:sp>
-        <p:nvSpPr>
-          <p:cNvPr id="8" name="7 Marcador de número de diapositiva"/>
-          <p:cNvSpPr>
-            <a:spLocks noGrp="1"/>
-          </p:cNvSpPr>
-          <p:nvPr>
-            <p:ph type="sldNum" sz="quarter" idx="12"/>
-          </p:nvPr>
-        </p:nvSpPr>
-        <p:spPr/>
-        <p:txBody>
-          <a:bodyPr/>
-          <a:lstStyle/>
-          <a:p>
-            <a:fld id="{E0424837-0642-404A-AA2B-7540A8D7DF1F}" type="slidenum">
-              <a:rPr lang="es-CO" smtClean="0"/>
-              <a:pPr/>
-              <a:t>8</a:t>
-            </a:fld>
             <a:endParaRPr lang="es-CO"/>
-          </a:p>
-        </p:txBody>
-      </p:sp>
-      <p:sp>
-        <p:nvSpPr>
-          <p:cNvPr id="9" name="8 Flecha derecha"/>
-          <p:cNvSpPr/>
-          <p:nvPr/>
-        </p:nvSpPr>
-        <p:spPr>
-          <a:xfrm>
-            <a:off x="5473337" y="2991394"/>
-            <a:ext cx="666206" cy="496389"/>
-          </a:xfrm>
-          <a:prstGeom prst="rightArrow">
-            <a:avLst/>
-          </a:prstGeom>
-        </p:spPr>
-        <p:style>
-          <a:lnRef idx="2">
-            <a:schemeClr val="accent1">
-              <a:shade val="50000"/>
-            </a:schemeClr>
-          </a:lnRef>
-          <a:fillRef idx="1">
-            <a:schemeClr val="accent1"/>
-          </a:fillRef>
-          <a:effectRef idx="0">
-            <a:schemeClr val="accent1"/>
-          </a:effectRef>
-          <a:fontRef idx="minor">
-            <a:schemeClr val="lt1"/>
-          </a:fontRef>
-        </p:style>
-        <p:txBody>
-          <a:bodyPr rtlCol="0" anchor="ctr"/>
-          <a:lstStyle/>
-          <a:p>
-            <a:pPr algn="ctr"/>
-            <a:endParaRPr lang="en-US"/>
           </a:p>
         </p:txBody>
       </p:sp>
@@ -7272,9 +7880,47 @@
           <a:chExt cx="0" cy="0"/>
         </a:xfrm>
       </p:grpSpPr>
+      <p:sp>
+        <p:nvSpPr>
+          <p:cNvPr id="2" name="1 Título"/>
+          <p:cNvSpPr>
+            <a:spLocks noGrp="1"/>
+          </p:cNvSpPr>
+          <p:nvPr>
+            <p:ph type="title"/>
+          </p:nvPr>
+        </p:nvSpPr>
+        <p:spPr/>
+        <p:txBody>
+          <a:bodyPr/>
+          <a:lstStyle/>
+          <a:p>
+            <a:endParaRPr lang="en-US"/>
+          </a:p>
+        </p:txBody>
+      </p:sp>
+      <p:sp>
+        <p:nvSpPr>
+          <p:cNvPr id="3" name="2 Marcador de contenido"/>
+          <p:cNvSpPr>
+            <a:spLocks noGrp="1"/>
+          </p:cNvSpPr>
+          <p:nvPr>
+            <p:ph idx="1"/>
+          </p:nvPr>
+        </p:nvSpPr>
+        <p:spPr/>
+        <p:txBody>
+          <a:bodyPr/>
+          <a:lstStyle/>
+          <a:p>
+            <a:endParaRPr lang="en-US" dirty="0"/>
+          </a:p>
+        </p:txBody>
+      </p:sp>
       <p:pic>
         <p:nvPicPr>
-          <p:cNvPr id="3080" name="Picture 8"/>
+          <p:cNvPr id="1026" name="Picture 2"/>
           <p:cNvPicPr>
             <a:picLocks noChangeAspect="1" noChangeArrowheads="1"/>
           </p:cNvPicPr>
@@ -7282,15 +7928,15 @@
         </p:nvPicPr>
         <p:blipFill>
           <a:blip r:embed="rId2"/>
-          <a:srcRect/>
+          <a:srcRect t="11877" r="9808" b="8632"/>
           <a:stretch>
             <a:fillRect/>
           </a:stretch>
         </p:blipFill>
         <p:spPr bwMode="auto">
           <a:xfrm>
-            <a:off x="5036024" y="315191"/>
-            <a:ext cx="4080680" cy="6373434"/>
+            <a:off x="0" y="-377371"/>
+            <a:ext cx="12100225" cy="6574972"/>
           </a:xfrm>
           <a:prstGeom prst="rect">
             <a:avLst/>
@@ -7307,10 +7953,10 @@
       </p:pic>
       <p:sp>
         <p:nvSpPr>
-          <p:cNvPr id="8" name="CuadroTexto 6">
-            <a:extLst>
-              <a:ext uri="{FF2B5EF4-FFF2-40B4-BE49-F238E27FC236}">
-                <a16:creationId xmlns="" xmlns:a16="http://schemas.microsoft.com/office/drawing/2014/main" id="{4C1428CB-200C-4FCD-994D-30D30253A07B}"/>
+          <p:cNvPr id="5" name="CuadroTexto 6">
+            <a:extLst>
+              <a:ext uri="{FF2B5EF4-FFF2-40B4-BE49-F238E27FC236}">
+                <a16:creationId xmlns:a16="http://schemas.microsoft.com/office/drawing/2014/main" xmlns="" id="{4C1428CB-200C-4FCD-994D-30D30253A07B}"/>
               </a:ext>
             </a:extLst>
           </p:cNvPr>
@@ -7319,8 +7965,8 @@
         </p:nvSpPr>
         <p:spPr>
           <a:xfrm>
-            <a:off x="3298626" y="3317964"/>
-            <a:ext cx="1928461" cy="1477328"/>
+            <a:off x="8280063" y="1571053"/>
+            <a:ext cx="3505537" cy="1477328"/>
           </a:xfrm>
           <a:prstGeom prst="rect">
             <a:avLst/>
@@ -7343,9 +7989,10 @@
           </a:bodyPr>
           <a:lstStyle/>
           <a:p>
+            <a:pPr algn="just"/>
             <a:r>
               <a:rPr lang="es-CO" b="1" dirty="0" smtClean="0"/>
-              <a:t>Así quedaran tus datos, los puedes modificar y actualizar cuantas veces necesites.</a:t>
+              <a:t>Dando click en la palabra USUARIO tienes dos opciones, en perfil puedes actualizar los datos de tu cuenta PLAY WEB y también puedes cerrar sesión.</a:t>
             </a:r>
             <a:endParaRPr lang="es-CO" b="1" dirty="0"/>
           </a:p>
@@ -7353,23 +8000,21 @@
       </p:sp>
       <p:sp>
         <p:nvSpPr>
-          <p:cNvPr id="10" name="9 Elipse"/>
+          <p:cNvPr id="9" name="8 Flecha abajo"/>
           <p:cNvSpPr/>
           <p:nvPr/>
         </p:nvSpPr>
         <p:spPr>
-          <a:xfrm>
-            <a:off x="3589354" y="2088108"/>
-            <a:ext cx="1228299" cy="1173707"/>
-          </a:xfrm>
-          <a:prstGeom prst="ellipse">
-            <a:avLst/>
+          <a:xfrm rot="11537676">
+            <a:off x="8706421" y="125540"/>
+            <a:ext cx="551778" cy="1419236"/>
+          </a:xfrm>
+          <a:prstGeom prst="downArrow">
+            <a:avLst>
+              <a:gd name="adj1" fmla="val 31350"/>
+              <a:gd name="adj2" fmla="val 119870"/>
+            </a:avLst>
           </a:prstGeom>
-          <a:ln>
-            <a:solidFill>
-              <a:schemeClr val="tx1"/>
-            </a:solidFill>
-          </a:ln>
         </p:spPr>
         <p:style>
           <a:lnRef idx="2">
@@ -7392,77 +8037,13 @@
           <a:lstStyle/>
           <a:p>
             <a:pPr algn="ctr"/>
-            <a:r>
-              <a:rPr lang="en-US" sz="8800" b="1" dirty="0" smtClean="0">
-                <a:ln w="18415" cmpd="sng">
-                  <a:solidFill>
-                    <a:srgbClr val="FFFFFF"/>
-                  </a:solidFill>
-                  <a:prstDash val="solid"/>
-                </a:ln>
-                <a:solidFill>
-                  <a:srgbClr val="FFFFFF"/>
-                </a:solidFill>
-                <a:effectLst>
-                  <a:outerShdw blurRad="63500" dir="3600000" algn="tl" rotWithShape="0">
-                    <a:srgbClr val="000000">
-                      <a:alpha val="70000"/>
-                    </a:srgbClr>
-                  </a:outerShdw>
-                </a:effectLst>
-              </a:rPr>
-              <a:t>3</a:t>
-            </a:r>
-            <a:endParaRPr lang="en-US" b="1" dirty="0">
-              <a:ln w="18415" cmpd="sng">
-                <a:solidFill>
-                  <a:srgbClr val="FFFFFF"/>
-                </a:solidFill>
-                <a:prstDash val="solid"/>
-              </a:ln>
-              <a:solidFill>
-                <a:srgbClr val="FFFFFF"/>
-              </a:solidFill>
-              <a:effectLst>
-                <a:outerShdw blurRad="63500" dir="3600000" algn="tl" rotWithShape="0">
-                  <a:srgbClr val="000000">
-                    <a:alpha val="70000"/>
-                  </a:srgbClr>
-                </a:outerShdw>
-              </a:effectLst>
-            </a:endParaRPr>
-          </a:p>
-        </p:txBody>
-      </p:sp>
-      <p:pic>
-        <p:nvPicPr>
-          <p:cNvPr id="1026" name="Picture 2" descr="C:\Users\luzgo\Desktop\PlayWeb-BICTIA\img\usuaria22.png"/>
-          <p:cNvPicPr>
-            <a:picLocks noChangeAspect="1" noChangeArrowheads="1"/>
-          </p:cNvPicPr>
-          <p:nvPr/>
-        </p:nvPicPr>
-        <p:blipFill>
-          <a:blip r:embed="rId3" cstate="print"/>
-          <a:srcRect/>
-          <a:stretch>
-            <a:fillRect/>
-          </a:stretch>
-        </p:blipFill>
-        <p:spPr bwMode="auto">
-          <a:xfrm>
-            <a:off x="6527631" y="1384660"/>
-            <a:ext cx="1194693" cy="1267099"/>
-          </a:xfrm>
-          <a:prstGeom prst="rect">
-            <a:avLst/>
-          </a:prstGeom>
-          <a:noFill/>
-        </p:spPr>
-      </p:pic>
-      <p:sp>
-        <p:nvSpPr>
-          <p:cNvPr id="6" name="5 Marcador de número de diapositiva"/>
+            <a:endParaRPr lang="en-US"/>
+          </a:p>
+        </p:txBody>
+      </p:sp>
+      <p:sp>
+        <p:nvSpPr>
+          <p:cNvPr id="7" name="6 Marcador de número de diapositiva"/>
           <p:cNvSpPr>
             <a:spLocks noGrp="1"/>
           </p:cNvSpPr>
@@ -7781,7 +8362,7 @@
   <a:extraClrSchemeLst/>
   <a:extLst>
     <a:ext uri="{05A4C25C-085E-4340-85A3-A5531E510DB2}">
-      <thm15:themeFamily xmlns="" xmlns:thm15="http://schemas.microsoft.com/office/thememl/2012/main" name="Office Theme" id="{62F939B6-93AF-4DB8-9C6B-D6C7DFDC589F}" vid="{4A3C46E8-61CC-4603-A589-7422A47A8E4A}"/>
+      <thm15:themeFamily xmlns:thm15="http://schemas.microsoft.com/office/thememl/2012/main" xmlns="" name="Office Theme" id="{62F939B6-93AF-4DB8-9C6B-D6C7DFDC589F}" vid="{4A3C46E8-61CC-4603-A589-7422A47A8E4A}"/>
     </a:ext>
   </a:extLst>
 </a:theme>

</xml_diff>